<commit_message>
Completed my analysis slides
</commit_message>
<xml_diff>
--- a/Presentation.pptx
+++ b/Presentation.pptx
@@ -5,7 +5,7 @@
     <p:sldMasterId id="2147483758" r:id="rId1"/>
   </p:sldMasterIdLst>
   <p:notesMasterIdLst>
-    <p:notesMasterId r:id="rId17"/>
+    <p:notesMasterId r:id="rId19"/>
   </p:notesMasterIdLst>
   <p:sldIdLst>
     <p:sldId id="256" r:id="rId2"/>
@@ -20,9 +20,11 @@
     <p:sldId id="271" r:id="rId11"/>
     <p:sldId id="272" r:id="rId12"/>
     <p:sldId id="268" r:id="rId13"/>
-    <p:sldId id="273" r:id="rId14"/>
-    <p:sldId id="274" r:id="rId15"/>
-    <p:sldId id="257" r:id="rId16"/>
+    <p:sldId id="275" r:id="rId14"/>
+    <p:sldId id="273" r:id="rId15"/>
+    <p:sldId id="274" r:id="rId16"/>
+    <p:sldId id="276" r:id="rId17"/>
+    <p:sldId id="257" r:id="rId18"/>
   </p:sldIdLst>
   <p:sldSz cx="12192000" cy="6858000"/>
   <p:notesSz cx="6858000" cy="9144000"/>
@@ -211,7 +213,7 @@
           <a:p>
             <a:fld id="{FA923A3A-B49C-4CBB-91EA-FF02A61F2467}" type="datetimeFigureOut">
               <a:rPr lang="en-US" smtClean="0"/>
-              <a:t>12/5/2018</a:t>
+              <a:t>12/6/2018</a:t>
             </a:fld>
             <a:endParaRPr lang="en-US"/>
           </a:p>
@@ -524,7 +526,7 @@
           <a:p>
             <a:r>
               <a:rPr lang="en-US" dirty="0"/>
-              <a:t>Difference is statistically significant, but with a warning the approximation may be wrong. </a:t>
+              <a:t>Difference is statistically significant, but with a warning the approximation may be wrong.  P value set at .01 instead of .05. </a:t>
             </a:r>
           </a:p>
         </p:txBody>
@@ -611,7 +613,7 @@
           <a:p>
             <a:r>
               <a:rPr lang="en-US" dirty="0"/>
-              <a:t>Difference is not statistically significant. </a:t>
+              <a:t>Difference is not statistically significant. P value set at .01 instead of .05. </a:t>
             </a:r>
           </a:p>
         </p:txBody>
@@ -698,8 +700,21 @@
           <a:p>
             <a:r>
               <a:rPr lang="en-US" dirty="0"/>
-              <a:t>We used a chi-squared test on each cross tab to see if it was statistically significant. </a:t>
+              <a:t>We used a chi-squared test on each cross tab to see if it was statistically significant. P value set at .01 instead of .05. </a:t>
             </a:r>
+            <a:r>
+              <a:rPr lang="en-US" sz="1200" kern="1200" dirty="0">
+                <a:solidFill>
+                  <a:schemeClr val="tx1"/>
+                </a:solidFill>
+                <a:effectLst/>
+                <a:latin typeface="+mn-lt"/>
+                <a:ea typeface="+mn-ea"/>
+                <a:cs typeface="+mn-cs"/>
+              </a:rPr>
+              <a:t>Interestingly, for women the second most common answer is “Somewhat Difficult”, while for men the second most common answer is “Very Easy.” </a:t>
+            </a:r>
+            <a:endParaRPr lang="en-US" dirty="0"/>
           </a:p>
         </p:txBody>
       </p:sp>
@@ -785,7 +800,7 @@
           <a:p>
             <a:r>
               <a:rPr lang="en-US" dirty="0"/>
-              <a:t>We used a chi-squared test on each cross tab to see if it was statistically significant. </a:t>
+              <a:t>What we found generally is that most employees responding will say that it is somewhat easy to request leave.  However, having mental health benefits, discussion on mental health, and other mental health resources may make it more likely that employees would find it easy to request leave (and the reverse). </a:t>
             </a:r>
           </a:p>
         </p:txBody>
@@ -816,7 +831,7 @@
     </p:spTree>
     <p:extLst>
       <p:ext uri="{BB962C8B-B14F-4D97-AF65-F5344CB8AC3E}">
-        <p14:creationId xmlns:p14="http://schemas.microsoft.com/office/powerpoint/2010/main" val="2322844894"/>
+        <p14:creationId xmlns:p14="http://schemas.microsoft.com/office/powerpoint/2010/main" val="928726027"/>
       </p:ext>
     </p:extLst>
   </p:cSld>
@@ -870,10 +885,7 @@
           <a:bodyPr/>
           <a:lstStyle/>
           <a:p>
-            <a:r>
-              <a:rPr lang="en-US" dirty="0"/>
-              <a:t>We used a chi-squared test on each cross tab to see if it was statistically significant. </a:t>
-            </a:r>
+            <a:endParaRPr lang="en-US" dirty="0"/>
           </a:p>
         </p:txBody>
       </p:sp>
@@ -903,7 +915,228 @@
     </p:spTree>
     <p:extLst>
       <p:ext uri="{BB962C8B-B14F-4D97-AF65-F5344CB8AC3E}">
+        <p14:creationId xmlns:p14="http://schemas.microsoft.com/office/powerpoint/2010/main" val="2322844894"/>
+      </p:ext>
+    </p:extLst>
+  </p:cSld>
+  <p:clrMapOvr>
+    <a:masterClrMapping/>
+  </p:clrMapOvr>
+</p:notes>
+</file>
+
+<file path=ppt/notesSlides/notesSlide6.xml><?xml version="1.0" encoding="utf-8"?>
+<p:notes xmlns:a="http://schemas.openxmlformats.org/drawingml/2006/main" xmlns:r="http://schemas.openxmlformats.org/officeDocument/2006/relationships" xmlns:p="http://schemas.openxmlformats.org/presentationml/2006/main">
+  <p:cSld>
+    <p:spTree>
+      <p:nvGrpSpPr>
+        <p:cNvPr id="1" name=""/>
+        <p:cNvGrpSpPr/>
+        <p:nvPr/>
+      </p:nvGrpSpPr>
+      <p:grpSpPr>
+        <a:xfrm>
+          <a:off x="0" y="0"/>
+          <a:ext cx="0" cy="0"/>
+          <a:chOff x="0" y="0"/>
+          <a:chExt cx="0" cy="0"/>
+        </a:xfrm>
+      </p:grpSpPr>
+      <p:sp>
+        <p:nvSpPr>
+          <p:cNvPr id="2" name="Slide Image Placeholder 1"/>
+          <p:cNvSpPr>
+            <a:spLocks noGrp="1" noRot="1" noChangeAspect="1"/>
+          </p:cNvSpPr>
+          <p:nvPr>
+            <p:ph type="sldImg"/>
+          </p:nvPr>
+        </p:nvSpPr>
+        <p:spPr/>
+      </p:sp>
+      <p:sp>
+        <p:nvSpPr>
+          <p:cNvPr id="3" name="Notes Placeholder 2"/>
+          <p:cNvSpPr>
+            <a:spLocks noGrp="1"/>
+          </p:cNvSpPr>
+          <p:nvPr>
+            <p:ph type="body" idx="1"/>
+          </p:nvPr>
+        </p:nvSpPr>
+        <p:spPr/>
+        <p:txBody>
+          <a:bodyPr/>
+          <a:lstStyle/>
+          <a:p>
+            <a:pPr marL="0" marR="0" lvl="0" indent="0" algn="l" defTabSz="914400" rtl="0" eaLnBrk="1" fontAlgn="auto" latinLnBrk="0" hangingPunct="1">
+              <a:lnSpc>
+                <a:spcPct val="100000"/>
+              </a:lnSpc>
+              <a:spcBef>
+                <a:spcPts val="0"/>
+              </a:spcBef>
+              <a:spcAft>
+                <a:spcPts val="0"/>
+              </a:spcAft>
+              <a:buClrTx/>
+              <a:buSzTx/>
+              <a:buFontTx/>
+              <a:buNone/>
+              <a:tabLst/>
+              <a:defRPr/>
+            </a:pPr>
+            <a:endParaRPr lang="en-US" sz="1200" kern="1200" dirty="0">
+              <a:solidFill>
+                <a:schemeClr val="tx1"/>
+              </a:solidFill>
+              <a:effectLst/>
+              <a:latin typeface="+mn-lt"/>
+              <a:ea typeface="+mn-ea"/>
+              <a:cs typeface="+mn-cs"/>
+            </a:endParaRPr>
+          </a:p>
+        </p:txBody>
+      </p:sp>
+      <p:sp>
+        <p:nvSpPr>
+          <p:cNvPr id="4" name="Slide Number Placeholder 3"/>
+          <p:cNvSpPr>
+            <a:spLocks noGrp="1"/>
+          </p:cNvSpPr>
+          <p:nvPr>
+            <p:ph type="sldNum" sz="quarter" idx="5"/>
+          </p:nvPr>
+        </p:nvSpPr>
+        <p:spPr/>
+        <p:txBody>
+          <a:bodyPr/>
+          <a:lstStyle/>
+          <a:p>
+            <a:fld id="{6BE8A258-1999-4E07-80A2-CA3F98A81054}" type="slidenum">
+              <a:rPr lang="en-US" smtClean="0"/>
+              <a:t>15</a:t>
+            </a:fld>
+            <a:endParaRPr lang="en-US"/>
+          </a:p>
+        </p:txBody>
+      </p:sp>
+    </p:spTree>
+    <p:extLst>
+      <p:ext uri="{BB962C8B-B14F-4D97-AF65-F5344CB8AC3E}">
         <p14:creationId xmlns:p14="http://schemas.microsoft.com/office/powerpoint/2010/main" val="685820093"/>
+      </p:ext>
+    </p:extLst>
+  </p:cSld>
+  <p:clrMapOvr>
+    <a:masterClrMapping/>
+  </p:clrMapOvr>
+</p:notes>
+</file>
+
+<file path=ppt/notesSlides/notesSlide7.xml><?xml version="1.0" encoding="utf-8"?>
+<p:notes xmlns:a="http://schemas.openxmlformats.org/drawingml/2006/main" xmlns:r="http://schemas.openxmlformats.org/officeDocument/2006/relationships" xmlns:p="http://schemas.openxmlformats.org/presentationml/2006/main">
+  <p:cSld>
+    <p:spTree>
+      <p:nvGrpSpPr>
+        <p:cNvPr id="1" name=""/>
+        <p:cNvGrpSpPr/>
+        <p:nvPr/>
+      </p:nvGrpSpPr>
+      <p:grpSpPr>
+        <a:xfrm>
+          <a:off x="0" y="0"/>
+          <a:ext cx="0" cy="0"/>
+          <a:chOff x="0" y="0"/>
+          <a:chExt cx="0" cy="0"/>
+        </a:xfrm>
+      </p:grpSpPr>
+      <p:sp>
+        <p:nvSpPr>
+          <p:cNvPr id="2" name="Slide Image Placeholder 1"/>
+          <p:cNvSpPr>
+            <a:spLocks noGrp="1" noRot="1" noChangeAspect="1"/>
+          </p:cNvSpPr>
+          <p:nvPr>
+            <p:ph type="sldImg"/>
+          </p:nvPr>
+        </p:nvSpPr>
+        <p:spPr/>
+      </p:sp>
+      <p:sp>
+        <p:nvSpPr>
+          <p:cNvPr id="3" name="Notes Placeholder 2"/>
+          <p:cNvSpPr>
+            <a:spLocks noGrp="1"/>
+          </p:cNvSpPr>
+          <p:nvPr>
+            <p:ph type="body" idx="1"/>
+          </p:nvPr>
+        </p:nvSpPr>
+        <p:spPr/>
+        <p:txBody>
+          <a:bodyPr/>
+          <a:lstStyle/>
+          <a:p>
+            <a:pPr marL="0" marR="0" lvl="0" indent="0" algn="l" defTabSz="914400" rtl="0" eaLnBrk="1" fontAlgn="auto" latinLnBrk="0" hangingPunct="1">
+              <a:lnSpc>
+                <a:spcPct val="100000"/>
+              </a:lnSpc>
+              <a:spcBef>
+                <a:spcPts val="0"/>
+              </a:spcBef>
+              <a:spcAft>
+                <a:spcPts val="0"/>
+              </a:spcAft>
+              <a:buClrTx/>
+              <a:buSzTx/>
+              <a:buFontTx/>
+              <a:buNone/>
+              <a:tabLst/>
+              <a:defRPr/>
+            </a:pPr>
+            <a:r>
+              <a:rPr lang="en-US" sz="1200" kern="1200" dirty="0">
+                <a:solidFill>
+                  <a:schemeClr val="tx1"/>
+                </a:solidFill>
+                <a:effectLst/>
+                <a:latin typeface="+mn-lt"/>
+                <a:ea typeface="+mn-ea"/>
+                <a:cs typeface="+mn-cs"/>
+              </a:rPr>
+              <a:t>Interestingly, those who stated “Yes, I observed” a poor response to mental health in the workplace were evenly split between the maybe and no answers when also asked if they would feel comfortable discussing a mental health disorder with coworkers. However, those who stated that they experienced a poorly handled response selected “Maybe” most often when also asked if they would feel comfortable discussing a mental health disorder with coworkers. The remainder were about evenly split between the “no” and “yes” answers. This may indicate that observing a poorly handled response to a mental health issue in the workplace may have a greater negative effect on willingness to discuss with coworkers than those experiencing it.</a:t>
+            </a:r>
+          </a:p>
+        </p:txBody>
+      </p:sp>
+      <p:sp>
+        <p:nvSpPr>
+          <p:cNvPr id="4" name="Slide Number Placeholder 3"/>
+          <p:cNvSpPr>
+            <a:spLocks noGrp="1"/>
+          </p:cNvSpPr>
+          <p:nvPr>
+            <p:ph type="sldNum" sz="quarter" idx="5"/>
+          </p:nvPr>
+        </p:nvSpPr>
+        <p:spPr/>
+        <p:txBody>
+          <a:bodyPr/>
+          <a:lstStyle/>
+          <a:p>
+            <a:fld id="{6BE8A258-1999-4E07-80A2-CA3F98A81054}" type="slidenum">
+              <a:rPr lang="en-US" smtClean="0"/>
+              <a:t>16</a:t>
+            </a:fld>
+            <a:endParaRPr lang="en-US"/>
+          </a:p>
+        </p:txBody>
+      </p:sp>
+    </p:spTree>
+    <p:extLst>
+      <p:ext uri="{BB962C8B-B14F-4D97-AF65-F5344CB8AC3E}">
+        <p14:creationId xmlns:p14="http://schemas.microsoft.com/office/powerpoint/2010/main" val="2333074281"/>
       </p:ext>
     </p:extLst>
   </p:cSld>
@@ -963,7 +1196,7 @@
           <a:noFill/>
           <a:extLst>
             <a:ext uri="{909E8E84-426E-40dd-AFC4-6F175D3DCCD1}">
-              <a14:hiddenFill xmlns="" xmlns:a14="http://schemas.microsoft.com/office/drawing/2010/main">
+              <a14:hiddenFill xmlns:a14="http://schemas.microsoft.com/office/drawing/2010/main" xmlns="">
                 <a:solidFill>
                   <a:srgbClr val="FFFFFF"/>
                 </a:solidFill>
@@ -1023,7 +1256,7 @@
             </a:ln>
             <a:extLst>
               <a:ext uri="{91240B29-F687-4f45-9708-019B960494DF}">
-                <a14:hiddenLine xmlns="" xmlns:a14="http://schemas.microsoft.com/office/drawing/2010/main" w="9525">
+                <a14:hiddenLine xmlns:a14="http://schemas.microsoft.com/office/drawing/2010/main" xmlns="" w="9525">
                   <a:solidFill>
                     <a:srgbClr val="000000"/>
                   </a:solidFill>
@@ -1113,7 +1346,7 @@
             </a:ln>
             <a:extLst>
               <a:ext uri="{91240B29-F687-4f45-9708-019B960494DF}">
-                <a14:hiddenLine xmlns="" xmlns:a14="http://schemas.microsoft.com/office/drawing/2010/main" w="9525">
+                <a14:hiddenLine xmlns:a14="http://schemas.microsoft.com/office/drawing/2010/main" xmlns="" w="9525">
                   <a:solidFill>
                     <a:srgbClr val="000000"/>
                   </a:solidFill>
@@ -1203,7 +1436,7 @@
             </a:ln>
             <a:extLst>
               <a:ext uri="{91240B29-F687-4f45-9708-019B960494DF}">
-                <a14:hiddenLine xmlns="" xmlns:a14="http://schemas.microsoft.com/office/drawing/2010/main" w="9525">
+                <a14:hiddenLine xmlns:a14="http://schemas.microsoft.com/office/drawing/2010/main" xmlns="" w="9525">
                   <a:solidFill>
                     <a:srgbClr val="000000"/>
                   </a:solidFill>
@@ -1237,7 +1470,7 @@
             </a:ln>
             <a:extLst>
               <a:ext uri="{91240B29-F687-4f45-9708-019B960494DF}">
-                <a14:hiddenLine xmlns="" xmlns:a14="http://schemas.microsoft.com/office/drawing/2010/main" w="9525">
+                <a14:hiddenLine xmlns:a14="http://schemas.microsoft.com/office/drawing/2010/main" xmlns="" w="9525">
                   <a:solidFill>
                     <a:srgbClr val="000000"/>
                   </a:solidFill>
@@ -1327,7 +1560,7 @@
             </a:ln>
             <a:extLst>
               <a:ext uri="{91240B29-F687-4f45-9708-019B960494DF}">
-                <a14:hiddenLine xmlns="" xmlns:a14="http://schemas.microsoft.com/office/drawing/2010/main" w="9525">
+                <a14:hiddenLine xmlns:a14="http://schemas.microsoft.com/office/drawing/2010/main" xmlns="" w="9525">
                   <a:solidFill>
                     <a:srgbClr val="000000"/>
                   </a:solidFill>
@@ -1389,7 +1622,7 @@
             </a:ln>
             <a:extLst>
               <a:ext uri="{91240B29-F687-4f45-9708-019B960494DF}">
-                <a14:hiddenLine xmlns="" xmlns:a14="http://schemas.microsoft.com/office/drawing/2010/main" w="9525">
+                <a14:hiddenLine xmlns:a14="http://schemas.microsoft.com/office/drawing/2010/main" xmlns="" w="9525">
                   <a:solidFill>
                     <a:srgbClr val="000000"/>
                   </a:solidFill>
@@ -1451,7 +1684,7 @@
             </a:ln>
             <a:extLst>
               <a:ext uri="{91240B29-F687-4f45-9708-019B960494DF}">
-                <a14:hiddenLine xmlns="" xmlns:a14="http://schemas.microsoft.com/office/drawing/2010/main" w="9525">
+                <a14:hiddenLine xmlns:a14="http://schemas.microsoft.com/office/drawing/2010/main" xmlns="" w="9525">
                   <a:solidFill>
                     <a:srgbClr val="000000"/>
                   </a:solidFill>
@@ -1541,7 +1774,7 @@
             </a:ln>
             <a:extLst>
               <a:ext uri="{91240B29-F687-4f45-9708-019B960494DF}">
-                <a14:hiddenLine xmlns="" xmlns:a14="http://schemas.microsoft.com/office/drawing/2010/main" w="9525">
+                <a14:hiddenLine xmlns:a14="http://schemas.microsoft.com/office/drawing/2010/main" xmlns="" w="9525">
                   <a:solidFill>
                     <a:srgbClr val="000000"/>
                   </a:solidFill>
@@ -1603,7 +1836,7 @@
             </a:ln>
             <a:extLst>
               <a:ext uri="{91240B29-F687-4f45-9708-019B960494DF}">
-                <a14:hiddenLine xmlns="" xmlns:a14="http://schemas.microsoft.com/office/drawing/2010/main" w="9525">
+                <a14:hiddenLine xmlns:a14="http://schemas.microsoft.com/office/drawing/2010/main" xmlns="" w="9525">
                   <a:solidFill>
                     <a:srgbClr val="000000"/>
                   </a:solidFill>
@@ -1665,7 +1898,7 @@
             </a:ln>
             <a:extLst>
               <a:ext uri="{91240B29-F687-4f45-9708-019B960494DF}">
-                <a14:hiddenLine xmlns="" xmlns:a14="http://schemas.microsoft.com/office/drawing/2010/main" w="9525">
+                <a14:hiddenLine xmlns:a14="http://schemas.microsoft.com/office/drawing/2010/main" xmlns="" w="9525">
                   <a:solidFill>
                     <a:srgbClr val="000000"/>
                   </a:solidFill>
@@ -1755,7 +1988,7 @@
             </a:ln>
             <a:extLst>
               <a:ext uri="{91240B29-F687-4f45-9708-019B960494DF}">
-                <a14:hiddenLine xmlns="" xmlns:a14="http://schemas.microsoft.com/office/drawing/2010/main" w="9525">
+                <a14:hiddenLine xmlns:a14="http://schemas.microsoft.com/office/drawing/2010/main" xmlns="" w="9525">
                   <a:solidFill>
                     <a:srgbClr val="000000"/>
                   </a:solidFill>
@@ -1845,7 +2078,7 @@
             </a:ln>
             <a:extLst>
               <a:ext uri="{91240B29-F687-4f45-9708-019B960494DF}">
-                <a14:hiddenLine xmlns="" xmlns:a14="http://schemas.microsoft.com/office/drawing/2010/main" w="9525">
+                <a14:hiddenLine xmlns:a14="http://schemas.microsoft.com/office/drawing/2010/main" xmlns="" w="9525">
                   <a:solidFill>
                     <a:srgbClr val="000000"/>
                   </a:solidFill>
@@ -1907,7 +2140,7 @@
             </a:ln>
             <a:extLst>
               <a:ext uri="{91240B29-F687-4f45-9708-019B960494DF}">
-                <a14:hiddenLine xmlns="" xmlns:a14="http://schemas.microsoft.com/office/drawing/2010/main" w="9525">
+                <a14:hiddenLine xmlns:a14="http://schemas.microsoft.com/office/drawing/2010/main" xmlns="" w="9525">
                   <a:solidFill>
                     <a:srgbClr val="000000"/>
                   </a:solidFill>
@@ -2017,7 +2250,7 @@
             </a:ln>
             <a:extLst>
               <a:ext uri="{91240B29-F687-4f45-9708-019B960494DF}">
-                <a14:hiddenLine xmlns="" xmlns:a14="http://schemas.microsoft.com/office/drawing/2010/main" w="9525">
+                <a14:hiddenLine xmlns:a14="http://schemas.microsoft.com/office/drawing/2010/main" xmlns="" w="9525">
                   <a:solidFill>
                     <a:srgbClr val="000000"/>
                   </a:solidFill>
@@ -2079,7 +2312,7 @@
             </a:ln>
             <a:extLst>
               <a:ext uri="{91240B29-F687-4f45-9708-019B960494DF}">
-                <a14:hiddenLine xmlns="" xmlns:a14="http://schemas.microsoft.com/office/drawing/2010/main" w="9525">
+                <a14:hiddenLine xmlns:a14="http://schemas.microsoft.com/office/drawing/2010/main" xmlns="" w="9525">
                   <a:solidFill>
                     <a:srgbClr val="000000"/>
                   </a:solidFill>
@@ -2169,7 +2402,7 @@
             </a:ln>
             <a:extLst>
               <a:ext uri="{91240B29-F687-4f45-9708-019B960494DF}">
-                <a14:hiddenLine xmlns="" xmlns:a14="http://schemas.microsoft.com/office/drawing/2010/main" w="9525">
+                <a14:hiddenLine xmlns:a14="http://schemas.microsoft.com/office/drawing/2010/main" xmlns="" w="9525">
                   <a:solidFill>
                     <a:srgbClr val="000000"/>
                   </a:solidFill>
@@ -2259,7 +2492,7 @@
             </a:ln>
             <a:extLst>
               <a:ext uri="{91240B29-F687-4f45-9708-019B960494DF}">
-                <a14:hiddenLine xmlns="" xmlns:a14="http://schemas.microsoft.com/office/drawing/2010/main" w="9525">
+                <a14:hiddenLine xmlns:a14="http://schemas.microsoft.com/office/drawing/2010/main" xmlns="" w="9525">
                   <a:solidFill>
                     <a:srgbClr val="000000"/>
                   </a:solidFill>
@@ -2321,7 +2554,7 @@
             </a:ln>
             <a:extLst>
               <a:ext uri="{91240B29-F687-4f45-9708-019B960494DF}">
-                <a14:hiddenLine xmlns="" xmlns:a14="http://schemas.microsoft.com/office/drawing/2010/main" w="9525">
+                <a14:hiddenLine xmlns:a14="http://schemas.microsoft.com/office/drawing/2010/main" xmlns="" w="9525">
                   <a:solidFill>
                     <a:srgbClr val="000000"/>
                   </a:solidFill>
@@ -2411,7 +2644,7 @@
             </a:ln>
             <a:extLst>
               <a:ext uri="{91240B29-F687-4f45-9708-019B960494DF}">
-                <a14:hiddenLine xmlns="" xmlns:a14="http://schemas.microsoft.com/office/drawing/2010/main" w="9525">
+                <a14:hiddenLine xmlns:a14="http://schemas.microsoft.com/office/drawing/2010/main" xmlns="" w="9525">
                   <a:solidFill>
                     <a:srgbClr val="000000"/>
                   </a:solidFill>
@@ -2501,7 +2734,7 @@
             </a:ln>
             <a:extLst>
               <a:ext uri="{91240B29-F687-4f45-9708-019B960494DF}">
-                <a14:hiddenLine xmlns="" xmlns:a14="http://schemas.microsoft.com/office/drawing/2010/main" w="9525">
+                <a14:hiddenLine xmlns:a14="http://schemas.microsoft.com/office/drawing/2010/main" xmlns="" w="9525">
                   <a:solidFill>
                     <a:srgbClr val="000000"/>
                   </a:solidFill>
@@ -2557,7 +2790,7 @@
             </a:ln>
             <a:extLst>
               <a:ext uri="{91240B29-F687-4f45-9708-019B960494DF}">
-                <a14:hiddenLine xmlns="" xmlns:a14="http://schemas.microsoft.com/office/drawing/2010/main" w="9525">
+                <a14:hiddenLine xmlns:a14="http://schemas.microsoft.com/office/drawing/2010/main" xmlns="" w="9525">
                   <a:solidFill>
                     <a:srgbClr val="000000"/>
                   </a:solidFill>
@@ -2647,7 +2880,7 @@
             </a:ln>
             <a:extLst>
               <a:ext uri="{91240B29-F687-4f45-9708-019B960494DF}">
-                <a14:hiddenLine xmlns="" xmlns:a14="http://schemas.microsoft.com/office/drawing/2010/main" w="9525">
+                <a14:hiddenLine xmlns:a14="http://schemas.microsoft.com/office/drawing/2010/main" xmlns="" w="9525">
                   <a:solidFill>
                     <a:srgbClr val="000000"/>
                   </a:solidFill>
@@ -2703,7 +2936,7 @@
             </a:ln>
             <a:extLst>
               <a:ext uri="{91240B29-F687-4f45-9708-019B960494DF}">
-                <a14:hiddenLine xmlns="" xmlns:a14="http://schemas.microsoft.com/office/drawing/2010/main" w="9525">
+                <a14:hiddenLine xmlns:a14="http://schemas.microsoft.com/office/drawing/2010/main" xmlns="" w="9525">
                   <a:solidFill>
                     <a:srgbClr val="000000"/>
                   </a:solidFill>
@@ -2793,7 +3026,7 @@
             </a:ln>
             <a:extLst>
               <a:ext uri="{91240B29-F687-4f45-9708-019B960494DF}">
-                <a14:hiddenLine xmlns="" xmlns:a14="http://schemas.microsoft.com/office/drawing/2010/main" w="9525">
+                <a14:hiddenLine xmlns:a14="http://schemas.microsoft.com/office/drawing/2010/main" xmlns="" w="9525">
                   <a:solidFill>
                     <a:srgbClr val="000000"/>
                   </a:solidFill>
@@ -2861,7 +3094,7 @@
             </a:ln>
             <a:extLst>
               <a:ext uri="{91240B29-F687-4f45-9708-019B960494DF}">
-                <a14:hiddenLine xmlns="" xmlns:a14="http://schemas.microsoft.com/office/drawing/2010/main" w="9525">
+                <a14:hiddenLine xmlns:a14="http://schemas.microsoft.com/office/drawing/2010/main" xmlns="" w="9525">
                   <a:solidFill>
                     <a:srgbClr val="000000"/>
                   </a:solidFill>
@@ -2951,7 +3184,7 @@
             </a:ln>
             <a:extLst>
               <a:ext uri="{91240B29-F687-4f45-9708-019B960494DF}">
-                <a14:hiddenLine xmlns="" xmlns:a14="http://schemas.microsoft.com/office/drawing/2010/main" w="9525">
+                <a14:hiddenLine xmlns:a14="http://schemas.microsoft.com/office/drawing/2010/main" xmlns="" w="9525">
                   <a:solidFill>
                     <a:srgbClr val="000000"/>
                   </a:solidFill>
@@ -3019,7 +3252,7 @@
             </a:ln>
             <a:extLst>
               <a:ext uri="{91240B29-F687-4f45-9708-019B960494DF}">
-                <a14:hiddenLine xmlns="" xmlns:a14="http://schemas.microsoft.com/office/drawing/2010/main" w="9525">
+                <a14:hiddenLine xmlns:a14="http://schemas.microsoft.com/office/drawing/2010/main" xmlns="" w="9525">
                   <a:solidFill>
                     <a:srgbClr val="000000"/>
                   </a:solidFill>
@@ -3109,7 +3342,7 @@
             </a:ln>
             <a:extLst>
               <a:ext uri="{91240B29-F687-4f45-9708-019B960494DF}">
-                <a14:hiddenLine xmlns="" xmlns:a14="http://schemas.microsoft.com/office/drawing/2010/main" w="9525">
+                <a14:hiddenLine xmlns:a14="http://schemas.microsoft.com/office/drawing/2010/main" xmlns="" w="9525">
                   <a:solidFill>
                     <a:srgbClr val="000000"/>
                   </a:solidFill>
@@ -3143,7 +3376,7 @@
             </a:ln>
             <a:extLst>
               <a:ext uri="{91240B29-F687-4f45-9708-019B960494DF}">
-                <a14:hiddenLine xmlns="" xmlns:a14="http://schemas.microsoft.com/office/drawing/2010/main" w="9525">
+                <a14:hiddenLine xmlns:a14="http://schemas.microsoft.com/office/drawing/2010/main" xmlns="" w="9525">
                   <a:solidFill>
                     <a:srgbClr val="000000"/>
                   </a:solidFill>
@@ -3233,7 +3466,7 @@
             </a:ln>
             <a:extLst>
               <a:ext uri="{91240B29-F687-4f45-9708-019B960494DF}">
-                <a14:hiddenLine xmlns="" xmlns:a14="http://schemas.microsoft.com/office/drawing/2010/main" w="9525">
+                <a14:hiddenLine xmlns:a14="http://schemas.microsoft.com/office/drawing/2010/main" xmlns="" w="9525">
                   <a:solidFill>
                     <a:srgbClr val="000000"/>
                   </a:solidFill>
@@ -3295,7 +3528,7 @@
             </a:ln>
             <a:extLst>
               <a:ext uri="{91240B29-F687-4f45-9708-019B960494DF}">
-                <a14:hiddenLine xmlns="" xmlns:a14="http://schemas.microsoft.com/office/drawing/2010/main" w="9525">
+                <a14:hiddenLine xmlns:a14="http://schemas.microsoft.com/office/drawing/2010/main" xmlns="" w="9525">
                   <a:solidFill>
                     <a:srgbClr val="000000"/>
                   </a:solidFill>
@@ -3357,7 +3590,7 @@
             </a:ln>
             <a:extLst>
               <a:ext uri="{91240B29-F687-4f45-9708-019B960494DF}">
-                <a14:hiddenLine xmlns="" xmlns:a14="http://schemas.microsoft.com/office/drawing/2010/main" w="9525">
+                <a14:hiddenLine xmlns:a14="http://schemas.microsoft.com/office/drawing/2010/main" xmlns="" w="9525">
                   <a:solidFill>
                     <a:srgbClr val="000000"/>
                   </a:solidFill>
@@ -3447,7 +3680,7 @@
             </a:ln>
             <a:extLst>
               <a:ext uri="{91240B29-F687-4f45-9708-019B960494DF}">
-                <a14:hiddenLine xmlns="" xmlns:a14="http://schemas.microsoft.com/office/drawing/2010/main" w="9525">
+                <a14:hiddenLine xmlns:a14="http://schemas.microsoft.com/office/drawing/2010/main" xmlns="" w="9525">
                   <a:solidFill>
                     <a:srgbClr val="000000"/>
                   </a:solidFill>
@@ -3515,7 +3748,7 @@
             </a:ln>
             <a:extLst>
               <a:ext uri="{91240B29-F687-4f45-9708-019B960494DF}">
-                <a14:hiddenLine xmlns="" xmlns:a14="http://schemas.microsoft.com/office/drawing/2010/main" w="9525">
+                <a14:hiddenLine xmlns:a14="http://schemas.microsoft.com/office/drawing/2010/main" xmlns="" w="9525">
                   <a:solidFill>
                     <a:srgbClr val="000000"/>
                   </a:solidFill>
@@ -3577,7 +3810,7 @@
             </a:ln>
             <a:extLst>
               <a:ext uri="{91240B29-F687-4f45-9708-019B960494DF}">
-                <a14:hiddenLine xmlns="" xmlns:a14="http://schemas.microsoft.com/office/drawing/2010/main" w="9525">
+                <a14:hiddenLine xmlns:a14="http://schemas.microsoft.com/office/drawing/2010/main" xmlns="" w="9525">
                   <a:solidFill>
                     <a:srgbClr val="000000"/>
                   </a:solidFill>
@@ -3667,7 +3900,7 @@
             </a:ln>
             <a:extLst>
               <a:ext uri="{91240B29-F687-4f45-9708-019B960494DF}">
-                <a14:hiddenLine xmlns="" xmlns:a14="http://schemas.microsoft.com/office/drawing/2010/main" w="9525">
+                <a14:hiddenLine xmlns:a14="http://schemas.microsoft.com/office/drawing/2010/main" xmlns="" w="9525">
                   <a:solidFill>
                     <a:srgbClr val="000000"/>
                   </a:solidFill>
@@ -3729,7 +3962,7 @@
             </a:ln>
             <a:extLst>
               <a:ext uri="{91240B29-F687-4f45-9708-019B960494DF}">
-                <a14:hiddenLine xmlns="" xmlns:a14="http://schemas.microsoft.com/office/drawing/2010/main" w="9525">
+                <a14:hiddenLine xmlns:a14="http://schemas.microsoft.com/office/drawing/2010/main" xmlns="" w="9525">
                   <a:solidFill>
                     <a:srgbClr val="000000"/>
                   </a:solidFill>
@@ -3819,7 +4052,7 @@
             </a:ln>
             <a:extLst>
               <a:ext uri="{91240B29-F687-4f45-9708-019B960494DF}">
-                <a14:hiddenLine xmlns="" xmlns:a14="http://schemas.microsoft.com/office/drawing/2010/main" w="9525">
+                <a14:hiddenLine xmlns:a14="http://schemas.microsoft.com/office/drawing/2010/main" xmlns="" w="9525">
                   <a:solidFill>
                     <a:srgbClr val="000000"/>
                   </a:solidFill>
@@ -3881,7 +4114,7 @@
             </a:ln>
             <a:extLst>
               <a:ext uri="{91240B29-F687-4f45-9708-019B960494DF}">
-                <a14:hiddenLine xmlns="" xmlns:a14="http://schemas.microsoft.com/office/drawing/2010/main" w="9525">
+                <a14:hiddenLine xmlns:a14="http://schemas.microsoft.com/office/drawing/2010/main" xmlns="" w="9525">
                   <a:solidFill>
                     <a:srgbClr val="000000"/>
                   </a:solidFill>
@@ -3971,7 +4204,7 @@
             </a:ln>
             <a:extLst>
               <a:ext uri="{91240B29-F687-4f45-9708-019B960494DF}">
-                <a14:hiddenLine xmlns="" xmlns:a14="http://schemas.microsoft.com/office/drawing/2010/main" w="9525">
+                <a14:hiddenLine xmlns:a14="http://schemas.microsoft.com/office/drawing/2010/main" xmlns="" w="9525">
                   <a:solidFill>
                     <a:srgbClr val="000000"/>
                   </a:solidFill>
@@ -4005,7 +4238,7 @@
             </a:ln>
             <a:extLst>
               <a:ext uri="{91240B29-F687-4f45-9708-019B960494DF}">
-                <a14:hiddenLine xmlns="" xmlns:a14="http://schemas.microsoft.com/office/drawing/2010/main" w="9525">
+                <a14:hiddenLine xmlns:a14="http://schemas.microsoft.com/office/drawing/2010/main" xmlns="" w="9525">
                   <a:solidFill>
                     <a:srgbClr val="000000"/>
                   </a:solidFill>
@@ -4070,7 +4303,7 @@
             </a:ln>
             <a:extLst>
               <a:ext uri="{91240B29-F687-4f45-9708-019B960494DF}">
-                <a14:hiddenLine xmlns="" xmlns:a14="http://schemas.microsoft.com/office/drawing/2010/main" w="9525">
+                <a14:hiddenLine xmlns:a14="http://schemas.microsoft.com/office/drawing/2010/main" xmlns="" w="9525">
                   <a:solidFill>
                     <a:srgbClr val="000000"/>
                   </a:solidFill>
@@ -4160,7 +4393,7 @@
             </a:ln>
             <a:extLst>
               <a:ext uri="{91240B29-F687-4f45-9708-019B960494DF}">
-                <a14:hiddenLine xmlns="" xmlns:a14="http://schemas.microsoft.com/office/drawing/2010/main" w="9525">
+                <a14:hiddenLine xmlns:a14="http://schemas.microsoft.com/office/drawing/2010/main" xmlns="" w="9525">
                   <a:solidFill>
                     <a:srgbClr val="000000"/>
                   </a:solidFill>
@@ -4222,7 +4455,7 @@
             </a:ln>
             <a:extLst>
               <a:ext uri="{91240B29-F687-4f45-9708-019B960494DF}">
-                <a14:hiddenLine xmlns="" xmlns:a14="http://schemas.microsoft.com/office/drawing/2010/main" w="9525">
+                <a14:hiddenLine xmlns:a14="http://schemas.microsoft.com/office/drawing/2010/main" xmlns="" w="9525">
                   <a:solidFill>
                     <a:srgbClr val="000000"/>
                   </a:solidFill>
@@ -4312,7 +4545,7 @@
             </a:ln>
             <a:extLst>
               <a:ext uri="{91240B29-F687-4f45-9708-019B960494DF}">
-                <a14:hiddenLine xmlns="" xmlns:a14="http://schemas.microsoft.com/office/drawing/2010/main" w="9525">
+                <a14:hiddenLine xmlns:a14="http://schemas.microsoft.com/office/drawing/2010/main" xmlns="" w="9525">
                   <a:solidFill>
                     <a:srgbClr val="000000"/>
                   </a:solidFill>
@@ -4402,7 +4635,7 @@
             </a:ln>
             <a:extLst>
               <a:ext uri="{91240B29-F687-4f45-9708-019B960494DF}">
-                <a14:hiddenLine xmlns="" xmlns:a14="http://schemas.microsoft.com/office/drawing/2010/main" w="9525">
+                <a14:hiddenLine xmlns:a14="http://schemas.microsoft.com/office/drawing/2010/main" xmlns="" w="9525">
                   <a:solidFill>
                     <a:srgbClr val="000000"/>
                   </a:solidFill>
@@ -4467,7 +4700,7 @@
             </a:ln>
             <a:extLst>
               <a:ext uri="{91240B29-F687-4f45-9708-019B960494DF}">
-                <a14:hiddenLine xmlns="" xmlns:a14="http://schemas.microsoft.com/office/drawing/2010/main" w="9525">
+                <a14:hiddenLine xmlns:a14="http://schemas.microsoft.com/office/drawing/2010/main" xmlns="" w="9525">
                   <a:solidFill>
                     <a:srgbClr val="000000"/>
                   </a:solidFill>
@@ -4529,7 +4762,7 @@
             </a:ln>
             <a:extLst>
               <a:ext uri="{91240B29-F687-4f45-9708-019B960494DF}">
-                <a14:hiddenLine xmlns="" xmlns:a14="http://schemas.microsoft.com/office/drawing/2010/main" w="9525">
+                <a14:hiddenLine xmlns:a14="http://schemas.microsoft.com/office/drawing/2010/main" xmlns="" w="9525">
                   <a:solidFill>
                     <a:srgbClr val="000000"/>
                   </a:solidFill>
@@ -4619,7 +4852,7 @@
             </a:ln>
             <a:extLst>
               <a:ext uri="{91240B29-F687-4f45-9708-019B960494DF}">
-                <a14:hiddenLine xmlns="" xmlns:a14="http://schemas.microsoft.com/office/drawing/2010/main" w="9525">
+                <a14:hiddenLine xmlns:a14="http://schemas.microsoft.com/office/drawing/2010/main" xmlns="" w="9525">
                   <a:solidFill>
                     <a:srgbClr val="000000"/>
                   </a:solidFill>
@@ -4709,7 +4942,7 @@
             </a:ln>
             <a:extLst>
               <a:ext uri="{91240B29-F687-4f45-9708-019B960494DF}">
-                <a14:hiddenLine xmlns="" xmlns:a14="http://schemas.microsoft.com/office/drawing/2010/main" w="9525">
+                <a14:hiddenLine xmlns:a14="http://schemas.microsoft.com/office/drawing/2010/main" xmlns="" w="9525">
                   <a:solidFill>
                     <a:srgbClr val="000000"/>
                   </a:solidFill>
@@ -4771,7 +5004,7 @@
             </a:ln>
             <a:extLst>
               <a:ext uri="{91240B29-F687-4f45-9708-019B960494DF}">
-                <a14:hiddenLine xmlns="" xmlns:a14="http://schemas.microsoft.com/office/drawing/2010/main" w="9525">
+                <a14:hiddenLine xmlns:a14="http://schemas.microsoft.com/office/drawing/2010/main" xmlns="" w="9525">
                   <a:solidFill>
                     <a:srgbClr val="000000"/>
                   </a:solidFill>
@@ -4891,7 +5124,7 @@
             </a:ln>
             <a:extLst>
               <a:ext uri="{91240B29-F687-4f45-9708-019B960494DF}">
-                <a14:hiddenLine xmlns="" xmlns:a14="http://schemas.microsoft.com/office/drawing/2010/main" w="9525">
+                <a14:hiddenLine xmlns:a14="http://schemas.microsoft.com/office/drawing/2010/main" xmlns="" w="9525">
                   <a:solidFill>
                     <a:srgbClr val="000000"/>
                   </a:solidFill>
@@ -4959,7 +5192,7 @@
             </a:ln>
             <a:extLst>
               <a:ext uri="{91240B29-F687-4f45-9708-019B960494DF}">
-                <a14:hiddenLine xmlns="" xmlns:a14="http://schemas.microsoft.com/office/drawing/2010/main" w="9525">
+                <a14:hiddenLine xmlns:a14="http://schemas.microsoft.com/office/drawing/2010/main" xmlns="" w="9525">
                   <a:solidFill>
                     <a:srgbClr val="000000"/>
                   </a:solidFill>
@@ -5049,7 +5282,7 @@
             </a:ln>
             <a:extLst>
               <a:ext uri="{91240B29-F687-4f45-9708-019B960494DF}">
-                <a14:hiddenLine xmlns="" xmlns:a14="http://schemas.microsoft.com/office/drawing/2010/main" w="9525">
+                <a14:hiddenLine xmlns:a14="http://schemas.microsoft.com/office/drawing/2010/main" xmlns="" w="9525">
                   <a:solidFill>
                     <a:srgbClr val="000000"/>
                   </a:solidFill>
@@ -5189,7 +5422,7 @@
           <a:p>
             <a:fld id="{48A87A34-81AB-432B-8DAE-1953F412C126}" type="datetimeFigureOut">
               <a:rPr lang="en-US" smtClean="0"/>
-              <a:t>12/5/2018</a:t>
+              <a:t>12/6/2018</a:t>
             </a:fld>
             <a:endParaRPr lang="en-US" dirty="0"/>
           </a:p>
@@ -5457,7 +5690,7 @@
             <a:fld id="{48A87A34-81AB-432B-8DAE-1953F412C126}" type="datetimeFigureOut">
               <a:rPr lang="en-US" smtClean="0"/>
               <a:pPr/>
-              <a:t>12/5/2018</a:t>
+              <a:t>12/6/2018</a:t>
             </a:fld>
             <a:endParaRPr lang="en-US" dirty="0"/>
           </a:p>
@@ -5655,7 +5888,7 @@
             <a:fld id="{48A87A34-81AB-432B-8DAE-1953F412C126}" type="datetimeFigureOut">
               <a:rPr lang="en-US" smtClean="0"/>
               <a:pPr/>
-              <a:t>12/5/2018</a:t>
+              <a:t>12/6/2018</a:t>
             </a:fld>
             <a:endParaRPr lang="en-US" dirty="0"/>
           </a:p>
@@ -5920,7 +6153,7 @@
             <a:fld id="{48A87A34-81AB-432B-8DAE-1953F412C126}" type="datetimeFigureOut">
               <a:rPr lang="en-US" smtClean="0"/>
               <a:pPr/>
-              <a:t>12/5/2018</a:t>
+              <a:t>12/6/2018</a:t>
             </a:fld>
             <a:endParaRPr lang="en-US" dirty="0"/>
           </a:p>
@@ -6356,7 +6589,7 @@
             <a:fld id="{48A87A34-81AB-432B-8DAE-1953F412C126}" type="datetimeFigureOut">
               <a:rPr lang="en-US" smtClean="0"/>
               <a:pPr/>
-              <a:t>12/5/2018</a:t>
+              <a:t>12/6/2018</a:t>
             </a:fld>
             <a:endParaRPr lang="en-US" dirty="0"/>
           </a:p>
@@ -6904,7 +7137,7 @@
             <a:fld id="{48A87A34-81AB-432B-8DAE-1953F412C126}" type="datetimeFigureOut">
               <a:rPr lang="en-US" smtClean="0"/>
               <a:pPr/>
-              <a:t>12/5/2018</a:t>
+              <a:t>12/6/2018</a:t>
             </a:fld>
             <a:endParaRPr lang="en-US" dirty="0"/>
           </a:p>
@@ -7626,7 +7859,7 @@
             <a:fld id="{48A87A34-81AB-432B-8DAE-1953F412C126}" type="datetimeFigureOut">
               <a:rPr lang="en-US" smtClean="0"/>
               <a:pPr/>
-              <a:t>12/5/2018</a:t>
+              <a:t>12/6/2018</a:t>
             </a:fld>
             <a:endParaRPr lang="en-US" dirty="0"/>
           </a:p>
@@ -7797,7 +8030,7 @@
           <a:p>
             <a:fld id="{48A87A34-81AB-432B-8DAE-1953F412C126}" type="datetimeFigureOut">
               <a:rPr lang="en-US" smtClean="0"/>
-              <a:t>12/5/2018</a:t>
+              <a:t>12/6/2018</a:t>
             </a:fld>
             <a:endParaRPr lang="en-US" dirty="0"/>
           </a:p>
@@ -7978,7 +8211,7 @@
             <a:fld id="{48A87A34-81AB-432B-8DAE-1953F412C126}" type="datetimeFigureOut">
               <a:rPr lang="en-US" smtClean="0"/>
               <a:pPr/>
-              <a:t>12/5/2018</a:t>
+              <a:t>12/6/2018</a:t>
             </a:fld>
             <a:endParaRPr lang="en-US" dirty="0"/>
           </a:p>
@@ -8148,7 +8381,7 @@
           <a:p>
             <a:fld id="{48A87A34-81AB-432B-8DAE-1953F412C126}" type="datetimeFigureOut">
               <a:rPr lang="en-US" smtClean="0"/>
-              <a:t>12/5/2018</a:t>
+              <a:t>12/6/2018</a:t>
             </a:fld>
             <a:endParaRPr lang="en-US" dirty="0"/>
           </a:p>
@@ -8399,7 +8632,7 @@
             <a:fld id="{48A87A34-81AB-432B-8DAE-1953F412C126}" type="datetimeFigureOut">
               <a:rPr lang="en-US" smtClean="0"/>
               <a:pPr/>
-              <a:t>12/5/2018</a:t>
+              <a:t>12/6/2018</a:t>
             </a:fld>
             <a:endParaRPr lang="en-US" dirty="0"/>
           </a:p>
@@ -8631,7 +8864,7 @@
           <a:p>
             <a:fld id="{48A87A34-81AB-432B-8DAE-1953F412C126}" type="datetimeFigureOut">
               <a:rPr lang="en-US" smtClean="0"/>
-              <a:t>12/5/2018</a:t>
+              <a:t>12/6/2018</a:t>
             </a:fld>
             <a:endParaRPr lang="en-US" dirty="0"/>
           </a:p>
@@ -9012,7 +9245,7 @@
           <a:p>
             <a:fld id="{48A87A34-81AB-432B-8DAE-1953F412C126}" type="datetimeFigureOut">
               <a:rPr lang="en-US" smtClean="0"/>
-              <a:t>12/5/2018</a:t>
+              <a:t>12/6/2018</a:t>
             </a:fld>
             <a:endParaRPr lang="en-US" dirty="0"/>
           </a:p>
@@ -9130,7 +9363,7 @@
           <a:p>
             <a:fld id="{48A87A34-81AB-432B-8DAE-1953F412C126}" type="datetimeFigureOut">
               <a:rPr lang="en-US" smtClean="0"/>
-              <a:t>12/5/2018</a:t>
+              <a:t>12/6/2018</a:t>
             </a:fld>
             <a:endParaRPr lang="en-US" dirty="0"/>
           </a:p>
@@ -9225,7 +9458,7 @@
           <a:p>
             <a:fld id="{48A87A34-81AB-432B-8DAE-1953F412C126}" type="datetimeFigureOut">
               <a:rPr lang="en-US" smtClean="0"/>
-              <a:t>12/5/2018</a:t>
+              <a:t>12/6/2018</a:t>
             </a:fld>
             <a:endParaRPr lang="en-US" dirty="0"/>
           </a:p>
@@ -9474,7 +9707,7 @@
           <a:p>
             <a:fld id="{48A87A34-81AB-432B-8DAE-1953F412C126}" type="datetimeFigureOut">
               <a:rPr lang="en-US" smtClean="0"/>
-              <a:t>12/5/2018</a:t>
+              <a:t>12/6/2018</a:t>
             </a:fld>
             <a:endParaRPr lang="en-US" dirty="0"/>
           </a:p>
@@ -9754,7 +9987,7 @@
           <a:p>
             <a:fld id="{48A87A34-81AB-432B-8DAE-1953F412C126}" type="datetimeFigureOut">
               <a:rPr lang="en-US" smtClean="0"/>
-              <a:t>12/5/2018</a:t>
+              <a:t>12/6/2018</a:t>
             </a:fld>
             <a:endParaRPr lang="en-US" dirty="0"/>
           </a:p>
@@ -9870,7 +10103,7 @@
           <a:noFill/>
           <a:extLst>
             <a:ext uri="{909E8E84-426E-40dd-AFC4-6F175D3DCCD1}">
-              <a14:hiddenFill xmlns="" xmlns:a14="http://schemas.microsoft.com/office/drawing/2010/main">
+              <a14:hiddenFill xmlns:a14="http://schemas.microsoft.com/office/drawing/2010/main" xmlns="">
                 <a:solidFill>
                   <a:srgbClr val="FFFFFF"/>
                 </a:solidFill>
@@ -9944,7 +10177,7 @@
               </a:ln>
               <a:extLst>
                 <a:ext uri="{91240B29-F687-4f45-9708-019B960494DF}">
-                  <a14:hiddenLine xmlns="" xmlns:a14="http://schemas.microsoft.com/office/drawing/2010/main" w="9525">
+                  <a14:hiddenLine xmlns:a14="http://schemas.microsoft.com/office/drawing/2010/main" xmlns="" w="9525">
                     <a:solidFill>
                       <a:srgbClr val="000000"/>
                     </a:solidFill>
@@ -10034,7 +10267,7 @@
               </a:ln>
               <a:extLst>
                 <a:ext uri="{91240B29-F687-4f45-9708-019B960494DF}">
-                  <a14:hiddenLine xmlns="" xmlns:a14="http://schemas.microsoft.com/office/drawing/2010/main" w="9525">
+                  <a14:hiddenLine xmlns:a14="http://schemas.microsoft.com/office/drawing/2010/main" xmlns="" w="9525">
                     <a:solidFill>
                       <a:srgbClr val="000000"/>
                     </a:solidFill>
@@ -10124,7 +10357,7 @@
               </a:ln>
               <a:extLst>
                 <a:ext uri="{91240B29-F687-4f45-9708-019B960494DF}">
-                  <a14:hiddenLine xmlns="" xmlns:a14="http://schemas.microsoft.com/office/drawing/2010/main" w="9525">
+                  <a14:hiddenLine xmlns:a14="http://schemas.microsoft.com/office/drawing/2010/main" xmlns="" w="9525">
                     <a:solidFill>
                       <a:srgbClr val="000000"/>
                     </a:solidFill>
@@ -10186,7 +10419,7 @@
               </a:ln>
               <a:extLst>
                 <a:ext uri="{91240B29-F687-4f45-9708-019B960494DF}">
-                  <a14:hiddenLine xmlns="" xmlns:a14="http://schemas.microsoft.com/office/drawing/2010/main" w="9525">
+                  <a14:hiddenLine xmlns:a14="http://schemas.microsoft.com/office/drawing/2010/main" xmlns="" w="9525">
                     <a:solidFill>
                       <a:srgbClr val="000000"/>
                     </a:solidFill>
@@ -10276,7 +10509,7 @@
               </a:ln>
               <a:extLst>
                 <a:ext uri="{91240B29-F687-4f45-9708-019B960494DF}">
-                  <a14:hiddenLine xmlns="" xmlns:a14="http://schemas.microsoft.com/office/drawing/2010/main" w="9525">
+                  <a14:hiddenLine xmlns:a14="http://schemas.microsoft.com/office/drawing/2010/main" xmlns="" w="9525">
                     <a:solidFill>
                       <a:srgbClr val="000000"/>
                     </a:solidFill>
@@ -10338,7 +10571,7 @@
               </a:ln>
               <a:extLst>
                 <a:ext uri="{91240B29-F687-4f45-9708-019B960494DF}">
-                  <a14:hiddenLine xmlns="" xmlns:a14="http://schemas.microsoft.com/office/drawing/2010/main" w="9525">
+                  <a14:hiddenLine xmlns:a14="http://schemas.microsoft.com/office/drawing/2010/main" xmlns="" w="9525">
                     <a:solidFill>
                       <a:srgbClr val="000000"/>
                     </a:solidFill>
@@ -10400,7 +10633,7 @@
               </a:ln>
               <a:extLst>
                 <a:ext uri="{91240B29-F687-4f45-9708-019B960494DF}">
-                  <a14:hiddenLine xmlns="" xmlns:a14="http://schemas.microsoft.com/office/drawing/2010/main" w="9525">
+                  <a14:hiddenLine xmlns:a14="http://schemas.microsoft.com/office/drawing/2010/main" xmlns="" w="9525">
                     <a:solidFill>
                       <a:srgbClr val="000000"/>
                     </a:solidFill>
@@ -10490,7 +10723,7 @@
               </a:ln>
               <a:extLst>
                 <a:ext uri="{91240B29-F687-4f45-9708-019B960494DF}">
-                  <a14:hiddenLine xmlns="" xmlns:a14="http://schemas.microsoft.com/office/drawing/2010/main" w="9525">
+                  <a14:hiddenLine xmlns:a14="http://schemas.microsoft.com/office/drawing/2010/main" xmlns="" w="9525">
                     <a:solidFill>
                       <a:srgbClr val="000000"/>
                     </a:solidFill>
@@ -10580,7 +10813,7 @@
               </a:ln>
               <a:extLst>
                 <a:ext uri="{91240B29-F687-4f45-9708-019B960494DF}">
-                  <a14:hiddenLine xmlns="" xmlns:a14="http://schemas.microsoft.com/office/drawing/2010/main" w="9525">
+                  <a14:hiddenLine xmlns:a14="http://schemas.microsoft.com/office/drawing/2010/main" xmlns="" w="9525">
                     <a:solidFill>
                       <a:srgbClr val="000000"/>
                     </a:solidFill>
@@ -10642,7 +10875,7 @@
               </a:ln>
               <a:extLst>
                 <a:ext uri="{91240B29-F687-4f45-9708-019B960494DF}">
-                  <a14:hiddenLine xmlns="" xmlns:a14="http://schemas.microsoft.com/office/drawing/2010/main" w="9525">
+                  <a14:hiddenLine xmlns:a14="http://schemas.microsoft.com/office/drawing/2010/main" xmlns="" w="9525">
                     <a:solidFill>
                       <a:srgbClr val="000000"/>
                     </a:solidFill>
@@ -10752,7 +10985,7 @@
               </a:ln>
               <a:extLst>
                 <a:ext uri="{91240B29-F687-4f45-9708-019B960494DF}">
-                  <a14:hiddenLine xmlns="" xmlns:a14="http://schemas.microsoft.com/office/drawing/2010/main" w="9525">
+                  <a14:hiddenLine xmlns:a14="http://schemas.microsoft.com/office/drawing/2010/main" xmlns="" w="9525">
                     <a:solidFill>
                       <a:srgbClr val="000000"/>
                     </a:solidFill>
@@ -10836,7 +11069,7 @@
               </a:ln>
               <a:extLst>
                 <a:ext uri="{91240B29-F687-4f45-9708-019B960494DF}">
-                  <a14:hiddenLine xmlns="" xmlns:a14="http://schemas.microsoft.com/office/drawing/2010/main" w="9525">
+                  <a14:hiddenLine xmlns:a14="http://schemas.microsoft.com/office/drawing/2010/main" xmlns="" w="9525">
                     <a:solidFill>
                       <a:srgbClr val="000000"/>
                     </a:solidFill>
@@ -10898,7 +11131,7 @@
               </a:ln>
               <a:extLst>
                 <a:ext uri="{91240B29-F687-4f45-9708-019B960494DF}">
-                  <a14:hiddenLine xmlns="" xmlns:a14="http://schemas.microsoft.com/office/drawing/2010/main" w="9525">
+                  <a14:hiddenLine xmlns:a14="http://schemas.microsoft.com/office/drawing/2010/main" xmlns="" w="9525">
                     <a:solidFill>
                       <a:srgbClr val="000000"/>
                     </a:solidFill>
@@ -10960,7 +11193,7 @@
               </a:ln>
               <a:extLst>
                 <a:ext uri="{91240B29-F687-4f45-9708-019B960494DF}">
-                  <a14:hiddenLine xmlns="" xmlns:a14="http://schemas.microsoft.com/office/drawing/2010/main" w="9525">
+                  <a14:hiddenLine xmlns:a14="http://schemas.microsoft.com/office/drawing/2010/main" xmlns="" w="9525">
                     <a:solidFill>
                       <a:srgbClr val="000000"/>
                     </a:solidFill>
@@ -11050,7 +11283,7 @@
               </a:ln>
               <a:extLst>
                 <a:ext uri="{91240B29-F687-4f45-9708-019B960494DF}">
-                  <a14:hiddenLine xmlns="" xmlns:a14="http://schemas.microsoft.com/office/drawing/2010/main" w="9525">
+                  <a14:hiddenLine xmlns:a14="http://schemas.microsoft.com/office/drawing/2010/main" xmlns="" w="9525">
                     <a:solidFill>
                       <a:srgbClr val="000000"/>
                     </a:solidFill>
@@ -11084,7 +11317,7 @@
               </a:ln>
               <a:extLst>
                 <a:ext uri="{91240B29-F687-4f45-9708-019B960494DF}">
-                  <a14:hiddenLine xmlns="" xmlns:a14="http://schemas.microsoft.com/office/drawing/2010/main" w="9525">
+                  <a14:hiddenLine xmlns:a14="http://schemas.microsoft.com/office/drawing/2010/main" xmlns="" w="9525">
                     <a:solidFill>
                       <a:srgbClr val="000000"/>
                     </a:solidFill>
@@ -11149,7 +11382,7 @@
               </a:ln>
               <a:extLst>
                 <a:ext uri="{91240B29-F687-4f45-9708-019B960494DF}">
-                  <a14:hiddenLine xmlns="" xmlns:a14="http://schemas.microsoft.com/office/drawing/2010/main" w="9525">
+                  <a14:hiddenLine xmlns:a14="http://schemas.microsoft.com/office/drawing/2010/main" xmlns="" w="9525">
                     <a:solidFill>
                       <a:srgbClr val="000000"/>
                     </a:solidFill>
@@ -11239,7 +11472,7 @@
               </a:ln>
               <a:extLst>
                 <a:ext uri="{91240B29-F687-4f45-9708-019B960494DF}">
-                  <a14:hiddenLine xmlns="" xmlns:a14="http://schemas.microsoft.com/office/drawing/2010/main" w="9525">
+                  <a14:hiddenLine xmlns:a14="http://schemas.microsoft.com/office/drawing/2010/main" xmlns="" w="9525">
                     <a:solidFill>
                       <a:srgbClr val="000000"/>
                     </a:solidFill>
@@ -11301,7 +11534,7 @@
               </a:ln>
               <a:extLst>
                 <a:ext uri="{91240B29-F687-4f45-9708-019B960494DF}">
-                  <a14:hiddenLine xmlns="" xmlns:a14="http://schemas.microsoft.com/office/drawing/2010/main" w="9525">
+                  <a14:hiddenLine xmlns:a14="http://schemas.microsoft.com/office/drawing/2010/main" xmlns="" w="9525">
                     <a:solidFill>
                       <a:srgbClr val="000000"/>
                     </a:solidFill>
@@ -11391,7 +11624,7 @@
               </a:ln>
               <a:extLst>
                 <a:ext uri="{91240B29-F687-4f45-9708-019B960494DF}">
-                  <a14:hiddenLine xmlns="" xmlns:a14="http://schemas.microsoft.com/office/drawing/2010/main" w="9525">
+                  <a14:hiddenLine xmlns:a14="http://schemas.microsoft.com/office/drawing/2010/main" xmlns="" w="9525">
                     <a:solidFill>
                       <a:srgbClr val="000000"/>
                     </a:solidFill>
@@ -11456,7 +11689,7 @@
               </a:ln>
               <a:extLst>
                 <a:ext uri="{91240B29-F687-4f45-9708-019B960494DF}">
-                  <a14:hiddenLine xmlns="" xmlns:a14="http://schemas.microsoft.com/office/drawing/2010/main" w="9525">
+                  <a14:hiddenLine xmlns:a14="http://schemas.microsoft.com/office/drawing/2010/main" xmlns="" w="9525">
                     <a:solidFill>
                       <a:srgbClr val="000000"/>
                     </a:solidFill>
@@ -11518,7 +11751,7 @@
               </a:ln>
               <a:extLst>
                 <a:ext uri="{91240B29-F687-4f45-9708-019B960494DF}">
-                  <a14:hiddenLine xmlns="" xmlns:a14="http://schemas.microsoft.com/office/drawing/2010/main" w="9525">
+                  <a14:hiddenLine xmlns:a14="http://schemas.microsoft.com/office/drawing/2010/main" xmlns="" w="9525">
                     <a:solidFill>
                       <a:srgbClr val="000000"/>
                     </a:solidFill>
@@ -11608,7 +11841,7 @@
               </a:ln>
               <a:extLst>
                 <a:ext uri="{91240B29-F687-4f45-9708-019B960494DF}">
-                  <a14:hiddenLine xmlns="" xmlns:a14="http://schemas.microsoft.com/office/drawing/2010/main" w="9525">
+                  <a14:hiddenLine xmlns:a14="http://schemas.microsoft.com/office/drawing/2010/main" xmlns="" w="9525">
                     <a:solidFill>
                       <a:srgbClr val="000000"/>
                     </a:solidFill>
@@ -11698,7 +11931,7 @@
               </a:ln>
               <a:extLst>
                 <a:ext uri="{91240B29-F687-4f45-9708-019B960494DF}">
-                  <a14:hiddenLine xmlns="" xmlns:a14="http://schemas.microsoft.com/office/drawing/2010/main" w="9525">
+                  <a14:hiddenLine xmlns:a14="http://schemas.microsoft.com/office/drawing/2010/main" xmlns="" w="9525">
                     <a:solidFill>
                       <a:srgbClr val="000000"/>
                     </a:solidFill>
@@ -11763,7 +11996,7 @@
               </a:ln>
               <a:extLst>
                 <a:ext uri="{91240B29-F687-4f45-9708-019B960494DF}">
-                  <a14:hiddenLine xmlns="" xmlns:a14="http://schemas.microsoft.com/office/drawing/2010/main" w="9525">
+                  <a14:hiddenLine xmlns:a14="http://schemas.microsoft.com/office/drawing/2010/main" xmlns="" w="9525">
                     <a:solidFill>
                       <a:srgbClr val="000000"/>
                     </a:solidFill>
@@ -11883,7 +12116,7 @@
               </a:ln>
               <a:extLst>
                 <a:ext uri="{91240B29-F687-4f45-9708-019B960494DF}">
-                  <a14:hiddenLine xmlns="" xmlns:a14="http://schemas.microsoft.com/office/drawing/2010/main" w="9525">
+                  <a14:hiddenLine xmlns:a14="http://schemas.microsoft.com/office/drawing/2010/main" xmlns="" w="9525">
                     <a:solidFill>
                       <a:srgbClr val="000000"/>
                     </a:solidFill>
@@ -11981,7 +12214,7 @@
               </a:ln>
               <a:extLst>
                 <a:ext uri="{91240B29-F687-4f45-9708-019B960494DF}">
-                  <a14:hiddenLine xmlns="" xmlns:a14="http://schemas.microsoft.com/office/drawing/2010/main" w="9525">
+                  <a14:hiddenLine xmlns:a14="http://schemas.microsoft.com/office/drawing/2010/main" xmlns="" w="9525">
                     <a:solidFill>
                       <a:srgbClr val="000000"/>
                     </a:solidFill>
@@ -12096,7 +12329,7 @@
               </a:ln>
               <a:extLst>
                 <a:ext uri="{91240B29-F687-4f45-9708-019B960494DF}">
-                  <a14:hiddenLine xmlns="" xmlns:a14="http://schemas.microsoft.com/office/drawing/2010/main" w="9525">
+                  <a14:hiddenLine xmlns:a14="http://schemas.microsoft.com/office/drawing/2010/main" xmlns="" w="9525">
                     <a:solidFill>
                       <a:srgbClr val="000000"/>
                     </a:solidFill>
@@ -12186,7 +12419,7 @@
               </a:ln>
               <a:extLst>
                 <a:ext uri="{91240B29-F687-4f45-9708-019B960494DF}">
-                  <a14:hiddenLine xmlns="" xmlns:a14="http://schemas.microsoft.com/office/drawing/2010/main" w="9525">
+                  <a14:hiddenLine xmlns:a14="http://schemas.microsoft.com/office/drawing/2010/main" xmlns="" w="9525">
                     <a:solidFill>
                       <a:srgbClr val="000000"/>
                     </a:solidFill>
@@ -12251,7 +12484,7 @@
               </a:ln>
               <a:extLst>
                 <a:ext uri="{91240B29-F687-4f45-9708-019B960494DF}">
-                  <a14:hiddenLine xmlns="" xmlns:a14="http://schemas.microsoft.com/office/drawing/2010/main" w="9525">
+                  <a14:hiddenLine xmlns:a14="http://schemas.microsoft.com/office/drawing/2010/main" xmlns="" w="9525">
                     <a:solidFill>
                       <a:srgbClr val="000000"/>
                     </a:solidFill>
@@ -12341,7 +12574,7 @@
               </a:ln>
               <a:extLst>
                 <a:ext uri="{91240B29-F687-4f45-9708-019B960494DF}">
-                  <a14:hiddenLine xmlns="" xmlns:a14="http://schemas.microsoft.com/office/drawing/2010/main" w="9525">
+                  <a14:hiddenLine xmlns:a14="http://schemas.microsoft.com/office/drawing/2010/main" xmlns="" w="9525">
                     <a:solidFill>
                       <a:srgbClr val="000000"/>
                     </a:solidFill>
@@ -12409,7 +12642,7 @@
               </a:ln>
               <a:extLst>
                 <a:ext uri="{91240B29-F687-4f45-9708-019B960494DF}">
-                  <a14:hiddenLine xmlns="" xmlns:a14="http://schemas.microsoft.com/office/drawing/2010/main" w="9525">
+                  <a14:hiddenLine xmlns:a14="http://schemas.microsoft.com/office/drawing/2010/main" xmlns="" w="9525">
                     <a:solidFill>
                       <a:srgbClr val="000000"/>
                     </a:solidFill>
@@ -12499,7 +12732,7 @@
               </a:ln>
               <a:extLst>
                 <a:ext uri="{91240B29-F687-4f45-9708-019B960494DF}">
-                  <a14:hiddenLine xmlns="" xmlns:a14="http://schemas.microsoft.com/office/drawing/2010/main" w="9525">
+                  <a14:hiddenLine xmlns:a14="http://schemas.microsoft.com/office/drawing/2010/main" xmlns="" w="9525">
                     <a:solidFill>
                       <a:srgbClr val="000000"/>
                     </a:solidFill>
@@ -12567,7 +12800,7 @@
               </a:ln>
               <a:extLst>
                 <a:ext uri="{91240B29-F687-4f45-9708-019B960494DF}">
-                  <a14:hiddenLine xmlns="" xmlns:a14="http://schemas.microsoft.com/office/drawing/2010/main" w="9525">
+                  <a14:hiddenLine xmlns:a14="http://schemas.microsoft.com/office/drawing/2010/main" xmlns="" w="9525">
                     <a:solidFill>
                       <a:srgbClr val="000000"/>
                     </a:solidFill>
@@ -12657,7 +12890,7 @@
               </a:ln>
               <a:extLst>
                 <a:ext uri="{91240B29-F687-4f45-9708-019B960494DF}">
-                  <a14:hiddenLine xmlns="" xmlns:a14="http://schemas.microsoft.com/office/drawing/2010/main" w="9525">
+                  <a14:hiddenLine xmlns:a14="http://schemas.microsoft.com/office/drawing/2010/main" xmlns="" w="9525">
                     <a:solidFill>
                       <a:srgbClr val="000000"/>
                     </a:solidFill>
@@ -12691,7 +12924,7 @@
               </a:ln>
               <a:extLst>
                 <a:ext uri="{91240B29-F687-4f45-9708-019B960494DF}">
-                  <a14:hiddenLine xmlns="" xmlns:a14="http://schemas.microsoft.com/office/drawing/2010/main" w="9525">
+                  <a14:hiddenLine xmlns:a14="http://schemas.microsoft.com/office/drawing/2010/main" xmlns="" w="9525">
                     <a:solidFill>
                       <a:srgbClr val="000000"/>
                     </a:solidFill>
@@ -12832,7 +13065,7 @@
             <a:fld id="{48A87A34-81AB-432B-8DAE-1953F412C126}" type="datetimeFigureOut">
               <a:rPr lang="en-US" smtClean="0"/>
               <a:pPr/>
-              <a:t>12/5/2018</a:t>
+              <a:t>12/6/2018</a:t>
             </a:fld>
             <a:endParaRPr lang="en-US" dirty="0"/>
           </a:p>
@@ -13439,7 +13672,7 @@
           <a:noFill/>
           <a:extLst>
             <a:ext uri="{909E8E84-426E-40dd-AFC4-6F175D3DCCD1}">
-              <a14:hiddenFill xmlns="" xmlns:a16="http://schemas.microsoft.com/office/drawing/2014/main" xmlns:p14="http://schemas.microsoft.com/office/powerpoint/2010/main" xmlns:a14="http://schemas.microsoft.com/office/drawing/2010/main">
+              <a14:hiddenFill xmlns:a14="http://schemas.microsoft.com/office/drawing/2010/main" xmlns:p14="http://schemas.microsoft.com/office/powerpoint/2010/main" xmlns:a16="http://schemas.microsoft.com/office/drawing/2014/main" xmlns="">
                 <a:solidFill>
                   <a:srgbClr val="FFFFFF"/>
                 </a:solidFill>
@@ -13560,7 +13793,7 @@
               </a:ln>
               <a:extLst>
                 <a:ext uri="{91240B29-F687-4f45-9708-019B960494DF}">
-                  <a14:hiddenLine xmlns="" xmlns:a16="http://schemas.microsoft.com/office/drawing/2014/main" xmlns:p14="http://schemas.microsoft.com/office/powerpoint/2010/main" xmlns:a14="http://schemas.microsoft.com/office/drawing/2010/main" w="9525">
+                  <a14:hiddenLine xmlns:a14="http://schemas.microsoft.com/office/drawing/2010/main" xmlns:p14="http://schemas.microsoft.com/office/powerpoint/2010/main" xmlns:a16="http://schemas.microsoft.com/office/drawing/2014/main" xmlns="" w="9525">
                     <a:solidFill>
                       <a:srgbClr val="000000"/>
                     </a:solidFill>
@@ -13665,7 +13898,7 @@
               </a:ln>
               <a:extLst>
                 <a:ext uri="{91240B29-F687-4f45-9708-019B960494DF}">
-                  <a14:hiddenLine xmlns="" xmlns:a16="http://schemas.microsoft.com/office/drawing/2014/main" xmlns:p14="http://schemas.microsoft.com/office/powerpoint/2010/main" xmlns:a14="http://schemas.microsoft.com/office/drawing/2010/main" w="9525">
+                  <a14:hiddenLine xmlns:a14="http://schemas.microsoft.com/office/drawing/2010/main" xmlns:p14="http://schemas.microsoft.com/office/powerpoint/2010/main" xmlns:a16="http://schemas.microsoft.com/office/drawing/2014/main" xmlns="" w="9525">
                     <a:solidFill>
                       <a:srgbClr val="000000"/>
                     </a:solidFill>
@@ -13770,7 +14003,7 @@
               </a:ln>
               <a:extLst>
                 <a:ext uri="{91240B29-F687-4f45-9708-019B960494DF}">
-                  <a14:hiddenLine xmlns="" xmlns:a16="http://schemas.microsoft.com/office/drawing/2014/main" xmlns:p14="http://schemas.microsoft.com/office/powerpoint/2010/main" xmlns:a14="http://schemas.microsoft.com/office/drawing/2010/main" w="9525">
+                  <a14:hiddenLine xmlns:a14="http://schemas.microsoft.com/office/drawing/2010/main" xmlns:p14="http://schemas.microsoft.com/office/powerpoint/2010/main" xmlns:a16="http://schemas.microsoft.com/office/drawing/2014/main" xmlns="" w="9525">
                     <a:solidFill>
                       <a:srgbClr val="000000"/>
                     </a:solidFill>
@@ -13847,7 +14080,7 @@
               </a:ln>
               <a:extLst>
                 <a:ext uri="{91240B29-F687-4f45-9708-019B960494DF}">
-                  <a14:hiddenLine xmlns="" xmlns:a16="http://schemas.microsoft.com/office/drawing/2014/main" xmlns:p14="http://schemas.microsoft.com/office/powerpoint/2010/main" xmlns:a14="http://schemas.microsoft.com/office/drawing/2010/main" w="9525">
+                  <a14:hiddenLine xmlns:a14="http://schemas.microsoft.com/office/drawing/2010/main" xmlns:p14="http://schemas.microsoft.com/office/powerpoint/2010/main" xmlns:a16="http://schemas.microsoft.com/office/drawing/2014/main" xmlns="" w="9525">
                     <a:solidFill>
                       <a:srgbClr val="000000"/>
                     </a:solidFill>
@@ -13952,7 +14185,7 @@
               </a:ln>
               <a:extLst>
                 <a:ext uri="{91240B29-F687-4f45-9708-019B960494DF}">
-                  <a14:hiddenLine xmlns="" xmlns:a16="http://schemas.microsoft.com/office/drawing/2014/main" xmlns:p14="http://schemas.microsoft.com/office/powerpoint/2010/main" xmlns:a14="http://schemas.microsoft.com/office/drawing/2010/main" w="9525">
+                  <a14:hiddenLine xmlns:a14="http://schemas.microsoft.com/office/drawing/2010/main" xmlns:p14="http://schemas.microsoft.com/office/powerpoint/2010/main" xmlns:a16="http://schemas.microsoft.com/office/drawing/2014/main" xmlns="" w="9525">
                     <a:solidFill>
                       <a:srgbClr val="000000"/>
                     </a:solidFill>
@@ -14029,7 +14262,7 @@
               </a:ln>
               <a:extLst>
                 <a:ext uri="{91240B29-F687-4f45-9708-019B960494DF}">
-                  <a14:hiddenLine xmlns="" xmlns:a16="http://schemas.microsoft.com/office/drawing/2014/main" xmlns:p14="http://schemas.microsoft.com/office/powerpoint/2010/main" xmlns:a14="http://schemas.microsoft.com/office/drawing/2010/main" w="9525">
+                  <a14:hiddenLine xmlns:a14="http://schemas.microsoft.com/office/drawing/2010/main" xmlns:p14="http://schemas.microsoft.com/office/powerpoint/2010/main" xmlns:a16="http://schemas.microsoft.com/office/drawing/2014/main" xmlns="" w="9525">
                     <a:solidFill>
                       <a:srgbClr val="000000"/>
                     </a:solidFill>
@@ -14106,7 +14339,7 @@
               </a:ln>
               <a:extLst>
                 <a:ext uri="{91240B29-F687-4f45-9708-019B960494DF}">
-                  <a14:hiddenLine xmlns="" xmlns:a16="http://schemas.microsoft.com/office/drawing/2014/main" xmlns:p14="http://schemas.microsoft.com/office/powerpoint/2010/main" xmlns:a14="http://schemas.microsoft.com/office/drawing/2010/main" w="9525">
+                  <a14:hiddenLine xmlns:a14="http://schemas.microsoft.com/office/drawing/2010/main" xmlns:p14="http://schemas.microsoft.com/office/powerpoint/2010/main" xmlns:a16="http://schemas.microsoft.com/office/drawing/2014/main" xmlns="" w="9525">
                     <a:solidFill>
                       <a:srgbClr val="000000"/>
                     </a:solidFill>
@@ -14211,7 +14444,7 @@
               </a:ln>
               <a:extLst>
                 <a:ext uri="{91240B29-F687-4f45-9708-019B960494DF}">
-                  <a14:hiddenLine xmlns="" xmlns:a16="http://schemas.microsoft.com/office/drawing/2014/main" xmlns:p14="http://schemas.microsoft.com/office/powerpoint/2010/main" xmlns:a14="http://schemas.microsoft.com/office/drawing/2010/main" w="9525">
+                  <a14:hiddenLine xmlns:a14="http://schemas.microsoft.com/office/drawing/2010/main" xmlns:p14="http://schemas.microsoft.com/office/powerpoint/2010/main" xmlns:a16="http://schemas.microsoft.com/office/drawing/2014/main" xmlns="" w="9525">
                     <a:solidFill>
                       <a:srgbClr val="000000"/>
                     </a:solidFill>
@@ -14316,7 +14549,7 @@
               </a:ln>
               <a:extLst>
                 <a:ext uri="{91240B29-F687-4f45-9708-019B960494DF}">
-                  <a14:hiddenLine xmlns="" xmlns:a16="http://schemas.microsoft.com/office/drawing/2014/main" xmlns:p14="http://schemas.microsoft.com/office/powerpoint/2010/main" xmlns:a14="http://schemas.microsoft.com/office/drawing/2010/main" w="9525">
+                  <a14:hiddenLine xmlns:a14="http://schemas.microsoft.com/office/drawing/2010/main" xmlns:p14="http://schemas.microsoft.com/office/powerpoint/2010/main" xmlns:a16="http://schemas.microsoft.com/office/drawing/2014/main" xmlns="" w="9525">
                     <a:solidFill>
                       <a:srgbClr val="000000"/>
                     </a:solidFill>
@@ -14393,7 +14626,7 @@
               </a:ln>
               <a:extLst>
                 <a:ext uri="{91240B29-F687-4f45-9708-019B960494DF}">
-                  <a14:hiddenLine xmlns="" xmlns:a16="http://schemas.microsoft.com/office/drawing/2014/main" xmlns:p14="http://schemas.microsoft.com/office/powerpoint/2010/main" xmlns:a14="http://schemas.microsoft.com/office/drawing/2010/main" w="9525">
+                  <a14:hiddenLine xmlns:a14="http://schemas.microsoft.com/office/drawing/2010/main" xmlns:p14="http://schemas.microsoft.com/office/powerpoint/2010/main" xmlns:a16="http://schemas.microsoft.com/office/drawing/2014/main" xmlns="" w="9525">
                     <a:solidFill>
                       <a:srgbClr val="000000"/>
                     </a:solidFill>
@@ -14518,7 +14751,7 @@
               </a:ln>
               <a:extLst>
                 <a:ext uri="{91240B29-F687-4f45-9708-019B960494DF}">
-                  <a14:hiddenLine xmlns="" xmlns:a16="http://schemas.microsoft.com/office/drawing/2014/main" xmlns:p14="http://schemas.microsoft.com/office/powerpoint/2010/main" xmlns:a14="http://schemas.microsoft.com/office/drawing/2010/main" w="9525">
+                  <a14:hiddenLine xmlns:a14="http://schemas.microsoft.com/office/drawing/2010/main" xmlns:p14="http://schemas.microsoft.com/office/powerpoint/2010/main" xmlns:a16="http://schemas.microsoft.com/office/drawing/2014/main" xmlns="" w="9525">
                     <a:solidFill>
                       <a:srgbClr val="000000"/>
                     </a:solidFill>
@@ -14632,7 +14865,7 @@
               </a:ln>
               <a:extLst>
                 <a:ext uri="{91240B29-F687-4f45-9708-019B960494DF}">
-                  <a14:hiddenLine xmlns="" xmlns:a16="http://schemas.microsoft.com/office/drawing/2014/main" xmlns:p14="http://schemas.microsoft.com/office/powerpoint/2010/main" xmlns:a14="http://schemas.microsoft.com/office/drawing/2010/main" w="9525">
+                  <a14:hiddenLine xmlns:a14="http://schemas.microsoft.com/office/drawing/2010/main" xmlns:p14="http://schemas.microsoft.com/office/powerpoint/2010/main" xmlns:a16="http://schemas.microsoft.com/office/drawing/2014/main" xmlns="" w="9525">
                     <a:solidFill>
                       <a:srgbClr val="000000"/>
                     </a:solidFill>
@@ -14709,7 +14942,7 @@
               </a:ln>
               <a:extLst>
                 <a:ext uri="{91240B29-F687-4f45-9708-019B960494DF}">
-                  <a14:hiddenLine xmlns="" xmlns:a16="http://schemas.microsoft.com/office/drawing/2014/main" xmlns:p14="http://schemas.microsoft.com/office/powerpoint/2010/main" xmlns:a14="http://schemas.microsoft.com/office/drawing/2010/main" w="9525">
+                  <a14:hiddenLine xmlns:a14="http://schemas.microsoft.com/office/drawing/2010/main" xmlns:p14="http://schemas.microsoft.com/office/powerpoint/2010/main" xmlns:a16="http://schemas.microsoft.com/office/drawing/2014/main" xmlns="" w="9525">
                     <a:solidFill>
                       <a:srgbClr val="000000"/>
                     </a:solidFill>
@@ -14786,7 +15019,7 @@
               </a:ln>
               <a:extLst>
                 <a:ext uri="{91240B29-F687-4f45-9708-019B960494DF}">
-                  <a14:hiddenLine xmlns="" xmlns:a16="http://schemas.microsoft.com/office/drawing/2014/main" xmlns:p14="http://schemas.microsoft.com/office/powerpoint/2010/main" xmlns:a14="http://schemas.microsoft.com/office/drawing/2010/main" w="9525">
+                  <a14:hiddenLine xmlns:a14="http://schemas.microsoft.com/office/drawing/2010/main" xmlns:p14="http://schemas.microsoft.com/office/powerpoint/2010/main" xmlns:a16="http://schemas.microsoft.com/office/drawing/2014/main" xmlns="" w="9525">
                     <a:solidFill>
                       <a:srgbClr val="000000"/>
                     </a:solidFill>
@@ -14891,7 +15124,7 @@
               </a:ln>
               <a:extLst>
                 <a:ext uri="{91240B29-F687-4f45-9708-019B960494DF}">
-                  <a14:hiddenLine xmlns="" xmlns:a16="http://schemas.microsoft.com/office/drawing/2014/main" xmlns:p14="http://schemas.microsoft.com/office/powerpoint/2010/main" xmlns:a14="http://schemas.microsoft.com/office/drawing/2010/main" w="9525">
+                  <a14:hiddenLine xmlns:a14="http://schemas.microsoft.com/office/drawing/2010/main" xmlns:p14="http://schemas.microsoft.com/office/powerpoint/2010/main" xmlns:a16="http://schemas.microsoft.com/office/drawing/2014/main" xmlns="" w="9525">
                     <a:solidFill>
                       <a:srgbClr val="000000"/>
                     </a:solidFill>
@@ -14940,7 +15173,7 @@
               </a:ln>
               <a:extLst>
                 <a:ext uri="{91240B29-F687-4f45-9708-019B960494DF}">
-                  <a14:hiddenLine xmlns="" xmlns:a16="http://schemas.microsoft.com/office/drawing/2014/main" xmlns:p14="http://schemas.microsoft.com/office/powerpoint/2010/main" xmlns:a14="http://schemas.microsoft.com/office/drawing/2010/main" w="9525">
+                  <a14:hiddenLine xmlns:a14="http://schemas.microsoft.com/office/drawing/2010/main" xmlns:p14="http://schemas.microsoft.com/office/powerpoint/2010/main" xmlns:a16="http://schemas.microsoft.com/office/drawing/2014/main" xmlns="" w="9525">
                     <a:solidFill>
                       <a:srgbClr val="000000"/>
                     </a:solidFill>
@@ -15020,7 +15253,7 @@
               </a:ln>
               <a:extLst>
                 <a:ext uri="{91240B29-F687-4f45-9708-019B960494DF}">
-                  <a14:hiddenLine xmlns="" xmlns:a16="http://schemas.microsoft.com/office/drawing/2014/main" xmlns:p14="http://schemas.microsoft.com/office/powerpoint/2010/main" xmlns:a14="http://schemas.microsoft.com/office/drawing/2010/main" w="9525">
+                  <a14:hiddenLine xmlns:a14="http://schemas.microsoft.com/office/drawing/2010/main" xmlns:p14="http://schemas.microsoft.com/office/powerpoint/2010/main" xmlns:a16="http://schemas.microsoft.com/office/drawing/2014/main" xmlns="" w="9525">
                     <a:solidFill>
                       <a:srgbClr val="000000"/>
                     </a:solidFill>
@@ -15125,7 +15358,7 @@
               </a:ln>
               <a:extLst>
                 <a:ext uri="{91240B29-F687-4f45-9708-019B960494DF}">
-                  <a14:hiddenLine xmlns="" xmlns:a16="http://schemas.microsoft.com/office/drawing/2014/main" xmlns:p14="http://schemas.microsoft.com/office/powerpoint/2010/main" xmlns:a14="http://schemas.microsoft.com/office/drawing/2010/main" w="9525">
+                  <a14:hiddenLine xmlns:a14="http://schemas.microsoft.com/office/drawing/2010/main" xmlns:p14="http://schemas.microsoft.com/office/powerpoint/2010/main" xmlns:a16="http://schemas.microsoft.com/office/drawing/2014/main" xmlns="" w="9525">
                     <a:solidFill>
                       <a:srgbClr val="000000"/>
                     </a:solidFill>
@@ -15202,7 +15435,7 @@
               </a:ln>
               <a:extLst>
                 <a:ext uri="{91240B29-F687-4f45-9708-019B960494DF}">
-                  <a14:hiddenLine xmlns="" xmlns:a16="http://schemas.microsoft.com/office/drawing/2014/main" xmlns:p14="http://schemas.microsoft.com/office/powerpoint/2010/main" xmlns:a14="http://schemas.microsoft.com/office/drawing/2010/main" w="9525">
+                  <a14:hiddenLine xmlns:a14="http://schemas.microsoft.com/office/drawing/2010/main" xmlns:p14="http://schemas.microsoft.com/office/powerpoint/2010/main" xmlns:a16="http://schemas.microsoft.com/office/drawing/2014/main" xmlns="" w="9525">
                     <a:solidFill>
                       <a:srgbClr val="000000"/>
                     </a:solidFill>
@@ -15307,7 +15540,7 @@
               </a:ln>
               <a:extLst>
                 <a:ext uri="{91240B29-F687-4f45-9708-019B960494DF}">
-                  <a14:hiddenLine xmlns="" xmlns:a16="http://schemas.microsoft.com/office/drawing/2014/main" xmlns:p14="http://schemas.microsoft.com/office/powerpoint/2010/main" xmlns:a14="http://schemas.microsoft.com/office/drawing/2010/main" w="9525">
+                  <a14:hiddenLine xmlns:a14="http://schemas.microsoft.com/office/drawing/2010/main" xmlns:p14="http://schemas.microsoft.com/office/powerpoint/2010/main" xmlns:a16="http://schemas.microsoft.com/office/drawing/2014/main" xmlns="" w="9525">
                     <a:solidFill>
                       <a:srgbClr val="000000"/>
                     </a:solidFill>
@@ -15387,7 +15620,7 @@
               </a:ln>
               <a:extLst>
                 <a:ext uri="{91240B29-F687-4f45-9708-019B960494DF}">
-                  <a14:hiddenLine xmlns="" xmlns:a16="http://schemas.microsoft.com/office/drawing/2014/main" xmlns:p14="http://schemas.microsoft.com/office/powerpoint/2010/main" xmlns:a14="http://schemas.microsoft.com/office/drawing/2010/main" w="9525">
+                  <a14:hiddenLine xmlns:a14="http://schemas.microsoft.com/office/drawing/2010/main" xmlns:p14="http://schemas.microsoft.com/office/powerpoint/2010/main" xmlns:a16="http://schemas.microsoft.com/office/drawing/2014/main" xmlns="" w="9525">
                     <a:solidFill>
                       <a:srgbClr val="000000"/>
                     </a:solidFill>
@@ -15464,7 +15697,7 @@
               </a:ln>
               <a:extLst>
                 <a:ext uri="{91240B29-F687-4f45-9708-019B960494DF}">
-                  <a14:hiddenLine xmlns="" xmlns:a16="http://schemas.microsoft.com/office/drawing/2014/main" xmlns:p14="http://schemas.microsoft.com/office/powerpoint/2010/main" xmlns:a14="http://schemas.microsoft.com/office/drawing/2010/main" w="9525">
+                  <a14:hiddenLine xmlns:a14="http://schemas.microsoft.com/office/drawing/2010/main" xmlns:p14="http://schemas.microsoft.com/office/powerpoint/2010/main" xmlns:a16="http://schemas.microsoft.com/office/drawing/2014/main" xmlns="" w="9525">
                     <a:solidFill>
                       <a:srgbClr val="000000"/>
                     </a:solidFill>
@@ -15569,7 +15802,7 @@
               </a:ln>
               <a:extLst>
                 <a:ext uri="{91240B29-F687-4f45-9708-019B960494DF}">
-                  <a14:hiddenLine xmlns="" xmlns:a16="http://schemas.microsoft.com/office/drawing/2014/main" xmlns:p14="http://schemas.microsoft.com/office/powerpoint/2010/main" xmlns:a14="http://schemas.microsoft.com/office/drawing/2010/main" w="9525">
+                  <a14:hiddenLine xmlns:a14="http://schemas.microsoft.com/office/drawing/2010/main" xmlns:p14="http://schemas.microsoft.com/office/powerpoint/2010/main" xmlns:a16="http://schemas.microsoft.com/office/drawing/2014/main" xmlns="" w="9525">
                     <a:solidFill>
                       <a:srgbClr val="000000"/>
                     </a:solidFill>
@@ -15674,7 +15907,7 @@
               </a:ln>
               <a:extLst>
                 <a:ext uri="{91240B29-F687-4f45-9708-019B960494DF}">
-                  <a14:hiddenLine xmlns="" xmlns:a16="http://schemas.microsoft.com/office/drawing/2014/main" xmlns:p14="http://schemas.microsoft.com/office/powerpoint/2010/main" xmlns:a14="http://schemas.microsoft.com/office/drawing/2010/main" w="9525">
+                  <a14:hiddenLine xmlns:a14="http://schemas.microsoft.com/office/drawing/2010/main" xmlns:p14="http://schemas.microsoft.com/office/powerpoint/2010/main" xmlns:a16="http://schemas.microsoft.com/office/drawing/2014/main" xmlns="" w="9525">
                     <a:solidFill>
                       <a:srgbClr val="000000"/>
                     </a:solidFill>
@@ -15754,7 +15987,7 @@
               </a:ln>
               <a:extLst>
                 <a:ext uri="{91240B29-F687-4f45-9708-019B960494DF}">
-                  <a14:hiddenLine xmlns="" xmlns:a16="http://schemas.microsoft.com/office/drawing/2014/main" xmlns:p14="http://schemas.microsoft.com/office/powerpoint/2010/main" xmlns:a14="http://schemas.microsoft.com/office/drawing/2010/main" w="9525">
+                  <a14:hiddenLine xmlns:a14="http://schemas.microsoft.com/office/drawing/2010/main" xmlns:p14="http://schemas.microsoft.com/office/powerpoint/2010/main" xmlns:a16="http://schemas.microsoft.com/office/drawing/2014/main" xmlns="" w="9525">
                     <a:solidFill>
                       <a:srgbClr val="000000"/>
                     </a:solidFill>
@@ -15889,7 +16122,7 @@
               </a:ln>
               <a:extLst>
                 <a:ext uri="{91240B29-F687-4f45-9708-019B960494DF}">
-                  <a14:hiddenLine xmlns="" xmlns:a16="http://schemas.microsoft.com/office/drawing/2014/main" xmlns:p14="http://schemas.microsoft.com/office/powerpoint/2010/main" xmlns:a14="http://schemas.microsoft.com/office/drawing/2010/main" w="9525">
+                  <a14:hiddenLine xmlns:a14="http://schemas.microsoft.com/office/drawing/2010/main" xmlns:p14="http://schemas.microsoft.com/office/powerpoint/2010/main" xmlns:a16="http://schemas.microsoft.com/office/drawing/2014/main" xmlns="" w="9525">
                     <a:solidFill>
                       <a:srgbClr val="000000"/>
                     </a:solidFill>
@@ -16017,7 +16250,7 @@
               </a:ln>
               <a:extLst>
                 <a:ext uri="{91240B29-F687-4f45-9708-019B960494DF}">
-                  <a14:hiddenLine xmlns="" xmlns:a16="http://schemas.microsoft.com/office/drawing/2014/main" xmlns:p14="http://schemas.microsoft.com/office/powerpoint/2010/main" xmlns:a14="http://schemas.microsoft.com/office/drawing/2010/main" w="9525">
+                  <a14:hiddenLine xmlns:a14="http://schemas.microsoft.com/office/drawing/2010/main" xmlns:p14="http://schemas.microsoft.com/office/powerpoint/2010/main" xmlns:a16="http://schemas.microsoft.com/office/drawing/2014/main" xmlns="" w="9525">
                     <a:solidFill>
                       <a:srgbClr val="000000"/>
                     </a:solidFill>
@@ -16147,7 +16380,7 @@
               </a:ln>
               <a:extLst>
                 <a:ext uri="{91240B29-F687-4f45-9708-019B960494DF}">
-                  <a14:hiddenLine xmlns="" xmlns:a16="http://schemas.microsoft.com/office/drawing/2014/main" xmlns:p14="http://schemas.microsoft.com/office/powerpoint/2010/main" xmlns:a14="http://schemas.microsoft.com/office/drawing/2010/main" w="9525">
+                  <a14:hiddenLine xmlns:a14="http://schemas.microsoft.com/office/drawing/2010/main" xmlns:p14="http://schemas.microsoft.com/office/powerpoint/2010/main" xmlns:a16="http://schemas.microsoft.com/office/drawing/2014/main" xmlns="" w="9525">
                     <a:solidFill>
                       <a:srgbClr val="000000"/>
                     </a:solidFill>
@@ -16252,7 +16485,7 @@
               </a:ln>
               <a:extLst>
                 <a:ext uri="{91240B29-F687-4f45-9708-019B960494DF}">
-                  <a14:hiddenLine xmlns="" xmlns:a16="http://schemas.microsoft.com/office/drawing/2014/main" xmlns:p14="http://schemas.microsoft.com/office/powerpoint/2010/main" xmlns:a14="http://schemas.microsoft.com/office/drawing/2010/main" w="9525">
+                  <a14:hiddenLine xmlns:a14="http://schemas.microsoft.com/office/drawing/2010/main" xmlns:p14="http://schemas.microsoft.com/office/powerpoint/2010/main" xmlns:a16="http://schemas.microsoft.com/office/drawing/2014/main" xmlns="" w="9525">
                     <a:solidFill>
                       <a:srgbClr val="000000"/>
                     </a:solidFill>
@@ -16332,7 +16565,7 @@
               </a:ln>
               <a:extLst>
                 <a:ext uri="{91240B29-F687-4f45-9708-019B960494DF}">
-                  <a14:hiddenLine xmlns="" xmlns:a16="http://schemas.microsoft.com/office/drawing/2014/main" xmlns:p14="http://schemas.microsoft.com/office/powerpoint/2010/main" xmlns:a14="http://schemas.microsoft.com/office/drawing/2010/main" w="9525">
+                  <a14:hiddenLine xmlns:a14="http://schemas.microsoft.com/office/drawing/2010/main" xmlns:p14="http://schemas.microsoft.com/office/powerpoint/2010/main" xmlns:a16="http://schemas.microsoft.com/office/drawing/2014/main" xmlns="" w="9525">
                     <a:solidFill>
                       <a:srgbClr val="000000"/>
                     </a:solidFill>
@@ -16437,7 +16670,7 @@
               </a:ln>
               <a:extLst>
                 <a:ext uri="{91240B29-F687-4f45-9708-019B960494DF}">
-                  <a14:hiddenLine xmlns="" xmlns:a16="http://schemas.microsoft.com/office/drawing/2014/main" xmlns:p14="http://schemas.microsoft.com/office/powerpoint/2010/main" xmlns:a14="http://schemas.microsoft.com/office/drawing/2010/main" w="9525">
+                  <a14:hiddenLine xmlns:a14="http://schemas.microsoft.com/office/drawing/2010/main" xmlns:p14="http://schemas.microsoft.com/office/powerpoint/2010/main" xmlns:a16="http://schemas.microsoft.com/office/drawing/2014/main" xmlns="" w="9525">
                     <a:solidFill>
                       <a:srgbClr val="000000"/>
                     </a:solidFill>
@@ -16520,7 +16753,7 @@
               </a:ln>
               <a:extLst>
                 <a:ext uri="{91240B29-F687-4f45-9708-019B960494DF}">
-                  <a14:hiddenLine xmlns="" xmlns:a16="http://schemas.microsoft.com/office/drawing/2014/main" xmlns:p14="http://schemas.microsoft.com/office/powerpoint/2010/main" xmlns:a14="http://schemas.microsoft.com/office/drawing/2010/main" w="9525">
+                  <a14:hiddenLine xmlns:a14="http://schemas.microsoft.com/office/drawing/2010/main" xmlns:p14="http://schemas.microsoft.com/office/powerpoint/2010/main" xmlns:a16="http://schemas.microsoft.com/office/drawing/2014/main" xmlns="" w="9525">
                     <a:solidFill>
                       <a:srgbClr val="000000"/>
                     </a:solidFill>
@@ -16625,7 +16858,7 @@
               </a:ln>
               <a:extLst>
                 <a:ext uri="{91240B29-F687-4f45-9708-019B960494DF}">
-                  <a14:hiddenLine xmlns="" xmlns:a16="http://schemas.microsoft.com/office/drawing/2014/main" xmlns:p14="http://schemas.microsoft.com/office/powerpoint/2010/main" xmlns:a14="http://schemas.microsoft.com/office/drawing/2010/main" w="9525">
+                  <a14:hiddenLine xmlns:a14="http://schemas.microsoft.com/office/drawing/2010/main" xmlns:p14="http://schemas.microsoft.com/office/powerpoint/2010/main" xmlns:a16="http://schemas.microsoft.com/office/drawing/2014/main" xmlns="" w="9525">
                     <a:solidFill>
                       <a:srgbClr val="000000"/>
                     </a:solidFill>
@@ -16708,7 +16941,7 @@
               </a:ln>
               <a:extLst>
                 <a:ext uri="{91240B29-F687-4f45-9708-019B960494DF}">
-                  <a14:hiddenLine xmlns="" xmlns:a16="http://schemas.microsoft.com/office/drawing/2014/main" xmlns:p14="http://schemas.microsoft.com/office/powerpoint/2010/main" xmlns:a14="http://schemas.microsoft.com/office/drawing/2010/main" w="9525">
+                  <a14:hiddenLine xmlns:a14="http://schemas.microsoft.com/office/drawing/2010/main" xmlns:p14="http://schemas.microsoft.com/office/powerpoint/2010/main" xmlns:a16="http://schemas.microsoft.com/office/drawing/2014/main" xmlns="" w="9525">
                     <a:solidFill>
                       <a:srgbClr val="000000"/>
                     </a:solidFill>
@@ -16813,7 +17046,7 @@
               </a:ln>
               <a:extLst>
                 <a:ext uri="{91240B29-F687-4f45-9708-019B960494DF}">
-                  <a14:hiddenLine xmlns="" xmlns:a16="http://schemas.microsoft.com/office/drawing/2014/main" xmlns:p14="http://schemas.microsoft.com/office/powerpoint/2010/main" xmlns:a14="http://schemas.microsoft.com/office/drawing/2010/main" w="9525">
+                  <a14:hiddenLine xmlns:a14="http://schemas.microsoft.com/office/drawing/2010/main" xmlns:p14="http://schemas.microsoft.com/office/powerpoint/2010/main" xmlns:a16="http://schemas.microsoft.com/office/drawing/2014/main" xmlns="" w="9525">
                     <a:solidFill>
                       <a:srgbClr val="000000"/>
                     </a:solidFill>
@@ -16862,7 +17095,7 @@
               </a:ln>
               <a:extLst>
                 <a:ext uri="{91240B29-F687-4f45-9708-019B960494DF}">
-                  <a14:hiddenLine xmlns="" xmlns:a16="http://schemas.microsoft.com/office/drawing/2014/main" xmlns:p14="http://schemas.microsoft.com/office/powerpoint/2010/main" xmlns:a14="http://schemas.microsoft.com/office/drawing/2010/main" w="9525">
+                  <a14:hiddenLine xmlns:a14="http://schemas.microsoft.com/office/drawing/2010/main" xmlns:p14="http://schemas.microsoft.com/office/powerpoint/2010/main" xmlns:a16="http://schemas.microsoft.com/office/drawing/2014/main" xmlns="" w="9525">
                     <a:solidFill>
                       <a:srgbClr val="000000"/>
                     </a:solidFill>
@@ -16982,7 +17215,7 @@
           </a:prstGeom>
           <a:extLst>
             <a:ext uri="{909E8E84-426E-40dd-AFC4-6F175D3DCCD1}">
-              <a14:hiddenFill xmlns="" xmlns:a16="http://schemas.microsoft.com/office/drawing/2014/main" xmlns:p14="http://schemas.microsoft.com/office/powerpoint/2010/main" xmlns:a14="http://schemas.microsoft.com/office/drawing/2010/main">
+              <a14:hiddenFill xmlns:a14="http://schemas.microsoft.com/office/drawing/2010/main" xmlns:p14="http://schemas.microsoft.com/office/powerpoint/2010/main" xmlns:a16="http://schemas.microsoft.com/office/drawing/2014/main" xmlns="">
                 <a:solidFill>
                   <a:srgbClr val="FFFFFF"/>
                 </a:solidFill>
@@ -17106,7 +17339,7 @@
           <a:noFill/>
           <a:extLst>
             <a:ext uri="{909E8E84-426E-40dd-AFC4-6F175D3DCCD1}">
-              <a14:hiddenFill xmlns="" xmlns:a16="http://schemas.microsoft.com/office/drawing/2014/main" xmlns:p14="http://schemas.microsoft.com/office/powerpoint/2010/main" xmlns:a14="http://schemas.microsoft.com/office/drawing/2010/main">
+              <a14:hiddenFill xmlns:a14="http://schemas.microsoft.com/office/drawing/2010/main" xmlns:p14="http://schemas.microsoft.com/office/powerpoint/2010/main" xmlns:a16="http://schemas.microsoft.com/office/drawing/2014/main" xmlns="">
                 <a:solidFill>
                   <a:srgbClr val="FFFFFF"/>
                 </a:solidFill>
@@ -17293,7 +17526,7 @@
             </a:ln>
             <a:extLst>
               <a:ext uri="{91240B29-F687-4f45-9708-019B960494DF}">
-                <a14:hiddenLine xmlns="" xmlns:a16="http://schemas.microsoft.com/office/drawing/2014/main" xmlns:p14="http://schemas.microsoft.com/office/powerpoint/2010/main" xmlns:a14="http://schemas.microsoft.com/office/drawing/2010/main" w="9525">
+                <a14:hiddenLine xmlns:a14="http://schemas.microsoft.com/office/drawing/2010/main" xmlns:p14="http://schemas.microsoft.com/office/powerpoint/2010/main" xmlns:a16="http://schemas.microsoft.com/office/drawing/2014/main" xmlns="" w="9525">
                   <a:solidFill>
                     <a:srgbClr val="000000"/>
                   </a:solidFill>
@@ -17398,7 +17631,7 @@
             </a:ln>
             <a:extLst>
               <a:ext uri="{91240B29-F687-4f45-9708-019B960494DF}">
-                <a14:hiddenLine xmlns="" xmlns:a16="http://schemas.microsoft.com/office/drawing/2014/main" xmlns:p14="http://schemas.microsoft.com/office/powerpoint/2010/main" xmlns:a14="http://schemas.microsoft.com/office/drawing/2010/main" w="9525">
+                <a14:hiddenLine xmlns:a14="http://schemas.microsoft.com/office/drawing/2010/main" xmlns:p14="http://schemas.microsoft.com/office/powerpoint/2010/main" xmlns:a16="http://schemas.microsoft.com/office/drawing/2014/main" xmlns="" w="9525">
                   <a:solidFill>
                     <a:srgbClr val="000000"/>
                   </a:solidFill>
@@ -17503,7 +17736,7 @@
             </a:ln>
             <a:extLst>
               <a:ext uri="{91240B29-F687-4f45-9708-019B960494DF}">
-                <a14:hiddenLine xmlns="" xmlns:a16="http://schemas.microsoft.com/office/drawing/2014/main" xmlns:p14="http://schemas.microsoft.com/office/powerpoint/2010/main" xmlns:a14="http://schemas.microsoft.com/office/drawing/2010/main" w="9525">
+                <a14:hiddenLine xmlns:a14="http://schemas.microsoft.com/office/drawing/2010/main" xmlns:p14="http://schemas.microsoft.com/office/powerpoint/2010/main" xmlns:a16="http://schemas.microsoft.com/office/drawing/2014/main" xmlns="" w="9525">
                   <a:solidFill>
                     <a:srgbClr val="000000"/>
                   </a:solidFill>
@@ -17580,7 +17813,7 @@
             </a:ln>
             <a:extLst>
               <a:ext uri="{91240B29-F687-4f45-9708-019B960494DF}">
-                <a14:hiddenLine xmlns="" xmlns:a16="http://schemas.microsoft.com/office/drawing/2014/main" xmlns:p14="http://schemas.microsoft.com/office/powerpoint/2010/main" xmlns:a14="http://schemas.microsoft.com/office/drawing/2010/main" w="9525">
+                <a14:hiddenLine xmlns:a14="http://schemas.microsoft.com/office/drawing/2010/main" xmlns:p14="http://schemas.microsoft.com/office/powerpoint/2010/main" xmlns:a16="http://schemas.microsoft.com/office/drawing/2014/main" xmlns="" w="9525">
                   <a:solidFill>
                     <a:srgbClr val="000000"/>
                   </a:solidFill>
@@ -17685,7 +17918,7 @@
             </a:ln>
             <a:extLst>
               <a:ext uri="{91240B29-F687-4f45-9708-019B960494DF}">
-                <a14:hiddenLine xmlns="" xmlns:a16="http://schemas.microsoft.com/office/drawing/2014/main" xmlns:p14="http://schemas.microsoft.com/office/powerpoint/2010/main" xmlns:a14="http://schemas.microsoft.com/office/drawing/2010/main" w="9525">
+                <a14:hiddenLine xmlns:a14="http://schemas.microsoft.com/office/drawing/2010/main" xmlns:p14="http://schemas.microsoft.com/office/powerpoint/2010/main" xmlns:a16="http://schemas.microsoft.com/office/drawing/2014/main" xmlns="" w="9525">
                   <a:solidFill>
                     <a:srgbClr val="000000"/>
                   </a:solidFill>
@@ -17762,7 +17995,7 @@
             </a:ln>
             <a:extLst>
               <a:ext uri="{91240B29-F687-4f45-9708-019B960494DF}">
-                <a14:hiddenLine xmlns="" xmlns:a16="http://schemas.microsoft.com/office/drawing/2014/main" xmlns:p14="http://schemas.microsoft.com/office/powerpoint/2010/main" xmlns:a14="http://schemas.microsoft.com/office/drawing/2010/main" w="9525">
+                <a14:hiddenLine xmlns:a14="http://schemas.microsoft.com/office/drawing/2010/main" xmlns:p14="http://schemas.microsoft.com/office/powerpoint/2010/main" xmlns:a16="http://schemas.microsoft.com/office/drawing/2014/main" xmlns="" w="9525">
                   <a:solidFill>
                     <a:srgbClr val="000000"/>
                   </a:solidFill>
@@ -17839,7 +18072,7 @@
             </a:ln>
             <a:extLst>
               <a:ext uri="{91240B29-F687-4f45-9708-019B960494DF}">
-                <a14:hiddenLine xmlns="" xmlns:a16="http://schemas.microsoft.com/office/drawing/2014/main" xmlns:p14="http://schemas.microsoft.com/office/powerpoint/2010/main" xmlns:a14="http://schemas.microsoft.com/office/drawing/2010/main" w="9525">
+                <a14:hiddenLine xmlns:a14="http://schemas.microsoft.com/office/drawing/2010/main" xmlns:p14="http://schemas.microsoft.com/office/powerpoint/2010/main" xmlns:a16="http://schemas.microsoft.com/office/drawing/2014/main" xmlns="" w="9525">
                   <a:solidFill>
                     <a:srgbClr val="000000"/>
                   </a:solidFill>
@@ -17944,7 +18177,7 @@
             </a:ln>
             <a:extLst>
               <a:ext uri="{91240B29-F687-4f45-9708-019B960494DF}">
-                <a14:hiddenLine xmlns="" xmlns:a16="http://schemas.microsoft.com/office/drawing/2014/main" xmlns:p14="http://schemas.microsoft.com/office/powerpoint/2010/main" xmlns:a14="http://schemas.microsoft.com/office/drawing/2010/main" w="9525">
+                <a14:hiddenLine xmlns:a14="http://schemas.microsoft.com/office/drawing/2010/main" xmlns:p14="http://schemas.microsoft.com/office/powerpoint/2010/main" xmlns:a16="http://schemas.microsoft.com/office/drawing/2014/main" xmlns="" w="9525">
                   <a:solidFill>
                     <a:srgbClr val="000000"/>
                   </a:solidFill>
@@ -18049,7 +18282,7 @@
             </a:ln>
             <a:extLst>
               <a:ext uri="{91240B29-F687-4f45-9708-019B960494DF}">
-                <a14:hiddenLine xmlns="" xmlns:a16="http://schemas.microsoft.com/office/drawing/2014/main" xmlns:p14="http://schemas.microsoft.com/office/powerpoint/2010/main" xmlns:a14="http://schemas.microsoft.com/office/drawing/2010/main" w="9525">
+                <a14:hiddenLine xmlns:a14="http://schemas.microsoft.com/office/drawing/2010/main" xmlns:p14="http://schemas.microsoft.com/office/powerpoint/2010/main" xmlns:a16="http://schemas.microsoft.com/office/drawing/2014/main" xmlns="" w="9525">
                   <a:solidFill>
                     <a:srgbClr val="000000"/>
                   </a:solidFill>
@@ -18126,7 +18359,7 @@
             </a:ln>
             <a:extLst>
               <a:ext uri="{91240B29-F687-4f45-9708-019B960494DF}">
-                <a14:hiddenLine xmlns="" xmlns:a16="http://schemas.microsoft.com/office/drawing/2014/main" xmlns:p14="http://schemas.microsoft.com/office/powerpoint/2010/main" xmlns:a14="http://schemas.microsoft.com/office/drawing/2010/main" w="9525">
+                <a14:hiddenLine xmlns:a14="http://schemas.microsoft.com/office/drawing/2010/main" xmlns:p14="http://schemas.microsoft.com/office/powerpoint/2010/main" xmlns:a16="http://schemas.microsoft.com/office/drawing/2014/main" xmlns="" w="9525">
                   <a:solidFill>
                     <a:srgbClr val="000000"/>
                   </a:solidFill>
@@ -18251,7 +18484,7 @@
             </a:ln>
             <a:extLst>
               <a:ext uri="{91240B29-F687-4f45-9708-019B960494DF}">
-                <a14:hiddenLine xmlns="" xmlns:a16="http://schemas.microsoft.com/office/drawing/2014/main" xmlns:p14="http://schemas.microsoft.com/office/powerpoint/2010/main" xmlns:a14="http://schemas.microsoft.com/office/drawing/2010/main" w="9525">
+                <a14:hiddenLine xmlns:a14="http://schemas.microsoft.com/office/drawing/2010/main" xmlns:p14="http://schemas.microsoft.com/office/powerpoint/2010/main" xmlns:a16="http://schemas.microsoft.com/office/drawing/2014/main" xmlns="" w="9525">
                   <a:solidFill>
                     <a:srgbClr val="000000"/>
                   </a:solidFill>
@@ -18365,7 +18598,7 @@
             </a:ln>
             <a:extLst>
               <a:ext uri="{91240B29-F687-4f45-9708-019B960494DF}">
-                <a14:hiddenLine xmlns="" xmlns:a16="http://schemas.microsoft.com/office/drawing/2014/main" xmlns:p14="http://schemas.microsoft.com/office/powerpoint/2010/main" xmlns:a14="http://schemas.microsoft.com/office/drawing/2010/main" w="9525">
+                <a14:hiddenLine xmlns:a14="http://schemas.microsoft.com/office/drawing/2010/main" xmlns:p14="http://schemas.microsoft.com/office/powerpoint/2010/main" xmlns:a16="http://schemas.microsoft.com/office/drawing/2014/main" xmlns="" w="9525">
                   <a:solidFill>
                     <a:srgbClr val="000000"/>
                   </a:solidFill>
@@ -18442,7 +18675,7 @@
             </a:ln>
             <a:extLst>
               <a:ext uri="{91240B29-F687-4f45-9708-019B960494DF}">
-                <a14:hiddenLine xmlns="" xmlns:a16="http://schemas.microsoft.com/office/drawing/2014/main" xmlns:p14="http://schemas.microsoft.com/office/powerpoint/2010/main" xmlns:a14="http://schemas.microsoft.com/office/drawing/2010/main" w="9525">
+                <a14:hiddenLine xmlns:a14="http://schemas.microsoft.com/office/drawing/2010/main" xmlns:p14="http://schemas.microsoft.com/office/powerpoint/2010/main" xmlns:a16="http://schemas.microsoft.com/office/drawing/2014/main" xmlns="" w="9525">
                   <a:solidFill>
                     <a:srgbClr val="000000"/>
                   </a:solidFill>
@@ -18519,7 +18752,7 @@
             </a:ln>
             <a:extLst>
               <a:ext uri="{91240B29-F687-4f45-9708-019B960494DF}">
-                <a14:hiddenLine xmlns="" xmlns:a16="http://schemas.microsoft.com/office/drawing/2014/main" xmlns:p14="http://schemas.microsoft.com/office/powerpoint/2010/main" xmlns:a14="http://schemas.microsoft.com/office/drawing/2010/main" w="9525">
+                <a14:hiddenLine xmlns:a14="http://schemas.microsoft.com/office/drawing/2010/main" xmlns:p14="http://schemas.microsoft.com/office/powerpoint/2010/main" xmlns:a16="http://schemas.microsoft.com/office/drawing/2014/main" xmlns="" w="9525">
                   <a:solidFill>
                     <a:srgbClr val="000000"/>
                   </a:solidFill>
@@ -18624,7 +18857,7 @@
             </a:ln>
             <a:extLst>
               <a:ext uri="{91240B29-F687-4f45-9708-019B960494DF}">
-                <a14:hiddenLine xmlns="" xmlns:a16="http://schemas.microsoft.com/office/drawing/2014/main" xmlns:p14="http://schemas.microsoft.com/office/powerpoint/2010/main" xmlns:a14="http://schemas.microsoft.com/office/drawing/2010/main" w="9525">
+                <a14:hiddenLine xmlns:a14="http://schemas.microsoft.com/office/drawing/2010/main" xmlns:p14="http://schemas.microsoft.com/office/powerpoint/2010/main" xmlns:a16="http://schemas.microsoft.com/office/drawing/2014/main" xmlns="" w="9525">
                   <a:solidFill>
                     <a:srgbClr val="000000"/>
                   </a:solidFill>
@@ -18673,7 +18906,7 @@
             </a:ln>
             <a:extLst>
               <a:ext uri="{91240B29-F687-4f45-9708-019B960494DF}">
-                <a14:hiddenLine xmlns="" xmlns:a16="http://schemas.microsoft.com/office/drawing/2014/main" xmlns:p14="http://schemas.microsoft.com/office/powerpoint/2010/main" xmlns:a14="http://schemas.microsoft.com/office/drawing/2010/main" w="9525">
+                <a14:hiddenLine xmlns:a14="http://schemas.microsoft.com/office/drawing/2010/main" xmlns:p14="http://schemas.microsoft.com/office/powerpoint/2010/main" xmlns:a16="http://schemas.microsoft.com/office/drawing/2014/main" xmlns="" w="9525">
                   <a:solidFill>
                     <a:srgbClr val="000000"/>
                   </a:solidFill>
@@ -18753,7 +18986,7 @@
             </a:ln>
             <a:extLst>
               <a:ext uri="{91240B29-F687-4f45-9708-019B960494DF}">
-                <a14:hiddenLine xmlns="" xmlns:a16="http://schemas.microsoft.com/office/drawing/2014/main" xmlns:p14="http://schemas.microsoft.com/office/powerpoint/2010/main" xmlns:a14="http://schemas.microsoft.com/office/drawing/2010/main" w="9525">
+                <a14:hiddenLine xmlns:a14="http://schemas.microsoft.com/office/drawing/2010/main" xmlns:p14="http://schemas.microsoft.com/office/powerpoint/2010/main" xmlns:a16="http://schemas.microsoft.com/office/drawing/2014/main" xmlns="" w="9525">
                   <a:solidFill>
                     <a:srgbClr val="000000"/>
                   </a:solidFill>
@@ -18858,7 +19091,7 @@
             </a:ln>
             <a:extLst>
               <a:ext uri="{91240B29-F687-4f45-9708-019B960494DF}">
-                <a14:hiddenLine xmlns="" xmlns:a16="http://schemas.microsoft.com/office/drawing/2014/main" xmlns:p14="http://schemas.microsoft.com/office/powerpoint/2010/main" xmlns:a14="http://schemas.microsoft.com/office/drawing/2010/main" w="9525">
+                <a14:hiddenLine xmlns:a14="http://schemas.microsoft.com/office/drawing/2010/main" xmlns:p14="http://schemas.microsoft.com/office/powerpoint/2010/main" xmlns:a16="http://schemas.microsoft.com/office/drawing/2014/main" xmlns="" w="9525">
                   <a:solidFill>
                     <a:srgbClr val="000000"/>
                   </a:solidFill>
@@ -18935,7 +19168,7 @@
             </a:ln>
             <a:extLst>
               <a:ext uri="{91240B29-F687-4f45-9708-019B960494DF}">
-                <a14:hiddenLine xmlns="" xmlns:a16="http://schemas.microsoft.com/office/drawing/2014/main" xmlns:p14="http://schemas.microsoft.com/office/powerpoint/2010/main" xmlns:a14="http://schemas.microsoft.com/office/drawing/2010/main" w="9525">
+                <a14:hiddenLine xmlns:a14="http://schemas.microsoft.com/office/drawing/2010/main" xmlns:p14="http://schemas.microsoft.com/office/powerpoint/2010/main" xmlns:a16="http://schemas.microsoft.com/office/drawing/2014/main" xmlns="" w="9525">
                   <a:solidFill>
                     <a:srgbClr val="000000"/>
                   </a:solidFill>
@@ -19040,7 +19273,7 @@
             </a:ln>
             <a:extLst>
               <a:ext uri="{91240B29-F687-4f45-9708-019B960494DF}">
-                <a14:hiddenLine xmlns="" xmlns:a16="http://schemas.microsoft.com/office/drawing/2014/main" xmlns:p14="http://schemas.microsoft.com/office/powerpoint/2010/main" xmlns:a14="http://schemas.microsoft.com/office/drawing/2010/main" w="9525">
+                <a14:hiddenLine xmlns:a14="http://schemas.microsoft.com/office/drawing/2010/main" xmlns:p14="http://schemas.microsoft.com/office/powerpoint/2010/main" xmlns:a16="http://schemas.microsoft.com/office/drawing/2014/main" xmlns="" w="9525">
                   <a:solidFill>
                     <a:srgbClr val="000000"/>
                   </a:solidFill>
@@ -19120,7 +19353,7 @@
             </a:ln>
             <a:extLst>
               <a:ext uri="{91240B29-F687-4f45-9708-019B960494DF}">
-                <a14:hiddenLine xmlns="" xmlns:a16="http://schemas.microsoft.com/office/drawing/2014/main" xmlns:p14="http://schemas.microsoft.com/office/powerpoint/2010/main" xmlns:a14="http://schemas.microsoft.com/office/drawing/2010/main" w="9525">
+                <a14:hiddenLine xmlns:a14="http://schemas.microsoft.com/office/drawing/2010/main" xmlns:p14="http://schemas.microsoft.com/office/powerpoint/2010/main" xmlns:a16="http://schemas.microsoft.com/office/drawing/2014/main" xmlns="" w="9525">
                   <a:solidFill>
                     <a:srgbClr val="000000"/>
                   </a:solidFill>
@@ -19197,7 +19430,7 @@
             </a:ln>
             <a:extLst>
               <a:ext uri="{91240B29-F687-4f45-9708-019B960494DF}">
-                <a14:hiddenLine xmlns="" xmlns:a16="http://schemas.microsoft.com/office/drawing/2014/main" xmlns:p14="http://schemas.microsoft.com/office/powerpoint/2010/main" xmlns:a14="http://schemas.microsoft.com/office/drawing/2010/main" w="9525">
+                <a14:hiddenLine xmlns:a14="http://schemas.microsoft.com/office/drawing/2010/main" xmlns:p14="http://schemas.microsoft.com/office/powerpoint/2010/main" xmlns:a16="http://schemas.microsoft.com/office/drawing/2014/main" xmlns="" w="9525">
                   <a:solidFill>
                     <a:srgbClr val="000000"/>
                   </a:solidFill>
@@ -19302,7 +19535,7 @@
             </a:ln>
             <a:extLst>
               <a:ext uri="{91240B29-F687-4f45-9708-019B960494DF}">
-                <a14:hiddenLine xmlns="" xmlns:a16="http://schemas.microsoft.com/office/drawing/2014/main" xmlns:p14="http://schemas.microsoft.com/office/powerpoint/2010/main" xmlns:a14="http://schemas.microsoft.com/office/drawing/2010/main" w="9525">
+                <a14:hiddenLine xmlns:a14="http://schemas.microsoft.com/office/drawing/2010/main" xmlns:p14="http://schemas.microsoft.com/office/powerpoint/2010/main" xmlns:a16="http://schemas.microsoft.com/office/drawing/2014/main" xmlns="" w="9525">
                   <a:solidFill>
                     <a:srgbClr val="000000"/>
                   </a:solidFill>
@@ -19407,7 +19640,7 @@
             </a:ln>
             <a:extLst>
               <a:ext uri="{91240B29-F687-4f45-9708-019B960494DF}">
-                <a14:hiddenLine xmlns="" xmlns:a16="http://schemas.microsoft.com/office/drawing/2014/main" xmlns:p14="http://schemas.microsoft.com/office/powerpoint/2010/main" xmlns:a14="http://schemas.microsoft.com/office/drawing/2010/main" w="9525">
+                <a14:hiddenLine xmlns:a14="http://schemas.microsoft.com/office/drawing/2010/main" xmlns:p14="http://schemas.microsoft.com/office/powerpoint/2010/main" xmlns:a16="http://schemas.microsoft.com/office/drawing/2014/main" xmlns="" w="9525">
                   <a:solidFill>
                     <a:srgbClr val="000000"/>
                   </a:solidFill>
@@ -19487,7 +19720,7 @@
             </a:ln>
             <a:extLst>
               <a:ext uri="{91240B29-F687-4f45-9708-019B960494DF}">
-                <a14:hiddenLine xmlns="" xmlns:a16="http://schemas.microsoft.com/office/drawing/2014/main" xmlns:p14="http://schemas.microsoft.com/office/powerpoint/2010/main" xmlns:a14="http://schemas.microsoft.com/office/drawing/2010/main" w="9525">
+                <a14:hiddenLine xmlns:a14="http://schemas.microsoft.com/office/drawing/2010/main" xmlns:p14="http://schemas.microsoft.com/office/powerpoint/2010/main" xmlns:a16="http://schemas.microsoft.com/office/drawing/2014/main" xmlns="" w="9525">
                   <a:solidFill>
                     <a:srgbClr val="000000"/>
                   </a:solidFill>
@@ -19622,7 +19855,7 @@
             </a:ln>
             <a:extLst>
               <a:ext uri="{91240B29-F687-4f45-9708-019B960494DF}">
-                <a14:hiddenLine xmlns="" xmlns:a16="http://schemas.microsoft.com/office/drawing/2014/main" xmlns:p14="http://schemas.microsoft.com/office/powerpoint/2010/main" xmlns:a14="http://schemas.microsoft.com/office/drawing/2010/main" w="9525">
+                <a14:hiddenLine xmlns:a14="http://schemas.microsoft.com/office/drawing/2010/main" xmlns:p14="http://schemas.microsoft.com/office/powerpoint/2010/main" xmlns:a16="http://schemas.microsoft.com/office/drawing/2014/main" xmlns="" w="9525">
                   <a:solidFill>
                     <a:srgbClr val="000000"/>
                   </a:solidFill>
@@ -19753,7 +19986,7 @@
           <a:noFill/>
           <a:extLst>
             <a:ext uri="{909E8E84-426E-40dd-AFC4-6F175D3DCCD1}">
-              <a14:hiddenFill xmlns="" xmlns:a16="http://schemas.microsoft.com/office/drawing/2014/main" xmlns:p14="http://schemas.microsoft.com/office/powerpoint/2010/main" xmlns:a14="http://schemas.microsoft.com/office/drawing/2010/main">
+              <a14:hiddenFill xmlns:a14="http://schemas.microsoft.com/office/drawing/2010/main" xmlns:p14="http://schemas.microsoft.com/office/powerpoint/2010/main" xmlns:a16="http://schemas.microsoft.com/office/drawing/2014/main" xmlns="">
                 <a:solidFill>
                   <a:srgbClr val="FFFFFF"/>
                 </a:solidFill>
@@ -19874,7 +20107,7 @@
               </a:ln>
               <a:extLst>
                 <a:ext uri="{91240B29-F687-4f45-9708-019B960494DF}">
-                  <a14:hiddenLine xmlns="" xmlns:a16="http://schemas.microsoft.com/office/drawing/2014/main" xmlns:p14="http://schemas.microsoft.com/office/powerpoint/2010/main" xmlns:a14="http://schemas.microsoft.com/office/drawing/2010/main" w="9525">
+                  <a14:hiddenLine xmlns:a14="http://schemas.microsoft.com/office/drawing/2010/main" xmlns:p14="http://schemas.microsoft.com/office/powerpoint/2010/main" xmlns:a16="http://schemas.microsoft.com/office/drawing/2014/main" xmlns="" w="9525">
                     <a:solidFill>
                       <a:srgbClr val="000000"/>
                     </a:solidFill>
@@ -19979,7 +20212,7 @@
               </a:ln>
               <a:extLst>
                 <a:ext uri="{91240B29-F687-4f45-9708-019B960494DF}">
-                  <a14:hiddenLine xmlns="" xmlns:a16="http://schemas.microsoft.com/office/drawing/2014/main" xmlns:p14="http://schemas.microsoft.com/office/powerpoint/2010/main" xmlns:a14="http://schemas.microsoft.com/office/drawing/2010/main" w="9525">
+                  <a14:hiddenLine xmlns:a14="http://schemas.microsoft.com/office/drawing/2010/main" xmlns:p14="http://schemas.microsoft.com/office/powerpoint/2010/main" xmlns:a16="http://schemas.microsoft.com/office/drawing/2014/main" xmlns="" w="9525">
                     <a:solidFill>
                       <a:srgbClr val="000000"/>
                     </a:solidFill>
@@ -20084,7 +20317,7 @@
               </a:ln>
               <a:extLst>
                 <a:ext uri="{91240B29-F687-4f45-9708-019B960494DF}">
-                  <a14:hiddenLine xmlns="" xmlns:a16="http://schemas.microsoft.com/office/drawing/2014/main" xmlns:p14="http://schemas.microsoft.com/office/powerpoint/2010/main" xmlns:a14="http://schemas.microsoft.com/office/drawing/2010/main" w="9525">
+                  <a14:hiddenLine xmlns:a14="http://schemas.microsoft.com/office/drawing/2010/main" xmlns:p14="http://schemas.microsoft.com/office/powerpoint/2010/main" xmlns:a16="http://schemas.microsoft.com/office/drawing/2014/main" xmlns="" w="9525">
                     <a:solidFill>
                       <a:srgbClr val="000000"/>
                     </a:solidFill>
@@ -20161,7 +20394,7 @@
               </a:ln>
               <a:extLst>
                 <a:ext uri="{91240B29-F687-4f45-9708-019B960494DF}">
-                  <a14:hiddenLine xmlns="" xmlns:a16="http://schemas.microsoft.com/office/drawing/2014/main" xmlns:p14="http://schemas.microsoft.com/office/powerpoint/2010/main" xmlns:a14="http://schemas.microsoft.com/office/drawing/2010/main" w="9525">
+                  <a14:hiddenLine xmlns:a14="http://schemas.microsoft.com/office/drawing/2010/main" xmlns:p14="http://schemas.microsoft.com/office/powerpoint/2010/main" xmlns:a16="http://schemas.microsoft.com/office/drawing/2014/main" xmlns="" w="9525">
                     <a:solidFill>
                       <a:srgbClr val="000000"/>
                     </a:solidFill>
@@ -20266,7 +20499,7 @@
               </a:ln>
               <a:extLst>
                 <a:ext uri="{91240B29-F687-4f45-9708-019B960494DF}">
-                  <a14:hiddenLine xmlns="" xmlns:a16="http://schemas.microsoft.com/office/drawing/2014/main" xmlns:p14="http://schemas.microsoft.com/office/powerpoint/2010/main" xmlns:a14="http://schemas.microsoft.com/office/drawing/2010/main" w="9525">
+                  <a14:hiddenLine xmlns:a14="http://schemas.microsoft.com/office/drawing/2010/main" xmlns:p14="http://schemas.microsoft.com/office/powerpoint/2010/main" xmlns:a16="http://schemas.microsoft.com/office/drawing/2014/main" xmlns="" w="9525">
                     <a:solidFill>
                       <a:srgbClr val="000000"/>
                     </a:solidFill>
@@ -20343,7 +20576,7 @@
               </a:ln>
               <a:extLst>
                 <a:ext uri="{91240B29-F687-4f45-9708-019B960494DF}">
-                  <a14:hiddenLine xmlns="" xmlns:a16="http://schemas.microsoft.com/office/drawing/2014/main" xmlns:p14="http://schemas.microsoft.com/office/powerpoint/2010/main" xmlns:a14="http://schemas.microsoft.com/office/drawing/2010/main" w="9525">
+                  <a14:hiddenLine xmlns:a14="http://schemas.microsoft.com/office/drawing/2010/main" xmlns:p14="http://schemas.microsoft.com/office/powerpoint/2010/main" xmlns:a16="http://schemas.microsoft.com/office/drawing/2014/main" xmlns="" w="9525">
                     <a:solidFill>
                       <a:srgbClr val="000000"/>
                     </a:solidFill>
@@ -20420,7 +20653,7 @@
               </a:ln>
               <a:extLst>
                 <a:ext uri="{91240B29-F687-4f45-9708-019B960494DF}">
-                  <a14:hiddenLine xmlns="" xmlns:a16="http://schemas.microsoft.com/office/drawing/2014/main" xmlns:p14="http://schemas.microsoft.com/office/powerpoint/2010/main" xmlns:a14="http://schemas.microsoft.com/office/drawing/2010/main" w="9525">
+                  <a14:hiddenLine xmlns:a14="http://schemas.microsoft.com/office/drawing/2010/main" xmlns:p14="http://schemas.microsoft.com/office/powerpoint/2010/main" xmlns:a16="http://schemas.microsoft.com/office/drawing/2014/main" xmlns="" w="9525">
                     <a:solidFill>
                       <a:srgbClr val="000000"/>
                     </a:solidFill>
@@ -20525,7 +20758,7 @@
               </a:ln>
               <a:extLst>
                 <a:ext uri="{91240B29-F687-4f45-9708-019B960494DF}">
-                  <a14:hiddenLine xmlns="" xmlns:a16="http://schemas.microsoft.com/office/drawing/2014/main" xmlns:p14="http://schemas.microsoft.com/office/powerpoint/2010/main" xmlns:a14="http://schemas.microsoft.com/office/drawing/2010/main" w="9525">
+                  <a14:hiddenLine xmlns:a14="http://schemas.microsoft.com/office/drawing/2010/main" xmlns:p14="http://schemas.microsoft.com/office/powerpoint/2010/main" xmlns:a16="http://schemas.microsoft.com/office/drawing/2014/main" xmlns="" w="9525">
                     <a:solidFill>
                       <a:srgbClr val="000000"/>
                     </a:solidFill>
@@ -20630,7 +20863,7 @@
               </a:ln>
               <a:extLst>
                 <a:ext uri="{91240B29-F687-4f45-9708-019B960494DF}">
-                  <a14:hiddenLine xmlns="" xmlns:a16="http://schemas.microsoft.com/office/drawing/2014/main" xmlns:p14="http://schemas.microsoft.com/office/powerpoint/2010/main" xmlns:a14="http://schemas.microsoft.com/office/drawing/2010/main" w="9525">
+                  <a14:hiddenLine xmlns:a14="http://schemas.microsoft.com/office/drawing/2010/main" xmlns:p14="http://schemas.microsoft.com/office/powerpoint/2010/main" xmlns:a16="http://schemas.microsoft.com/office/drawing/2014/main" xmlns="" w="9525">
                     <a:solidFill>
                       <a:srgbClr val="000000"/>
                     </a:solidFill>
@@ -20707,7 +20940,7 @@
               </a:ln>
               <a:extLst>
                 <a:ext uri="{91240B29-F687-4f45-9708-019B960494DF}">
-                  <a14:hiddenLine xmlns="" xmlns:a16="http://schemas.microsoft.com/office/drawing/2014/main" xmlns:p14="http://schemas.microsoft.com/office/powerpoint/2010/main" xmlns:a14="http://schemas.microsoft.com/office/drawing/2010/main" w="9525">
+                  <a14:hiddenLine xmlns:a14="http://schemas.microsoft.com/office/drawing/2010/main" xmlns:p14="http://schemas.microsoft.com/office/powerpoint/2010/main" xmlns:a16="http://schemas.microsoft.com/office/drawing/2014/main" xmlns="" w="9525">
                     <a:solidFill>
                       <a:srgbClr val="000000"/>
                     </a:solidFill>
@@ -20832,7 +21065,7 @@
               </a:ln>
               <a:extLst>
                 <a:ext uri="{91240B29-F687-4f45-9708-019B960494DF}">
-                  <a14:hiddenLine xmlns="" xmlns:a16="http://schemas.microsoft.com/office/drawing/2014/main" xmlns:p14="http://schemas.microsoft.com/office/powerpoint/2010/main" xmlns:a14="http://schemas.microsoft.com/office/drawing/2010/main" w="9525">
+                  <a14:hiddenLine xmlns:a14="http://schemas.microsoft.com/office/drawing/2010/main" xmlns:p14="http://schemas.microsoft.com/office/powerpoint/2010/main" xmlns:a16="http://schemas.microsoft.com/office/drawing/2014/main" xmlns="" w="9525">
                     <a:solidFill>
                       <a:srgbClr val="000000"/>
                     </a:solidFill>
@@ -20946,7 +21179,7 @@
               </a:ln>
               <a:extLst>
                 <a:ext uri="{91240B29-F687-4f45-9708-019B960494DF}">
-                  <a14:hiddenLine xmlns="" xmlns:a16="http://schemas.microsoft.com/office/drawing/2014/main" xmlns:p14="http://schemas.microsoft.com/office/powerpoint/2010/main" xmlns:a14="http://schemas.microsoft.com/office/drawing/2010/main" w="9525">
+                  <a14:hiddenLine xmlns:a14="http://schemas.microsoft.com/office/drawing/2010/main" xmlns:p14="http://schemas.microsoft.com/office/powerpoint/2010/main" xmlns:a16="http://schemas.microsoft.com/office/drawing/2014/main" xmlns="" w="9525">
                     <a:solidFill>
                       <a:srgbClr val="000000"/>
                     </a:solidFill>
@@ -21023,7 +21256,7 @@
               </a:ln>
               <a:extLst>
                 <a:ext uri="{91240B29-F687-4f45-9708-019B960494DF}">
-                  <a14:hiddenLine xmlns="" xmlns:a16="http://schemas.microsoft.com/office/drawing/2014/main" xmlns:p14="http://schemas.microsoft.com/office/powerpoint/2010/main" xmlns:a14="http://schemas.microsoft.com/office/drawing/2010/main" w="9525">
+                  <a14:hiddenLine xmlns:a14="http://schemas.microsoft.com/office/drawing/2010/main" xmlns:p14="http://schemas.microsoft.com/office/powerpoint/2010/main" xmlns:a16="http://schemas.microsoft.com/office/drawing/2014/main" xmlns="" w="9525">
                     <a:solidFill>
                       <a:srgbClr val="000000"/>
                     </a:solidFill>
@@ -21100,7 +21333,7 @@
               </a:ln>
               <a:extLst>
                 <a:ext uri="{91240B29-F687-4f45-9708-019B960494DF}">
-                  <a14:hiddenLine xmlns="" xmlns:a16="http://schemas.microsoft.com/office/drawing/2014/main" xmlns:p14="http://schemas.microsoft.com/office/powerpoint/2010/main" xmlns:a14="http://schemas.microsoft.com/office/drawing/2010/main" w="9525">
+                  <a14:hiddenLine xmlns:a14="http://schemas.microsoft.com/office/drawing/2010/main" xmlns:p14="http://schemas.microsoft.com/office/powerpoint/2010/main" xmlns:a16="http://schemas.microsoft.com/office/drawing/2014/main" xmlns="" w="9525">
                     <a:solidFill>
                       <a:srgbClr val="000000"/>
                     </a:solidFill>
@@ -21205,7 +21438,7 @@
               </a:ln>
               <a:extLst>
                 <a:ext uri="{91240B29-F687-4f45-9708-019B960494DF}">
-                  <a14:hiddenLine xmlns="" xmlns:a16="http://schemas.microsoft.com/office/drawing/2014/main" xmlns:p14="http://schemas.microsoft.com/office/powerpoint/2010/main" xmlns:a14="http://schemas.microsoft.com/office/drawing/2010/main" w="9525">
+                  <a14:hiddenLine xmlns:a14="http://schemas.microsoft.com/office/drawing/2010/main" xmlns:p14="http://schemas.microsoft.com/office/powerpoint/2010/main" xmlns:a16="http://schemas.microsoft.com/office/drawing/2014/main" xmlns="" w="9525">
                     <a:solidFill>
                       <a:srgbClr val="000000"/>
                     </a:solidFill>
@@ -21254,7 +21487,7 @@
               </a:ln>
               <a:extLst>
                 <a:ext uri="{91240B29-F687-4f45-9708-019B960494DF}">
-                  <a14:hiddenLine xmlns="" xmlns:a16="http://schemas.microsoft.com/office/drawing/2014/main" xmlns:p14="http://schemas.microsoft.com/office/powerpoint/2010/main" xmlns:a14="http://schemas.microsoft.com/office/drawing/2010/main" w="9525">
+                  <a14:hiddenLine xmlns:a14="http://schemas.microsoft.com/office/drawing/2010/main" xmlns:p14="http://schemas.microsoft.com/office/powerpoint/2010/main" xmlns:a16="http://schemas.microsoft.com/office/drawing/2014/main" xmlns="" w="9525">
                     <a:solidFill>
                       <a:srgbClr val="000000"/>
                     </a:solidFill>
@@ -21334,7 +21567,7 @@
               </a:ln>
               <a:extLst>
                 <a:ext uri="{91240B29-F687-4f45-9708-019B960494DF}">
-                  <a14:hiddenLine xmlns="" xmlns:a16="http://schemas.microsoft.com/office/drawing/2014/main" xmlns:p14="http://schemas.microsoft.com/office/powerpoint/2010/main" xmlns:a14="http://schemas.microsoft.com/office/drawing/2010/main" w="9525">
+                  <a14:hiddenLine xmlns:a14="http://schemas.microsoft.com/office/drawing/2010/main" xmlns:p14="http://schemas.microsoft.com/office/powerpoint/2010/main" xmlns:a16="http://schemas.microsoft.com/office/drawing/2014/main" xmlns="" w="9525">
                     <a:solidFill>
                       <a:srgbClr val="000000"/>
                     </a:solidFill>
@@ -21439,7 +21672,7 @@
               </a:ln>
               <a:extLst>
                 <a:ext uri="{91240B29-F687-4f45-9708-019B960494DF}">
-                  <a14:hiddenLine xmlns="" xmlns:a16="http://schemas.microsoft.com/office/drawing/2014/main" xmlns:p14="http://schemas.microsoft.com/office/powerpoint/2010/main" xmlns:a14="http://schemas.microsoft.com/office/drawing/2010/main" w="9525">
+                  <a14:hiddenLine xmlns:a14="http://schemas.microsoft.com/office/drawing/2010/main" xmlns:p14="http://schemas.microsoft.com/office/powerpoint/2010/main" xmlns:a16="http://schemas.microsoft.com/office/drawing/2014/main" xmlns="" w="9525">
                     <a:solidFill>
                       <a:srgbClr val="000000"/>
                     </a:solidFill>
@@ -21516,7 +21749,7 @@
               </a:ln>
               <a:extLst>
                 <a:ext uri="{91240B29-F687-4f45-9708-019B960494DF}">
-                  <a14:hiddenLine xmlns="" xmlns:a16="http://schemas.microsoft.com/office/drawing/2014/main" xmlns:p14="http://schemas.microsoft.com/office/powerpoint/2010/main" xmlns:a14="http://schemas.microsoft.com/office/drawing/2010/main" w="9525">
+                  <a14:hiddenLine xmlns:a14="http://schemas.microsoft.com/office/drawing/2010/main" xmlns:p14="http://schemas.microsoft.com/office/powerpoint/2010/main" xmlns:a16="http://schemas.microsoft.com/office/drawing/2014/main" xmlns="" w="9525">
                     <a:solidFill>
                       <a:srgbClr val="000000"/>
                     </a:solidFill>
@@ -21621,7 +21854,7 @@
               </a:ln>
               <a:extLst>
                 <a:ext uri="{91240B29-F687-4f45-9708-019B960494DF}">
-                  <a14:hiddenLine xmlns="" xmlns:a16="http://schemas.microsoft.com/office/drawing/2014/main" xmlns:p14="http://schemas.microsoft.com/office/powerpoint/2010/main" xmlns:a14="http://schemas.microsoft.com/office/drawing/2010/main" w="9525">
+                  <a14:hiddenLine xmlns:a14="http://schemas.microsoft.com/office/drawing/2010/main" xmlns:p14="http://schemas.microsoft.com/office/powerpoint/2010/main" xmlns:a16="http://schemas.microsoft.com/office/drawing/2014/main" xmlns="" w="9525">
                     <a:solidFill>
                       <a:srgbClr val="000000"/>
                     </a:solidFill>
@@ -21701,7 +21934,7 @@
               </a:ln>
               <a:extLst>
                 <a:ext uri="{91240B29-F687-4f45-9708-019B960494DF}">
-                  <a14:hiddenLine xmlns="" xmlns:a16="http://schemas.microsoft.com/office/drawing/2014/main" xmlns:p14="http://schemas.microsoft.com/office/powerpoint/2010/main" xmlns:a14="http://schemas.microsoft.com/office/drawing/2010/main" w="9525">
+                  <a14:hiddenLine xmlns:a14="http://schemas.microsoft.com/office/drawing/2010/main" xmlns:p14="http://schemas.microsoft.com/office/powerpoint/2010/main" xmlns:a16="http://schemas.microsoft.com/office/drawing/2014/main" xmlns="" w="9525">
                     <a:solidFill>
                       <a:srgbClr val="000000"/>
                     </a:solidFill>
@@ -21778,7 +22011,7 @@
               </a:ln>
               <a:extLst>
                 <a:ext uri="{91240B29-F687-4f45-9708-019B960494DF}">
-                  <a14:hiddenLine xmlns="" xmlns:a16="http://schemas.microsoft.com/office/drawing/2014/main" xmlns:p14="http://schemas.microsoft.com/office/powerpoint/2010/main" xmlns:a14="http://schemas.microsoft.com/office/drawing/2010/main" w="9525">
+                  <a14:hiddenLine xmlns:a14="http://schemas.microsoft.com/office/drawing/2010/main" xmlns:p14="http://schemas.microsoft.com/office/powerpoint/2010/main" xmlns:a16="http://schemas.microsoft.com/office/drawing/2014/main" xmlns="" w="9525">
                     <a:solidFill>
                       <a:srgbClr val="000000"/>
                     </a:solidFill>
@@ -21883,7 +22116,7 @@
               </a:ln>
               <a:extLst>
                 <a:ext uri="{91240B29-F687-4f45-9708-019B960494DF}">
-                  <a14:hiddenLine xmlns="" xmlns:a16="http://schemas.microsoft.com/office/drawing/2014/main" xmlns:p14="http://schemas.microsoft.com/office/powerpoint/2010/main" xmlns:a14="http://schemas.microsoft.com/office/drawing/2010/main" w="9525">
+                  <a14:hiddenLine xmlns:a14="http://schemas.microsoft.com/office/drawing/2010/main" xmlns:p14="http://schemas.microsoft.com/office/powerpoint/2010/main" xmlns:a16="http://schemas.microsoft.com/office/drawing/2014/main" xmlns="" w="9525">
                     <a:solidFill>
                       <a:srgbClr val="000000"/>
                     </a:solidFill>
@@ -21988,7 +22221,7 @@
               </a:ln>
               <a:extLst>
                 <a:ext uri="{91240B29-F687-4f45-9708-019B960494DF}">
-                  <a14:hiddenLine xmlns="" xmlns:a16="http://schemas.microsoft.com/office/drawing/2014/main" xmlns:p14="http://schemas.microsoft.com/office/powerpoint/2010/main" xmlns:a14="http://schemas.microsoft.com/office/drawing/2010/main" w="9525">
+                  <a14:hiddenLine xmlns:a14="http://schemas.microsoft.com/office/drawing/2010/main" xmlns:p14="http://schemas.microsoft.com/office/powerpoint/2010/main" xmlns:a16="http://schemas.microsoft.com/office/drawing/2014/main" xmlns="" w="9525">
                     <a:solidFill>
                       <a:srgbClr val="000000"/>
                     </a:solidFill>
@@ -22068,7 +22301,7 @@
               </a:ln>
               <a:extLst>
                 <a:ext uri="{91240B29-F687-4f45-9708-019B960494DF}">
-                  <a14:hiddenLine xmlns="" xmlns:a16="http://schemas.microsoft.com/office/drawing/2014/main" xmlns:p14="http://schemas.microsoft.com/office/powerpoint/2010/main" xmlns:a14="http://schemas.microsoft.com/office/drawing/2010/main" w="9525">
+                  <a14:hiddenLine xmlns:a14="http://schemas.microsoft.com/office/drawing/2010/main" xmlns:p14="http://schemas.microsoft.com/office/powerpoint/2010/main" xmlns:a16="http://schemas.microsoft.com/office/drawing/2014/main" xmlns="" w="9525">
                     <a:solidFill>
                       <a:srgbClr val="000000"/>
                     </a:solidFill>
@@ -22203,7 +22436,7 @@
               </a:ln>
               <a:extLst>
                 <a:ext uri="{91240B29-F687-4f45-9708-019B960494DF}">
-                  <a14:hiddenLine xmlns="" xmlns:a16="http://schemas.microsoft.com/office/drawing/2014/main" xmlns:p14="http://schemas.microsoft.com/office/powerpoint/2010/main" xmlns:a14="http://schemas.microsoft.com/office/drawing/2010/main" w="9525">
+                  <a14:hiddenLine xmlns:a14="http://schemas.microsoft.com/office/drawing/2010/main" xmlns:p14="http://schemas.microsoft.com/office/powerpoint/2010/main" xmlns:a16="http://schemas.microsoft.com/office/drawing/2014/main" xmlns="" w="9525">
                     <a:solidFill>
                       <a:srgbClr val="000000"/>
                     </a:solidFill>
@@ -22331,7 +22564,7 @@
               </a:ln>
               <a:extLst>
                 <a:ext uri="{91240B29-F687-4f45-9708-019B960494DF}">
-                  <a14:hiddenLine xmlns="" xmlns:a16="http://schemas.microsoft.com/office/drawing/2014/main" xmlns:p14="http://schemas.microsoft.com/office/powerpoint/2010/main" xmlns:a14="http://schemas.microsoft.com/office/drawing/2010/main" w="9525">
+                  <a14:hiddenLine xmlns:a14="http://schemas.microsoft.com/office/drawing/2010/main" xmlns:p14="http://schemas.microsoft.com/office/powerpoint/2010/main" xmlns:a16="http://schemas.microsoft.com/office/drawing/2014/main" xmlns="" w="9525">
                     <a:solidFill>
                       <a:srgbClr val="000000"/>
                     </a:solidFill>
@@ -22461,7 +22694,7 @@
               </a:ln>
               <a:extLst>
                 <a:ext uri="{91240B29-F687-4f45-9708-019B960494DF}">
-                  <a14:hiddenLine xmlns="" xmlns:a16="http://schemas.microsoft.com/office/drawing/2014/main" xmlns:p14="http://schemas.microsoft.com/office/powerpoint/2010/main" xmlns:a14="http://schemas.microsoft.com/office/drawing/2010/main" w="9525">
+                  <a14:hiddenLine xmlns:a14="http://schemas.microsoft.com/office/drawing/2010/main" xmlns:p14="http://schemas.microsoft.com/office/powerpoint/2010/main" xmlns:a16="http://schemas.microsoft.com/office/drawing/2014/main" xmlns="" w="9525">
                     <a:solidFill>
                       <a:srgbClr val="000000"/>
                     </a:solidFill>
@@ -22566,7 +22799,7 @@
               </a:ln>
               <a:extLst>
                 <a:ext uri="{91240B29-F687-4f45-9708-019B960494DF}">
-                  <a14:hiddenLine xmlns="" xmlns:a16="http://schemas.microsoft.com/office/drawing/2014/main" xmlns:p14="http://schemas.microsoft.com/office/powerpoint/2010/main" xmlns:a14="http://schemas.microsoft.com/office/drawing/2010/main" w="9525">
+                  <a14:hiddenLine xmlns:a14="http://schemas.microsoft.com/office/drawing/2010/main" xmlns:p14="http://schemas.microsoft.com/office/powerpoint/2010/main" xmlns:a16="http://schemas.microsoft.com/office/drawing/2014/main" xmlns="" w="9525">
                     <a:solidFill>
                       <a:srgbClr val="000000"/>
                     </a:solidFill>
@@ -22646,7 +22879,7 @@
               </a:ln>
               <a:extLst>
                 <a:ext uri="{91240B29-F687-4f45-9708-019B960494DF}">
-                  <a14:hiddenLine xmlns="" xmlns:a16="http://schemas.microsoft.com/office/drawing/2014/main" xmlns:p14="http://schemas.microsoft.com/office/powerpoint/2010/main" xmlns:a14="http://schemas.microsoft.com/office/drawing/2010/main" w="9525">
+                  <a14:hiddenLine xmlns:a14="http://schemas.microsoft.com/office/drawing/2010/main" xmlns:p14="http://schemas.microsoft.com/office/powerpoint/2010/main" xmlns:a16="http://schemas.microsoft.com/office/drawing/2014/main" xmlns="" w="9525">
                     <a:solidFill>
                       <a:srgbClr val="000000"/>
                     </a:solidFill>
@@ -22751,7 +22984,7 @@
               </a:ln>
               <a:extLst>
                 <a:ext uri="{91240B29-F687-4f45-9708-019B960494DF}">
-                  <a14:hiddenLine xmlns="" xmlns:a16="http://schemas.microsoft.com/office/drawing/2014/main" xmlns:p14="http://schemas.microsoft.com/office/powerpoint/2010/main" xmlns:a14="http://schemas.microsoft.com/office/drawing/2010/main" w="9525">
+                  <a14:hiddenLine xmlns:a14="http://schemas.microsoft.com/office/drawing/2010/main" xmlns:p14="http://schemas.microsoft.com/office/powerpoint/2010/main" xmlns:a16="http://schemas.microsoft.com/office/drawing/2014/main" xmlns="" w="9525">
                     <a:solidFill>
                       <a:srgbClr val="000000"/>
                     </a:solidFill>
@@ -22834,7 +23067,7 @@
               </a:ln>
               <a:extLst>
                 <a:ext uri="{91240B29-F687-4f45-9708-019B960494DF}">
-                  <a14:hiddenLine xmlns="" xmlns:a16="http://schemas.microsoft.com/office/drawing/2014/main" xmlns:p14="http://schemas.microsoft.com/office/powerpoint/2010/main" xmlns:a14="http://schemas.microsoft.com/office/drawing/2010/main" w="9525">
+                  <a14:hiddenLine xmlns:a14="http://schemas.microsoft.com/office/drawing/2010/main" xmlns:p14="http://schemas.microsoft.com/office/powerpoint/2010/main" xmlns:a16="http://schemas.microsoft.com/office/drawing/2014/main" xmlns="" w="9525">
                     <a:solidFill>
                       <a:srgbClr val="000000"/>
                     </a:solidFill>
@@ -22939,7 +23172,7 @@
               </a:ln>
               <a:extLst>
                 <a:ext uri="{91240B29-F687-4f45-9708-019B960494DF}">
-                  <a14:hiddenLine xmlns="" xmlns:a16="http://schemas.microsoft.com/office/drawing/2014/main" xmlns:p14="http://schemas.microsoft.com/office/powerpoint/2010/main" xmlns:a14="http://schemas.microsoft.com/office/drawing/2010/main" w="9525">
+                  <a14:hiddenLine xmlns:a14="http://schemas.microsoft.com/office/drawing/2010/main" xmlns:p14="http://schemas.microsoft.com/office/powerpoint/2010/main" xmlns:a16="http://schemas.microsoft.com/office/drawing/2014/main" xmlns="" w="9525">
                     <a:solidFill>
                       <a:srgbClr val="000000"/>
                     </a:solidFill>
@@ -23022,7 +23255,7 @@
               </a:ln>
               <a:extLst>
                 <a:ext uri="{91240B29-F687-4f45-9708-019B960494DF}">
-                  <a14:hiddenLine xmlns="" xmlns:a16="http://schemas.microsoft.com/office/drawing/2014/main" xmlns:p14="http://schemas.microsoft.com/office/powerpoint/2010/main" xmlns:a14="http://schemas.microsoft.com/office/drawing/2010/main" w="9525">
+                  <a14:hiddenLine xmlns:a14="http://schemas.microsoft.com/office/drawing/2010/main" xmlns:p14="http://schemas.microsoft.com/office/powerpoint/2010/main" xmlns:a16="http://schemas.microsoft.com/office/drawing/2014/main" xmlns="" w="9525">
                     <a:solidFill>
                       <a:srgbClr val="000000"/>
                     </a:solidFill>
@@ -23127,7 +23360,7 @@
               </a:ln>
               <a:extLst>
                 <a:ext uri="{91240B29-F687-4f45-9708-019B960494DF}">
-                  <a14:hiddenLine xmlns="" xmlns:a16="http://schemas.microsoft.com/office/drawing/2014/main" xmlns:p14="http://schemas.microsoft.com/office/powerpoint/2010/main" xmlns:a14="http://schemas.microsoft.com/office/drawing/2010/main" w="9525">
+                  <a14:hiddenLine xmlns:a14="http://schemas.microsoft.com/office/drawing/2010/main" xmlns:p14="http://schemas.microsoft.com/office/powerpoint/2010/main" xmlns:a16="http://schemas.microsoft.com/office/drawing/2014/main" xmlns="" w="9525">
                     <a:solidFill>
                       <a:srgbClr val="000000"/>
                     </a:solidFill>
@@ -23176,7 +23409,7 @@
               </a:ln>
               <a:extLst>
                 <a:ext uri="{91240B29-F687-4f45-9708-019B960494DF}">
-                  <a14:hiddenLine xmlns="" xmlns:a16="http://schemas.microsoft.com/office/drawing/2014/main" xmlns:p14="http://schemas.microsoft.com/office/powerpoint/2010/main" xmlns:a14="http://schemas.microsoft.com/office/drawing/2010/main" w="9525">
+                  <a14:hiddenLine xmlns:a14="http://schemas.microsoft.com/office/drawing/2010/main" xmlns:p14="http://schemas.microsoft.com/office/powerpoint/2010/main" xmlns:a16="http://schemas.microsoft.com/office/drawing/2014/main" xmlns="" w="9525">
                     <a:solidFill>
                       <a:srgbClr val="000000"/>
                     </a:solidFill>
@@ -23296,7 +23529,7 @@
           </a:prstGeom>
           <a:extLst>
             <a:ext uri="{909E8E84-426E-40dd-AFC4-6F175D3DCCD1}">
-              <a14:hiddenFill xmlns="" xmlns:a16="http://schemas.microsoft.com/office/drawing/2014/main" xmlns:p14="http://schemas.microsoft.com/office/powerpoint/2010/main" xmlns:a14="http://schemas.microsoft.com/office/drawing/2010/main">
+              <a14:hiddenFill xmlns:a14="http://schemas.microsoft.com/office/drawing/2010/main" xmlns:p14="http://schemas.microsoft.com/office/powerpoint/2010/main" xmlns:a16="http://schemas.microsoft.com/office/drawing/2014/main" xmlns="">
                 <a:solidFill>
                   <a:srgbClr val="FFFFFF"/>
                 </a:solidFill>
@@ -23420,7 +23653,7 @@
           <a:noFill/>
           <a:extLst>
             <a:ext uri="{909E8E84-426E-40dd-AFC4-6F175D3DCCD1}">
-              <a14:hiddenFill xmlns="" xmlns:a16="http://schemas.microsoft.com/office/drawing/2014/main" xmlns:p14="http://schemas.microsoft.com/office/powerpoint/2010/main" xmlns:a14="http://schemas.microsoft.com/office/drawing/2010/main">
+              <a14:hiddenFill xmlns:a14="http://schemas.microsoft.com/office/drawing/2010/main" xmlns:p14="http://schemas.microsoft.com/office/powerpoint/2010/main" xmlns:a16="http://schemas.microsoft.com/office/drawing/2014/main" xmlns="">
                 <a:solidFill>
                   <a:srgbClr val="FFFFFF"/>
                 </a:solidFill>
@@ -23606,7 +23839,7 @@
             </a:ln>
             <a:extLst>
               <a:ext uri="{91240B29-F687-4f45-9708-019B960494DF}">
-                <a14:hiddenLine xmlns="" xmlns:a16="http://schemas.microsoft.com/office/drawing/2014/main" xmlns:p14="http://schemas.microsoft.com/office/powerpoint/2010/main" xmlns:a14="http://schemas.microsoft.com/office/drawing/2010/main" w="9525">
+                <a14:hiddenLine xmlns:a14="http://schemas.microsoft.com/office/drawing/2010/main" xmlns:p14="http://schemas.microsoft.com/office/powerpoint/2010/main" xmlns:a16="http://schemas.microsoft.com/office/drawing/2014/main" xmlns="" w="9525">
                   <a:solidFill>
                     <a:srgbClr val="000000"/>
                   </a:solidFill>
@@ -23711,7 +23944,7 @@
             </a:ln>
             <a:extLst>
               <a:ext uri="{91240B29-F687-4f45-9708-019B960494DF}">
-                <a14:hiddenLine xmlns="" xmlns:a16="http://schemas.microsoft.com/office/drawing/2014/main" xmlns:p14="http://schemas.microsoft.com/office/powerpoint/2010/main" xmlns:a14="http://schemas.microsoft.com/office/drawing/2010/main" w="9525">
+                <a14:hiddenLine xmlns:a14="http://schemas.microsoft.com/office/drawing/2010/main" xmlns:p14="http://schemas.microsoft.com/office/powerpoint/2010/main" xmlns:a16="http://schemas.microsoft.com/office/drawing/2014/main" xmlns="" w="9525">
                   <a:solidFill>
                     <a:srgbClr val="000000"/>
                   </a:solidFill>
@@ -23816,7 +24049,7 @@
             </a:ln>
             <a:extLst>
               <a:ext uri="{91240B29-F687-4f45-9708-019B960494DF}">
-                <a14:hiddenLine xmlns="" xmlns:a16="http://schemas.microsoft.com/office/drawing/2014/main" xmlns:p14="http://schemas.microsoft.com/office/powerpoint/2010/main" xmlns:a14="http://schemas.microsoft.com/office/drawing/2010/main" w="9525">
+                <a14:hiddenLine xmlns:a14="http://schemas.microsoft.com/office/drawing/2010/main" xmlns:p14="http://schemas.microsoft.com/office/powerpoint/2010/main" xmlns:a16="http://schemas.microsoft.com/office/drawing/2014/main" xmlns="" w="9525">
                   <a:solidFill>
                     <a:srgbClr val="000000"/>
                   </a:solidFill>
@@ -23893,7 +24126,7 @@
             </a:ln>
             <a:extLst>
               <a:ext uri="{91240B29-F687-4f45-9708-019B960494DF}">
-                <a14:hiddenLine xmlns="" xmlns:a16="http://schemas.microsoft.com/office/drawing/2014/main" xmlns:p14="http://schemas.microsoft.com/office/powerpoint/2010/main" xmlns:a14="http://schemas.microsoft.com/office/drawing/2010/main" w="9525">
+                <a14:hiddenLine xmlns:a14="http://schemas.microsoft.com/office/drawing/2010/main" xmlns:p14="http://schemas.microsoft.com/office/powerpoint/2010/main" xmlns:a16="http://schemas.microsoft.com/office/drawing/2014/main" xmlns="" w="9525">
                   <a:solidFill>
                     <a:srgbClr val="000000"/>
                   </a:solidFill>
@@ -23998,7 +24231,7 @@
             </a:ln>
             <a:extLst>
               <a:ext uri="{91240B29-F687-4f45-9708-019B960494DF}">
-                <a14:hiddenLine xmlns="" xmlns:a16="http://schemas.microsoft.com/office/drawing/2014/main" xmlns:p14="http://schemas.microsoft.com/office/powerpoint/2010/main" xmlns:a14="http://schemas.microsoft.com/office/drawing/2010/main" w="9525">
+                <a14:hiddenLine xmlns:a14="http://schemas.microsoft.com/office/drawing/2010/main" xmlns:p14="http://schemas.microsoft.com/office/powerpoint/2010/main" xmlns:a16="http://schemas.microsoft.com/office/drawing/2014/main" xmlns="" w="9525">
                   <a:solidFill>
                     <a:srgbClr val="000000"/>
                   </a:solidFill>
@@ -24075,7 +24308,7 @@
             </a:ln>
             <a:extLst>
               <a:ext uri="{91240B29-F687-4f45-9708-019B960494DF}">
-                <a14:hiddenLine xmlns="" xmlns:a16="http://schemas.microsoft.com/office/drawing/2014/main" xmlns:p14="http://schemas.microsoft.com/office/powerpoint/2010/main" xmlns:a14="http://schemas.microsoft.com/office/drawing/2010/main" w="9525">
+                <a14:hiddenLine xmlns:a14="http://schemas.microsoft.com/office/drawing/2010/main" xmlns:p14="http://schemas.microsoft.com/office/powerpoint/2010/main" xmlns:a16="http://schemas.microsoft.com/office/drawing/2014/main" xmlns="" w="9525">
                   <a:solidFill>
                     <a:srgbClr val="000000"/>
                   </a:solidFill>
@@ -24152,7 +24385,7 @@
             </a:ln>
             <a:extLst>
               <a:ext uri="{91240B29-F687-4f45-9708-019B960494DF}">
-                <a14:hiddenLine xmlns="" xmlns:a16="http://schemas.microsoft.com/office/drawing/2014/main" xmlns:p14="http://schemas.microsoft.com/office/powerpoint/2010/main" xmlns:a14="http://schemas.microsoft.com/office/drawing/2010/main" w="9525">
+                <a14:hiddenLine xmlns:a14="http://schemas.microsoft.com/office/drawing/2010/main" xmlns:p14="http://schemas.microsoft.com/office/powerpoint/2010/main" xmlns:a16="http://schemas.microsoft.com/office/drawing/2014/main" xmlns="" w="9525">
                   <a:solidFill>
                     <a:srgbClr val="000000"/>
                   </a:solidFill>
@@ -24257,7 +24490,7 @@
             </a:ln>
             <a:extLst>
               <a:ext uri="{91240B29-F687-4f45-9708-019B960494DF}">
-                <a14:hiddenLine xmlns="" xmlns:a16="http://schemas.microsoft.com/office/drawing/2014/main" xmlns:p14="http://schemas.microsoft.com/office/powerpoint/2010/main" xmlns:a14="http://schemas.microsoft.com/office/drawing/2010/main" w="9525">
+                <a14:hiddenLine xmlns:a14="http://schemas.microsoft.com/office/drawing/2010/main" xmlns:p14="http://schemas.microsoft.com/office/powerpoint/2010/main" xmlns:a16="http://schemas.microsoft.com/office/drawing/2014/main" xmlns="" w="9525">
                   <a:solidFill>
                     <a:srgbClr val="000000"/>
                   </a:solidFill>
@@ -24362,7 +24595,7 @@
             </a:ln>
             <a:extLst>
               <a:ext uri="{91240B29-F687-4f45-9708-019B960494DF}">
-                <a14:hiddenLine xmlns="" xmlns:a16="http://schemas.microsoft.com/office/drawing/2014/main" xmlns:p14="http://schemas.microsoft.com/office/powerpoint/2010/main" xmlns:a14="http://schemas.microsoft.com/office/drawing/2010/main" w="9525">
+                <a14:hiddenLine xmlns:a14="http://schemas.microsoft.com/office/drawing/2010/main" xmlns:p14="http://schemas.microsoft.com/office/powerpoint/2010/main" xmlns:a16="http://schemas.microsoft.com/office/drawing/2014/main" xmlns="" w="9525">
                   <a:solidFill>
                     <a:srgbClr val="000000"/>
                   </a:solidFill>
@@ -24439,7 +24672,7 @@
             </a:ln>
             <a:extLst>
               <a:ext uri="{91240B29-F687-4f45-9708-019B960494DF}">
-                <a14:hiddenLine xmlns="" xmlns:a16="http://schemas.microsoft.com/office/drawing/2014/main" xmlns:p14="http://schemas.microsoft.com/office/powerpoint/2010/main" xmlns:a14="http://schemas.microsoft.com/office/drawing/2010/main" w="9525">
+                <a14:hiddenLine xmlns:a14="http://schemas.microsoft.com/office/drawing/2010/main" xmlns:p14="http://schemas.microsoft.com/office/powerpoint/2010/main" xmlns:a16="http://schemas.microsoft.com/office/drawing/2014/main" xmlns="" w="9525">
                   <a:solidFill>
                     <a:srgbClr val="000000"/>
                   </a:solidFill>
@@ -24564,7 +24797,7 @@
             </a:ln>
             <a:extLst>
               <a:ext uri="{91240B29-F687-4f45-9708-019B960494DF}">
-                <a14:hiddenLine xmlns="" xmlns:a16="http://schemas.microsoft.com/office/drawing/2014/main" xmlns:p14="http://schemas.microsoft.com/office/powerpoint/2010/main" xmlns:a14="http://schemas.microsoft.com/office/drawing/2010/main" w="9525">
+                <a14:hiddenLine xmlns:a14="http://schemas.microsoft.com/office/drawing/2010/main" xmlns:p14="http://schemas.microsoft.com/office/powerpoint/2010/main" xmlns:a16="http://schemas.microsoft.com/office/drawing/2014/main" xmlns="" w="9525">
                   <a:solidFill>
                     <a:srgbClr val="000000"/>
                   </a:solidFill>
@@ -24678,7 +24911,7 @@
             </a:ln>
             <a:extLst>
               <a:ext uri="{91240B29-F687-4f45-9708-019B960494DF}">
-                <a14:hiddenLine xmlns="" xmlns:a16="http://schemas.microsoft.com/office/drawing/2014/main" xmlns:p14="http://schemas.microsoft.com/office/powerpoint/2010/main" xmlns:a14="http://schemas.microsoft.com/office/drawing/2010/main" w="9525">
+                <a14:hiddenLine xmlns:a14="http://schemas.microsoft.com/office/drawing/2010/main" xmlns:p14="http://schemas.microsoft.com/office/powerpoint/2010/main" xmlns:a16="http://schemas.microsoft.com/office/drawing/2014/main" xmlns="" w="9525">
                   <a:solidFill>
                     <a:srgbClr val="000000"/>
                   </a:solidFill>
@@ -24755,7 +24988,7 @@
             </a:ln>
             <a:extLst>
               <a:ext uri="{91240B29-F687-4f45-9708-019B960494DF}">
-                <a14:hiddenLine xmlns="" xmlns:a16="http://schemas.microsoft.com/office/drawing/2014/main" xmlns:p14="http://schemas.microsoft.com/office/powerpoint/2010/main" xmlns:a14="http://schemas.microsoft.com/office/drawing/2010/main" w="9525">
+                <a14:hiddenLine xmlns:a14="http://schemas.microsoft.com/office/drawing/2010/main" xmlns:p14="http://schemas.microsoft.com/office/powerpoint/2010/main" xmlns:a16="http://schemas.microsoft.com/office/drawing/2014/main" xmlns="" w="9525">
                   <a:solidFill>
                     <a:srgbClr val="000000"/>
                   </a:solidFill>
@@ -24832,7 +25065,7 @@
             </a:ln>
             <a:extLst>
               <a:ext uri="{91240B29-F687-4f45-9708-019B960494DF}">
-                <a14:hiddenLine xmlns="" xmlns:a16="http://schemas.microsoft.com/office/drawing/2014/main" xmlns:p14="http://schemas.microsoft.com/office/powerpoint/2010/main" xmlns:a14="http://schemas.microsoft.com/office/drawing/2010/main" w="9525">
+                <a14:hiddenLine xmlns:a14="http://schemas.microsoft.com/office/drawing/2010/main" xmlns:p14="http://schemas.microsoft.com/office/powerpoint/2010/main" xmlns:a16="http://schemas.microsoft.com/office/drawing/2014/main" xmlns="" w="9525">
                   <a:solidFill>
                     <a:srgbClr val="000000"/>
                   </a:solidFill>
@@ -24937,7 +25170,7 @@
             </a:ln>
             <a:extLst>
               <a:ext uri="{91240B29-F687-4f45-9708-019B960494DF}">
-                <a14:hiddenLine xmlns="" xmlns:a16="http://schemas.microsoft.com/office/drawing/2014/main" xmlns:p14="http://schemas.microsoft.com/office/powerpoint/2010/main" xmlns:a14="http://schemas.microsoft.com/office/drawing/2010/main" w="9525">
+                <a14:hiddenLine xmlns:a14="http://schemas.microsoft.com/office/drawing/2010/main" xmlns:p14="http://schemas.microsoft.com/office/powerpoint/2010/main" xmlns:a16="http://schemas.microsoft.com/office/drawing/2014/main" xmlns="" w="9525">
                   <a:solidFill>
                     <a:srgbClr val="000000"/>
                   </a:solidFill>
@@ -24986,7 +25219,7 @@
             </a:ln>
             <a:extLst>
               <a:ext uri="{91240B29-F687-4f45-9708-019B960494DF}">
-                <a14:hiddenLine xmlns="" xmlns:a16="http://schemas.microsoft.com/office/drawing/2014/main" xmlns:p14="http://schemas.microsoft.com/office/powerpoint/2010/main" xmlns:a14="http://schemas.microsoft.com/office/drawing/2010/main" w="9525">
+                <a14:hiddenLine xmlns:a14="http://schemas.microsoft.com/office/drawing/2010/main" xmlns:p14="http://schemas.microsoft.com/office/powerpoint/2010/main" xmlns:a16="http://schemas.microsoft.com/office/drawing/2014/main" xmlns="" w="9525">
                   <a:solidFill>
                     <a:srgbClr val="000000"/>
                   </a:solidFill>
@@ -25066,7 +25299,7 @@
             </a:ln>
             <a:extLst>
               <a:ext uri="{91240B29-F687-4f45-9708-019B960494DF}">
-                <a14:hiddenLine xmlns="" xmlns:a16="http://schemas.microsoft.com/office/drawing/2014/main" xmlns:p14="http://schemas.microsoft.com/office/powerpoint/2010/main" xmlns:a14="http://schemas.microsoft.com/office/drawing/2010/main" w="9525">
+                <a14:hiddenLine xmlns:a14="http://schemas.microsoft.com/office/drawing/2010/main" xmlns:p14="http://schemas.microsoft.com/office/powerpoint/2010/main" xmlns:a16="http://schemas.microsoft.com/office/drawing/2014/main" xmlns="" w="9525">
                   <a:solidFill>
                     <a:srgbClr val="000000"/>
                   </a:solidFill>
@@ -25171,7 +25404,7 @@
             </a:ln>
             <a:extLst>
               <a:ext uri="{91240B29-F687-4f45-9708-019B960494DF}">
-                <a14:hiddenLine xmlns="" xmlns:a16="http://schemas.microsoft.com/office/drawing/2014/main" xmlns:p14="http://schemas.microsoft.com/office/powerpoint/2010/main" xmlns:a14="http://schemas.microsoft.com/office/drawing/2010/main" w="9525">
+                <a14:hiddenLine xmlns:a14="http://schemas.microsoft.com/office/drawing/2010/main" xmlns:p14="http://schemas.microsoft.com/office/powerpoint/2010/main" xmlns:a16="http://schemas.microsoft.com/office/drawing/2014/main" xmlns="" w="9525">
                   <a:solidFill>
                     <a:srgbClr val="000000"/>
                   </a:solidFill>
@@ -25248,7 +25481,7 @@
             </a:ln>
             <a:extLst>
               <a:ext uri="{91240B29-F687-4f45-9708-019B960494DF}">
-                <a14:hiddenLine xmlns="" xmlns:a16="http://schemas.microsoft.com/office/drawing/2014/main" xmlns:p14="http://schemas.microsoft.com/office/powerpoint/2010/main" xmlns:a14="http://schemas.microsoft.com/office/drawing/2010/main" w="9525">
+                <a14:hiddenLine xmlns:a14="http://schemas.microsoft.com/office/drawing/2010/main" xmlns:p14="http://schemas.microsoft.com/office/powerpoint/2010/main" xmlns:a16="http://schemas.microsoft.com/office/drawing/2014/main" xmlns="" w="9525">
                   <a:solidFill>
                     <a:srgbClr val="000000"/>
                   </a:solidFill>
@@ -25353,7 +25586,7 @@
             </a:ln>
             <a:extLst>
               <a:ext uri="{91240B29-F687-4f45-9708-019B960494DF}">
-                <a14:hiddenLine xmlns="" xmlns:a16="http://schemas.microsoft.com/office/drawing/2014/main" xmlns:p14="http://schemas.microsoft.com/office/powerpoint/2010/main" xmlns:a14="http://schemas.microsoft.com/office/drawing/2010/main" w="9525">
+                <a14:hiddenLine xmlns:a14="http://schemas.microsoft.com/office/drawing/2010/main" xmlns:p14="http://schemas.microsoft.com/office/powerpoint/2010/main" xmlns:a16="http://schemas.microsoft.com/office/drawing/2014/main" xmlns="" w="9525">
                   <a:solidFill>
                     <a:srgbClr val="000000"/>
                   </a:solidFill>
@@ -25433,7 +25666,7 @@
             </a:ln>
             <a:extLst>
               <a:ext uri="{91240B29-F687-4f45-9708-019B960494DF}">
-                <a14:hiddenLine xmlns="" xmlns:a16="http://schemas.microsoft.com/office/drawing/2014/main" xmlns:p14="http://schemas.microsoft.com/office/powerpoint/2010/main" xmlns:a14="http://schemas.microsoft.com/office/drawing/2010/main" w="9525">
+                <a14:hiddenLine xmlns:a14="http://schemas.microsoft.com/office/drawing/2010/main" xmlns:p14="http://schemas.microsoft.com/office/powerpoint/2010/main" xmlns:a16="http://schemas.microsoft.com/office/drawing/2014/main" xmlns="" w="9525">
                   <a:solidFill>
                     <a:srgbClr val="000000"/>
                   </a:solidFill>
@@ -25510,7 +25743,7 @@
             </a:ln>
             <a:extLst>
               <a:ext uri="{91240B29-F687-4f45-9708-019B960494DF}">
-                <a14:hiddenLine xmlns="" xmlns:a16="http://schemas.microsoft.com/office/drawing/2014/main" xmlns:p14="http://schemas.microsoft.com/office/powerpoint/2010/main" xmlns:a14="http://schemas.microsoft.com/office/drawing/2010/main" w="9525">
+                <a14:hiddenLine xmlns:a14="http://schemas.microsoft.com/office/drawing/2010/main" xmlns:p14="http://schemas.microsoft.com/office/powerpoint/2010/main" xmlns:a16="http://schemas.microsoft.com/office/drawing/2014/main" xmlns="" w="9525">
                   <a:solidFill>
                     <a:srgbClr val="000000"/>
                   </a:solidFill>
@@ -25615,7 +25848,7 @@
             </a:ln>
             <a:extLst>
               <a:ext uri="{91240B29-F687-4f45-9708-019B960494DF}">
-                <a14:hiddenLine xmlns="" xmlns:a16="http://schemas.microsoft.com/office/drawing/2014/main" xmlns:p14="http://schemas.microsoft.com/office/powerpoint/2010/main" xmlns:a14="http://schemas.microsoft.com/office/drawing/2010/main" w="9525">
+                <a14:hiddenLine xmlns:a14="http://schemas.microsoft.com/office/drawing/2010/main" xmlns:p14="http://schemas.microsoft.com/office/powerpoint/2010/main" xmlns:a16="http://schemas.microsoft.com/office/drawing/2014/main" xmlns="" w="9525">
                   <a:solidFill>
                     <a:srgbClr val="000000"/>
                   </a:solidFill>
@@ -25720,7 +25953,7 @@
             </a:ln>
             <a:extLst>
               <a:ext uri="{91240B29-F687-4f45-9708-019B960494DF}">
-                <a14:hiddenLine xmlns="" xmlns:a16="http://schemas.microsoft.com/office/drawing/2014/main" xmlns:p14="http://schemas.microsoft.com/office/powerpoint/2010/main" xmlns:a14="http://schemas.microsoft.com/office/drawing/2010/main" w="9525">
+                <a14:hiddenLine xmlns:a14="http://schemas.microsoft.com/office/drawing/2010/main" xmlns:p14="http://schemas.microsoft.com/office/powerpoint/2010/main" xmlns:a16="http://schemas.microsoft.com/office/drawing/2014/main" xmlns="" w="9525">
                   <a:solidFill>
                     <a:srgbClr val="000000"/>
                   </a:solidFill>
@@ -25800,7 +26033,7 @@
             </a:ln>
             <a:extLst>
               <a:ext uri="{91240B29-F687-4f45-9708-019B960494DF}">
-                <a14:hiddenLine xmlns="" xmlns:a16="http://schemas.microsoft.com/office/drawing/2014/main" xmlns:p14="http://schemas.microsoft.com/office/powerpoint/2010/main" xmlns:a14="http://schemas.microsoft.com/office/drawing/2010/main" w="9525">
+                <a14:hiddenLine xmlns:a14="http://schemas.microsoft.com/office/drawing/2010/main" xmlns:p14="http://schemas.microsoft.com/office/powerpoint/2010/main" xmlns:a16="http://schemas.microsoft.com/office/drawing/2014/main" xmlns="" w="9525">
                   <a:solidFill>
                     <a:srgbClr val="000000"/>
                   </a:solidFill>
@@ -25935,7 +26168,7 @@
             </a:ln>
             <a:extLst>
               <a:ext uri="{91240B29-F687-4f45-9708-019B960494DF}">
-                <a14:hiddenLine xmlns="" xmlns:a16="http://schemas.microsoft.com/office/drawing/2014/main" xmlns:p14="http://schemas.microsoft.com/office/powerpoint/2010/main" xmlns:a14="http://schemas.microsoft.com/office/drawing/2010/main" w="9525">
+                <a14:hiddenLine xmlns:a14="http://schemas.microsoft.com/office/drawing/2010/main" xmlns:p14="http://schemas.microsoft.com/office/powerpoint/2010/main" xmlns:a16="http://schemas.microsoft.com/office/drawing/2014/main" xmlns="" w="9525">
                   <a:solidFill>
                     <a:srgbClr val="000000"/>
                   </a:solidFill>
@@ -26026,6 +26259,94 @@
             <p:ph type="title"/>
           </p:nvPr>
         </p:nvSpPr>
+        <p:spPr/>
+        <p:txBody>
+          <a:bodyPr>
+            <a:normAutofit/>
+          </a:bodyPr>
+          <a:lstStyle/>
+          <a:p>
+            <a:r>
+              <a:rPr lang="en-US" dirty="0"/>
+              <a:t>perceived ease of requesting leave for a mental health disorder</a:t>
+            </a:r>
+          </a:p>
+        </p:txBody>
+      </p:sp>
+      <p:sp>
+        <p:nvSpPr>
+          <p:cNvPr id="3" name="Content Placeholder 2">
+            <a:extLst>
+              <a:ext uri="{FF2B5EF4-FFF2-40B4-BE49-F238E27FC236}">
+                <a16:creationId xmlns:a16="http://schemas.microsoft.com/office/drawing/2014/main" id="{97CBDE5E-E094-449C-8357-D5161AAA1635}"/>
+              </a:ext>
+            </a:extLst>
+          </p:cNvPr>
+          <p:cNvSpPr>
+            <a:spLocks noGrp="1"/>
+          </p:cNvSpPr>
+          <p:nvPr>
+            <p:ph idx="1"/>
+          </p:nvPr>
+        </p:nvSpPr>
+        <p:spPr/>
+        <p:txBody>
+          <a:bodyPr/>
+          <a:lstStyle/>
+          <a:p>
+            <a:r>
+              <a:rPr lang="en-US" dirty="0"/>
+              <a:t>We looked at how answers to the question “If a mental health issue prompted you to request a medical leave from work asking for that leave would be?” varied when doing a crosstab table and bar chart with reported company characteristics and other employee perceptions/experiences.  </a:t>
+            </a:r>
+          </a:p>
+        </p:txBody>
+      </p:sp>
+    </p:spTree>
+    <p:extLst>
+      <p:ext uri="{BB962C8B-B14F-4D97-AF65-F5344CB8AC3E}">
+        <p14:creationId xmlns:p14="http://schemas.microsoft.com/office/powerpoint/2010/main" val="1871619017"/>
+      </p:ext>
+    </p:extLst>
+  </p:cSld>
+  <p:clrMapOvr>
+    <a:masterClrMapping/>
+  </p:clrMapOvr>
+</p:sld>
+</file>
+
+<file path=ppt/slides/slide13.xml><?xml version="1.0" encoding="utf-8"?>
+<p:sld xmlns:a="http://schemas.openxmlformats.org/drawingml/2006/main" xmlns:r="http://schemas.openxmlformats.org/officeDocument/2006/relationships" xmlns:p="http://schemas.openxmlformats.org/presentationml/2006/main">
+  <p:cSld>
+    <p:spTree>
+      <p:nvGrpSpPr>
+        <p:cNvPr id="1" name=""/>
+        <p:cNvGrpSpPr/>
+        <p:nvPr/>
+      </p:nvGrpSpPr>
+      <p:grpSpPr>
+        <a:xfrm>
+          <a:off x="0" y="0"/>
+          <a:ext cx="0" cy="0"/>
+          <a:chOff x="0" y="0"/>
+          <a:chExt cx="0" cy="0"/>
+        </a:xfrm>
+      </p:grpSpPr>
+      <p:sp>
+        <p:nvSpPr>
+          <p:cNvPr id="2" name="Title 1">
+            <a:extLst>
+              <a:ext uri="{FF2B5EF4-FFF2-40B4-BE49-F238E27FC236}">
+                <a16:creationId xmlns:a16="http://schemas.microsoft.com/office/drawing/2014/main" id="{1C26D2EE-B540-43AD-B763-A8C2872AD62D}"/>
+              </a:ext>
+            </a:extLst>
+          </p:cNvPr>
+          <p:cNvSpPr>
+            <a:spLocks noGrp="1"/>
+          </p:cNvSpPr>
+          <p:nvPr>
+            <p:ph type="title"/>
+          </p:nvPr>
+        </p:nvSpPr>
         <p:spPr>
           <a:xfrm>
             <a:off x="1141413" y="290512"/>
@@ -26047,10 +26368,10 @@
       </p:sp>
       <p:graphicFrame>
         <p:nvGraphicFramePr>
-          <p:cNvPr id="4" name="Content Placeholder 3">
+          <p:cNvPr id="5" name="Content Placeholder 3">
             <a:extLst>
               <a:ext uri="{FF2B5EF4-FFF2-40B4-BE49-F238E27FC236}">
-                <a16:creationId xmlns:a16="http://schemas.microsoft.com/office/drawing/2014/main" id="{D50F5F4B-F5FF-44B4-AAFA-2B8132C60A69}"/>
+                <a16:creationId xmlns:a16="http://schemas.microsoft.com/office/drawing/2014/main" id="{65360C11-67DC-4985-989F-8D6714A316FF}"/>
               </a:ext>
             </a:extLst>
           </p:cNvPr>
@@ -26061,14 +26382,14 @@
             <p:ph idx="1"/>
             <p:extLst>
               <p:ext uri="{D42A27DB-BD31-4B8C-83A1-F6EECF244321}">
-                <p14:modId xmlns:p14="http://schemas.microsoft.com/office/powerpoint/2010/main" val="4276858793"/>
+                <p14:modId xmlns:p14="http://schemas.microsoft.com/office/powerpoint/2010/main" val="3020614584"/>
               </p:ext>
             </p:extLst>
           </p:nvPr>
         </p:nvGraphicFramePr>
         <p:xfrm>
-          <a:off x="1141413" y="2269808"/>
-          <a:ext cx="9906006" cy="4297680"/>
+          <a:off x="351693" y="1402721"/>
+          <a:ext cx="11591778" cy="5180587"/>
         </p:xfrm>
         <a:graphic>
           <a:graphicData uri="http://schemas.openxmlformats.org/drawingml/2006/table">
@@ -26077,21 +26398,14 @@
                 <a:tableStyleId>{00A15C55-8517-42AA-B614-E9B94910E393}</a:tableStyleId>
               </a:tblPr>
               <a:tblGrid>
-                <a:gridCol w="3302002">
+                <a:gridCol w="5133419">
                   <a:extLst>
                     <a:ext uri="{9D8B030D-6E8A-4147-A177-3AD203B41FA5}">
                       <a16:colId xmlns:a16="http://schemas.microsoft.com/office/drawing/2014/main" val="4103502791"/>
                     </a:ext>
                   </a:extLst>
                 </a:gridCol>
-                <a:gridCol w="3302002">
-                  <a:extLst>
-                    <a:ext uri="{9D8B030D-6E8A-4147-A177-3AD203B41FA5}">
-                      <a16:colId xmlns:a16="http://schemas.microsoft.com/office/drawing/2014/main" val="1402590756"/>
-                    </a:ext>
-                  </a:extLst>
-                </a:gridCol>
-                <a:gridCol w="3302002">
+                <a:gridCol w="6458359">
                   <a:extLst>
                     <a:ext uri="{9D8B030D-6E8A-4147-A177-3AD203B41FA5}">
                       <a16:colId xmlns:a16="http://schemas.microsoft.com/office/drawing/2014/main" val="3079260396"/>
@@ -26099,7 +26413,7 @@
                   </a:extLst>
                 </a:gridCol>
               </a:tblGrid>
-              <a:tr h="333813">
+              <a:tr h="369808">
                 <a:tc>
                   <a:txBody>
                     <a:bodyPr/>
@@ -26108,19 +26422,6 @@
                       <a:r>
                         <a:rPr lang="en-US" dirty="0"/>
                         <a:t>Reported Characteristic</a:t>
-                      </a:r>
-                    </a:p>
-                  </a:txBody>
-                  <a:tcPr marL="91439" marR="91439"/>
-                </a:tc>
-                <a:tc>
-                  <a:txBody>
-                    <a:bodyPr/>
-                    <a:lstStyle/>
-                    <a:p>
-                      <a:r>
-                        <a:rPr lang="en-US" dirty="0"/>
-                        <a:t>Is there a relationship?</a:t>
                       </a:r>
                     </a:p>
                   </a:txBody>
@@ -26145,7 +26446,7 @@
                   </a:ext>
                 </a:extLst>
               </a:tr>
-              <a:tr h="333813">
+              <a:tr h="386490">
                 <a:tc>
                   <a:txBody>
                     <a:bodyPr/>
@@ -26164,17 +26465,10 @@
                     <a:bodyPr/>
                     <a:lstStyle/>
                     <a:p>
-                      <a:endParaRPr lang="en-US" dirty="0"/>
-                    </a:p>
-                  </a:txBody>
-                  <a:tcPr marL="91439" marR="91439"/>
-                </a:tc>
-                <a:tc>
-                  <a:txBody>
-                    <a:bodyPr/>
-                    <a:lstStyle/>
-                    <a:p>
-                      <a:endParaRPr lang="en-US"/>
+                      <a:r>
+                        <a:rPr lang="en-US" dirty="0"/>
+                        <a:t>“Somewhat easy” is the most common answer across genders.  </a:t>
+                      </a:r>
                     </a:p>
                   </a:txBody>
                   <a:tcPr marL="91439" marR="91439"/>
@@ -26185,7 +26479,7 @@
                   </a:ext>
                 </a:extLst>
               </a:tr>
-              <a:tr h="333813">
+              <a:tr h="316895">
                 <a:tc>
                   <a:txBody>
                     <a:bodyPr/>
@@ -26204,17 +26498,19 @@
                     <a:bodyPr/>
                     <a:lstStyle/>
                     <a:p>
+                      <a:r>
+                        <a:rPr lang="en-US" sz="1800" kern="1200" dirty="0">
+                          <a:solidFill>
+                            <a:schemeClr val="dk1"/>
+                          </a:solidFill>
+                          <a:effectLst/>
+                          <a:latin typeface="+mn-lt"/>
+                          <a:ea typeface="+mn-ea"/>
+                          <a:cs typeface="+mn-cs"/>
+                        </a:rPr>
+                        <a:t>“Somewhat easy” most common answer for 17-27 and 37-57. </a:t>
+                      </a:r>
                       <a:endParaRPr lang="en-US" dirty="0"/>
-                    </a:p>
-                  </a:txBody>
-                  <a:tcPr marL="91439" marR="91439"/>
-                </a:tc>
-                <a:tc>
-                  <a:txBody>
-                    <a:bodyPr/>
-                    <a:lstStyle/>
-                    <a:p>
-                      <a:endParaRPr lang="en-US"/>
                     </a:p>
                   </a:txBody>
                   <a:tcPr marL="91439" marR="91439"/>
@@ -26225,7 +26521,7 @@
                   </a:ext>
                 </a:extLst>
               </a:tr>
-              <a:tr h="333813">
+              <a:tr h="400929">
                 <a:tc>
                   <a:txBody>
                     <a:bodyPr/>
@@ -26244,17 +26540,19 @@
                     <a:bodyPr/>
                     <a:lstStyle/>
                     <a:p>
-                      <a:endParaRPr lang="en-US"/>
-                    </a:p>
-                  </a:txBody>
-                  <a:tcPr marL="91439" marR="91439"/>
-                </a:tc>
-                <a:tc>
-                  <a:txBody>
-                    <a:bodyPr/>
-                    <a:lstStyle/>
-                    <a:p>
-                      <a:endParaRPr lang="en-US"/>
+                      <a:r>
+                        <a:rPr lang="en-US" sz="1800" kern="1200" dirty="0">
+                          <a:solidFill>
+                            <a:schemeClr val="dk1"/>
+                          </a:solidFill>
+                          <a:effectLst/>
+                          <a:latin typeface="+mn-lt"/>
+                          <a:ea typeface="+mn-ea"/>
+                          <a:cs typeface="+mn-cs"/>
+                        </a:rPr>
+                        <a:t>As company size goes up, may be thought as easier to request leave.  </a:t>
+                      </a:r>
+                      <a:endParaRPr lang="en-US" dirty="0"/>
                     </a:p>
                   </a:txBody>
                   <a:tcPr marL="91439" marR="91439"/>
@@ -26265,7 +26563,7 @@
                   </a:ext>
                 </a:extLst>
               </a:tr>
-              <a:tr h="584173">
+              <a:tr h="622548">
                 <a:tc>
                   <a:txBody>
                     <a:bodyPr/>
@@ -26284,17 +26582,10 @@
                     <a:bodyPr/>
                     <a:lstStyle/>
                     <a:p>
-                      <a:endParaRPr lang="en-US"/>
-                    </a:p>
-                  </a:txBody>
-                  <a:tcPr marL="91439" marR="91439"/>
-                </a:tc>
-                <a:tc>
-                  <a:txBody>
-                    <a:bodyPr/>
-                    <a:lstStyle/>
-                    <a:p>
-                      <a:endParaRPr lang="en-US" dirty="0"/>
+                      <a:r>
+                        <a:rPr lang="en-US" dirty="0"/>
+                        <a:t>Those who do not have mental health benefits answer that it is somewhat difficult to request leave the most often.  Those who do, answer that it is somewhat easy the most often. </a:t>
+                      </a:r>
                     </a:p>
                   </a:txBody>
                   <a:tcPr marL="91439" marR="91439"/>
@@ -26305,7 +26596,7 @@
                   </a:ext>
                 </a:extLst>
               </a:tr>
-              <a:tr h="584173">
+              <a:tr h="622548">
                 <a:tc>
                   <a:txBody>
                     <a:bodyPr/>
@@ -26324,17 +26615,39 @@
                     <a:bodyPr/>
                     <a:lstStyle/>
                     <a:p>
-                      <a:endParaRPr lang="en-US"/>
-                    </a:p>
-                  </a:txBody>
-                  <a:tcPr marL="91439" marR="91439"/>
-                </a:tc>
-                <a:tc>
-                  <a:txBody>
-                    <a:bodyPr/>
-                    <a:lstStyle/>
-                    <a:p>
-                      <a:endParaRPr lang="en-US" dirty="0"/>
+                      <a:pPr marL="0" marR="0" lvl="0" indent="0" algn="l" defTabSz="914400" rtl="0" eaLnBrk="1" fontAlgn="auto" latinLnBrk="0" hangingPunct="1">
+                        <a:lnSpc>
+                          <a:spcPct val="100000"/>
+                        </a:lnSpc>
+                        <a:spcBef>
+                          <a:spcPts val="0"/>
+                        </a:spcBef>
+                        <a:spcAft>
+                          <a:spcPts val="0"/>
+                        </a:spcAft>
+                        <a:buClrTx/>
+                        <a:buSzTx/>
+                        <a:buFontTx/>
+                        <a:buNone/>
+                        <a:tabLst/>
+                        <a:defRPr/>
+                      </a:pPr>
+                      <a:r>
+                        <a:rPr lang="en-US" dirty="0"/>
+                        <a:t>Most common response is somewhat easy to request leave. </a:t>
+                      </a:r>
+                      <a:r>
+                        <a:rPr lang="en-US" sz="1800" kern="1200" dirty="0">
+                          <a:solidFill>
+                            <a:schemeClr val="dk1"/>
+                          </a:solidFill>
+                          <a:effectLst/>
+                          <a:latin typeface="+mn-lt"/>
+                          <a:ea typeface="+mn-ea"/>
+                          <a:cs typeface="+mn-cs"/>
+                        </a:rPr>
+                        <a:t>For those who had a discussion, second most common response is very easy. For those with no discussion, second most common is somewhat hard.</a:t>
+                      </a:r>
                     </a:p>
                   </a:txBody>
                   <a:tcPr marL="91439" marR="91439"/>
@@ -26345,7 +26658,7 @@
                   </a:ext>
                 </a:extLst>
               </a:tr>
-              <a:tr h="584173">
+              <a:tr h="622548">
                 <a:tc>
                   <a:txBody>
                     <a:bodyPr/>
@@ -26364,17 +26677,39 @@
                     <a:bodyPr/>
                     <a:lstStyle/>
                     <a:p>
-                      <a:endParaRPr lang="en-US"/>
-                    </a:p>
-                  </a:txBody>
-                  <a:tcPr marL="91439" marR="91439"/>
-                </a:tc>
-                <a:tc>
-                  <a:txBody>
-                    <a:bodyPr/>
-                    <a:lstStyle/>
-                    <a:p>
-                      <a:endParaRPr lang="en-US" dirty="0"/>
+                      <a:pPr marL="0" marR="0" lvl="0" indent="0" algn="l" defTabSz="914400" rtl="0" eaLnBrk="1" fontAlgn="auto" latinLnBrk="0" hangingPunct="1">
+                        <a:lnSpc>
+                          <a:spcPct val="100000"/>
+                        </a:lnSpc>
+                        <a:spcBef>
+                          <a:spcPts val="0"/>
+                        </a:spcBef>
+                        <a:spcAft>
+                          <a:spcPts val="0"/>
+                        </a:spcAft>
+                        <a:buClrTx/>
+                        <a:buSzTx/>
+                        <a:buFontTx/>
+                        <a:buNone/>
+                        <a:tabLst/>
+                        <a:defRPr/>
+                      </a:pPr>
+                      <a:r>
+                        <a:rPr lang="en-US" dirty="0"/>
+                        <a:t>Most common response is somewhat easy to request leave. </a:t>
+                      </a:r>
+                      <a:r>
+                        <a:rPr lang="en-US" sz="1800" kern="1200" dirty="0">
+                          <a:solidFill>
+                            <a:schemeClr val="dk1"/>
+                          </a:solidFill>
+                          <a:effectLst/>
+                          <a:latin typeface="+mn-lt"/>
+                          <a:ea typeface="+mn-ea"/>
+                          <a:cs typeface="+mn-cs"/>
+                        </a:rPr>
+                        <a:t>For those with other resources, second most common response is very easy. For those without, second most common is somewhat hard.</a:t>
+                      </a:r>
                     </a:p>
                   </a:txBody>
                   <a:tcPr marL="91439" marR="91439"/>
@@ -26385,7 +26720,7 @@
                   </a:ext>
                 </a:extLst>
               </a:tr>
-              <a:tr h="834532">
+              <a:tr h="811673">
                 <a:tc>
                   <a:txBody>
                     <a:bodyPr/>
@@ -26404,17 +26739,10 @@
                     <a:bodyPr/>
                     <a:lstStyle/>
                     <a:p>
-                      <a:endParaRPr lang="en-US"/>
-                    </a:p>
-                  </a:txBody>
-                  <a:tcPr marL="91439" marR="91439"/>
-                </a:tc>
-                <a:tc>
-                  <a:txBody>
-                    <a:bodyPr/>
-                    <a:lstStyle/>
-                    <a:p>
-                      <a:endParaRPr lang="en-US" dirty="0"/>
+                      <a:r>
+                        <a:rPr lang="en-US" dirty="0"/>
+                        <a:t>Those who did not have an experience most commonly answer that it is very easy to request leave.  Those who have most commonly answer that it is somewhat easy or somewhat hard to request leave.</a:t>
+                      </a:r>
                     </a:p>
                   </a:txBody>
                   <a:tcPr marL="91439" marR="91439"/>
@@ -26429,49 +26757,10 @@
           </a:graphicData>
         </a:graphic>
       </p:graphicFrame>
-      <p:sp>
-        <p:nvSpPr>
-          <p:cNvPr id="9" name="TextBox 8">
-            <a:extLst>
-              <a:ext uri="{FF2B5EF4-FFF2-40B4-BE49-F238E27FC236}">
-                <a16:creationId xmlns:a16="http://schemas.microsoft.com/office/drawing/2014/main" id="{733E9646-FD75-4247-BE4F-625172290FE0}"/>
-              </a:ext>
-            </a:extLst>
-          </p:cNvPr>
-          <p:cNvSpPr txBox="1"/>
-          <p:nvPr/>
-        </p:nvSpPr>
-        <p:spPr>
-          <a:xfrm>
-            <a:off x="1141413" y="1186663"/>
-            <a:ext cx="9905998" cy="1200329"/>
-          </a:xfrm>
-          <a:prstGeom prst="rect">
-            <a:avLst/>
-          </a:prstGeom>
-          <a:noFill/>
-        </p:spPr>
-        <p:txBody>
-          <a:bodyPr wrap="square" rtlCol="0">
-            <a:spAutoFit/>
-          </a:bodyPr>
-          <a:lstStyle/>
-          <a:p>
-            <a:r>
-              <a:rPr lang="en-US" dirty="0"/>
-              <a:t>We looked at how answers to the question “If a mental health issue prompted you to request a medical leave from work asking for that leave would be?” varied when doing a crosstab table with reported company characteristics and other employee perceptions/experiences.  </a:t>
-            </a:r>
-            <a:br>
-              <a:rPr lang="en-US" dirty="0"/>
-            </a:br>
-            <a:endParaRPr lang="en-US" dirty="0"/>
-          </a:p>
-        </p:txBody>
-      </p:sp>
     </p:spTree>
     <p:extLst>
       <p:ext uri="{BB962C8B-B14F-4D97-AF65-F5344CB8AC3E}">
-        <p14:creationId xmlns:p14="http://schemas.microsoft.com/office/powerpoint/2010/main" val="1871619017"/>
+        <p14:creationId xmlns:p14="http://schemas.microsoft.com/office/powerpoint/2010/main" val="1586750539"/>
       </p:ext>
     </p:extLst>
   </p:cSld>
@@ -26481,7 +26770,7 @@
 </p:sld>
 </file>
 
-<file path=ppt/slides/slide13.xml><?xml version="1.0" encoding="utf-8"?>
+<file path=ppt/slides/slide14.xml><?xml version="1.0" encoding="utf-8"?>
 <p:sld xmlns:a="http://schemas.openxmlformats.org/drawingml/2006/main" xmlns:r="http://schemas.openxmlformats.org/officeDocument/2006/relationships" xmlns:p="http://schemas.openxmlformats.org/presentationml/2006/main">
   <p:cSld>
     <p:spTree>
@@ -26549,14 +26838,14 @@
             <p:ph idx="1"/>
             <p:extLst>
               <p:ext uri="{D42A27DB-BD31-4B8C-83A1-F6EECF244321}">
-                <p14:modId xmlns:p14="http://schemas.microsoft.com/office/powerpoint/2010/main" val="344304586"/>
+                <p14:modId xmlns:p14="http://schemas.microsoft.com/office/powerpoint/2010/main" val="2589359361"/>
               </p:ext>
             </p:extLst>
           </p:nvPr>
         </p:nvGraphicFramePr>
         <p:xfrm>
-          <a:off x="1141413" y="2269808"/>
-          <a:ext cx="9906006" cy="3566160"/>
+          <a:off x="337625" y="2269808"/>
+          <a:ext cx="11591778" cy="4389120"/>
         </p:xfrm>
         <a:graphic>
           <a:graphicData uri="http://schemas.openxmlformats.org/drawingml/2006/table">
@@ -26565,21 +26854,14 @@
                 <a:tableStyleId>{93296810-A885-4BE3-A3E7-6D5BEEA58F35}</a:tableStyleId>
               </a:tblPr>
               <a:tblGrid>
-                <a:gridCol w="3302002">
+                <a:gridCol w="4002056">
                   <a:extLst>
                     <a:ext uri="{9D8B030D-6E8A-4147-A177-3AD203B41FA5}">
                       <a16:colId xmlns:a16="http://schemas.microsoft.com/office/drawing/2014/main" val="4103502791"/>
                     </a:ext>
                   </a:extLst>
                 </a:gridCol>
-                <a:gridCol w="3302002">
-                  <a:extLst>
-                    <a:ext uri="{9D8B030D-6E8A-4147-A177-3AD203B41FA5}">
-                      <a16:colId xmlns:a16="http://schemas.microsoft.com/office/drawing/2014/main" val="1402590756"/>
-                    </a:ext>
-                  </a:extLst>
-                </a:gridCol>
-                <a:gridCol w="3302002">
+                <a:gridCol w="7589722">
                   <a:extLst>
                     <a:ext uri="{9D8B030D-6E8A-4147-A177-3AD203B41FA5}">
                       <a16:colId xmlns:a16="http://schemas.microsoft.com/office/drawing/2014/main" val="3079260396"/>
@@ -26596,19 +26878,6 @@
                       <a:r>
                         <a:rPr lang="en-US" dirty="0"/>
                         <a:t>Independent Variable</a:t>
-                      </a:r>
-                    </a:p>
-                  </a:txBody>
-                  <a:tcPr marL="91439" marR="91439"/>
-                </a:tc>
-                <a:tc>
-                  <a:txBody>
-                    <a:bodyPr/>
-                    <a:lstStyle/>
-                    <a:p>
-                      <a:r>
-                        <a:rPr lang="en-US" dirty="0"/>
-                        <a:t>Is there a relationship?</a:t>
                       </a:r>
                     </a:p>
                   </a:txBody>
@@ -26652,17 +26921,10 @@
                     <a:bodyPr/>
                     <a:lstStyle/>
                     <a:p>
-                      <a:endParaRPr lang="en-US" dirty="0"/>
-                    </a:p>
-                  </a:txBody>
-                  <a:tcPr marL="91439" marR="91439"/>
-                </a:tc>
-                <a:tc>
-                  <a:txBody>
-                    <a:bodyPr/>
-                    <a:lstStyle/>
-                    <a:p>
-                      <a:endParaRPr lang="en-US"/>
+                      <a:r>
+                        <a:rPr lang="en-US" dirty="0"/>
+                        <a:t>Most respondents across genders indicate that they would be comfortable discussing mental health with supervisor. </a:t>
+                      </a:r>
                     </a:p>
                   </a:txBody>
                   <a:tcPr marL="91439" marR="91439"/>
@@ -26692,17 +26954,10 @@
                     <a:bodyPr/>
                     <a:lstStyle/>
                     <a:p>
-                      <a:endParaRPr lang="en-US" dirty="0"/>
-                    </a:p>
-                  </a:txBody>
-                  <a:tcPr marL="91439" marR="91439"/>
-                </a:tc>
-                <a:tc>
-                  <a:txBody>
-                    <a:bodyPr/>
-                    <a:lstStyle/>
-                    <a:p>
-                      <a:endParaRPr lang="en-US"/>
+                      <a:r>
+                        <a:rPr lang="en-US" dirty="0"/>
+                        <a:t>Most respondents 17-37 and 37-57 responded that they would feel comfortable discussing a mental health with supervisor. </a:t>
+                      </a:r>
                     </a:p>
                   </a:txBody>
                   <a:tcPr marL="91439" marR="91439"/>
@@ -26732,17 +26987,19 @@
                     <a:bodyPr/>
                     <a:lstStyle/>
                     <a:p>
-                      <a:endParaRPr lang="en-US"/>
-                    </a:p>
-                  </a:txBody>
-                  <a:tcPr marL="91439" marR="91439"/>
-                </a:tc>
-                <a:tc>
-                  <a:txBody>
-                    <a:bodyPr/>
-                    <a:lstStyle/>
-                    <a:p>
-                      <a:endParaRPr lang="en-US"/>
+                      <a:r>
+                        <a:rPr lang="en-US" sz="1800" kern="1200" dirty="0">
+                          <a:solidFill>
+                            <a:schemeClr val="dk1"/>
+                          </a:solidFill>
+                          <a:effectLst/>
+                          <a:latin typeface="+mn-lt"/>
+                          <a:ea typeface="+mn-ea"/>
+                          <a:cs typeface="+mn-cs"/>
+                        </a:rPr>
+                        <a:t>Most respondents working for a company with 1-500 employees say they would be comfortable. Most with 500-1000 employees say maybe.  Most with 1000+ say no (but yes is a close second).  </a:t>
+                      </a:r>
+                      <a:endParaRPr lang="en-US" dirty="0"/>
                     </a:p>
                   </a:txBody>
                   <a:tcPr marL="91439" marR="91439"/>
@@ -26772,17 +27029,10 @@
                     <a:bodyPr/>
                     <a:lstStyle/>
                     <a:p>
-                      <a:endParaRPr lang="en-US"/>
-                    </a:p>
-                  </a:txBody>
-                  <a:tcPr marL="91439" marR="91439"/>
-                </a:tc>
-                <a:tc>
-                  <a:txBody>
-                    <a:bodyPr/>
-                    <a:lstStyle/>
-                    <a:p>
-                      <a:endParaRPr lang="en-US" dirty="0"/>
+                      <a:r>
+                        <a:rPr lang="en-US" dirty="0"/>
+                        <a:t>Most respondents who haven’t experienced a poor response say they would be comfortable.  Those who observed are evenly split across yes, no, and maybe.  Those who experienced are evenly split between yes and maybe.  </a:t>
+                      </a:r>
                     </a:p>
                   </a:txBody>
                   <a:tcPr marL="91439" marR="91439"/>
@@ -26821,17 +27071,10 @@
                     <a:bodyPr/>
                     <a:lstStyle/>
                     <a:p>
-                      <a:endParaRPr lang="en-US"/>
-                    </a:p>
-                  </a:txBody>
-                  <a:tcPr marL="91439" marR="91439"/>
-                </a:tc>
-                <a:tc>
-                  <a:txBody>
-                    <a:bodyPr/>
-                    <a:lstStyle/>
-                    <a:p>
-                      <a:endParaRPr lang="en-US" dirty="0"/>
+                      <a:r>
+                        <a:rPr lang="en-US" dirty="0"/>
+                        <a:t>Most people who responded that they feel that discussing a mental health disorder would have a negative impact also are not comfortable discussing a mental health issue with a supervisor. The reverse is also true.</a:t>
+                      </a:r>
                     </a:p>
                   </a:txBody>
                   <a:tcPr marL="91439" marR="91439"/>
@@ -26876,7 +27119,7 @@
           <a:p>
             <a:r>
               <a:rPr lang="en-US" dirty="0"/>
-              <a:t>We looked at how answers to the question “Would you feel comfortable discussing a mental health disorder with your immediate supervisor” varied when doing a crosstab table with reported company characteristics and other employee perceptions/experiences. </a:t>
+              <a:t>We looked at how answers to the question “Would you feel comfortable discussing a mental health disorder with your immediate supervisor” varied when doing a crosstab table and bar chart with reported company characteristics and other employee perceptions/experiences. </a:t>
             </a:r>
           </a:p>
         </p:txBody>
@@ -26894,7 +27137,95 @@
 </p:sld>
 </file>
 
-<file path=ppt/slides/slide14.xml><?xml version="1.0" encoding="utf-8"?>
+<file path=ppt/slides/slide15.xml><?xml version="1.0" encoding="utf-8"?>
+<p:sld xmlns:a="http://schemas.openxmlformats.org/drawingml/2006/main" xmlns:r="http://schemas.openxmlformats.org/officeDocument/2006/relationships" xmlns:p="http://schemas.openxmlformats.org/presentationml/2006/main">
+  <p:cSld>
+    <p:spTree>
+      <p:nvGrpSpPr>
+        <p:cNvPr id="1" name=""/>
+        <p:cNvGrpSpPr/>
+        <p:nvPr/>
+      </p:nvGrpSpPr>
+      <p:grpSpPr>
+        <a:xfrm>
+          <a:off x="0" y="0"/>
+          <a:ext cx="0" cy="0"/>
+          <a:chOff x="0" y="0"/>
+          <a:chExt cx="0" cy="0"/>
+        </a:xfrm>
+      </p:grpSpPr>
+      <p:sp>
+        <p:nvSpPr>
+          <p:cNvPr id="2" name="Title 1">
+            <a:extLst>
+              <a:ext uri="{FF2B5EF4-FFF2-40B4-BE49-F238E27FC236}">
+                <a16:creationId xmlns:a16="http://schemas.microsoft.com/office/drawing/2014/main" id="{1C26D2EE-B540-43AD-B763-A8C2872AD62D}"/>
+              </a:ext>
+            </a:extLst>
+          </p:cNvPr>
+          <p:cNvSpPr>
+            <a:spLocks noGrp="1"/>
+          </p:cNvSpPr>
+          <p:nvPr>
+            <p:ph type="title"/>
+          </p:nvPr>
+        </p:nvSpPr>
+        <p:spPr/>
+        <p:txBody>
+          <a:bodyPr>
+            <a:normAutofit/>
+          </a:bodyPr>
+          <a:lstStyle/>
+          <a:p>
+            <a:r>
+              <a:rPr lang="en-US" dirty="0"/>
+              <a:t>Comfort level in discussing a mental health issue with Coworkers</a:t>
+            </a:r>
+          </a:p>
+        </p:txBody>
+      </p:sp>
+      <p:sp>
+        <p:nvSpPr>
+          <p:cNvPr id="5" name="Content Placeholder 4">
+            <a:extLst>
+              <a:ext uri="{FF2B5EF4-FFF2-40B4-BE49-F238E27FC236}">
+                <a16:creationId xmlns:a16="http://schemas.microsoft.com/office/drawing/2014/main" id="{EA8D1B89-8CDE-45BD-9FC0-BE12FE34DEB2}"/>
+              </a:ext>
+            </a:extLst>
+          </p:cNvPr>
+          <p:cNvSpPr>
+            <a:spLocks noGrp="1"/>
+          </p:cNvSpPr>
+          <p:nvPr>
+            <p:ph idx="1"/>
+          </p:nvPr>
+        </p:nvSpPr>
+        <p:spPr/>
+        <p:txBody>
+          <a:bodyPr/>
+          <a:lstStyle/>
+          <a:p>
+            <a:r>
+              <a:rPr lang="en-US" dirty="0"/>
+              <a:t>We looked at how answers to the question “Would you feel comfortable discussing a mental health disorder with your coworkers” varied when doing a crosstab table and bar chart with reported company characteristics and other employee perceptions/experiences. </a:t>
+            </a:r>
+          </a:p>
+        </p:txBody>
+      </p:sp>
+    </p:spTree>
+    <p:extLst>
+      <p:ext uri="{BB962C8B-B14F-4D97-AF65-F5344CB8AC3E}">
+        <p14:creationId xmlns:p14="http://schemas.microsoft.com/office/powerpoint/2010/main" val="660679894"/>
+      </p:ext>
+    </p:extLst>
+  </p:cSld>
+  <p:clrMapOvr>
+    <a:masterClrMapping/>
+  </p:clrMapOvr>
+</p:sld>
+</file>
+
+<file path=ppt/slides/slide16.xml><?xml version="1.0" encoding="utf-8"?>
 <p:sld xmlns:a="http://schemas.openxmlformats.org/drawingml/2006/main" xmlns:r="http://schemas.openxmlformats.org/officeDocument/2006/relationships" xmlns:p="http://schemas.openxmlformats.org/presentationml/2006/main">
   <p:cSld>
     <p:spTree>
@@ -26962,14 +27293,14 @@
             <p:ph idx="1"/>
             <p:extLst>
               <p:ext uri="{D42A27DB-BD31-4B8C-83A1-F6EECF244321}">
-                <p14:modId xmlns:p14="http://schemas.microsoft.com/office/powerpoint/2010/main" val="3357005852"/>
+                <p14:modId xmlns:p14="http://schemas.microsoft.com/office/powerpoint/2010/main" val="3858103734"/>
               </p:ext>
             </p:extLst>
           </p:nvPr>
         </p:nvGraphicFramePr>
         <p:xfrm>
-          <a:off x="1141413" y="2269808"/>
-          <a:ext cx="9906006" cy="3566160"/>
+          <a:off x="312590" y="1303846"/>
+          <a:ext cx="11563643" cy="5212080"/>
         </p:xfrm>
         <a:graphic>
           <a:graphicData uri="http://schemas.openxmlformats.org/drawingml/2006/table">
@@ -26978,21 +27309,14 @@
                 <a:tableStyleId>{21E4AEA4-8DFA-4A89-87EB-49C32662AFE0}</a:tableStyleId>
               </a:tblPr>
               <a:tblGrid>
-                <a:gridCol w="3302002">
+                <a:gridCol w="3760058">
                   <a:extLst>
                     <a:ext uri="{9D8B030D-6E8A-4147-A177-3AD203B41FA5}">
                       <a16:colId xmlns:a16="http://schemas.microsoft.com/office/drawing/2014/main" val="4103502791"/>
                     </a:ext>
                   </a:extLst>
                 </a:gridCol>
-                <a:gridCol w="3302002">
-                  <a:extLst>
-                    <a:ext uri="{9D8B030D-6E8A-4147-A177-3AD203B41FA5}">
-                      <a16:colId xmlns:a16="http://schemas.microsoft.com/office/drawing/2014/main" val="1402590756"/>
-                    </a:ext>
-                  </a:extLst>
-                </a:gridCol>
-                <a:gridCol w="3302002">
+                <a:gridCol w="7803585">
                   <a:extLst>
                     <a:ext uri="{9D8B030D-6E8A-4147-A177-3AD203B41FA5}">
                       <a16:colId xmlns:a16="http://schemas.microsoft.com/office/drawing/2014/main" val="3079260396"/>
@@ -27009,19 +27333,6 @@
                       <a:r>
                         <a:rPr lang="en-US" dirty="0"/>
                         <a:t>Independent Variable</a:t>
-                      </a:r>
-                    </a:p>
-                  </a:txBody>
-                  <a:tcPr marL="91439" marR="91439"/>
-                </a:tc>
-                <a:tc>
-                  <a:txBody>
-                    <a:bodyPr/>
-                    <a:lstStyle/>
-                    <a:p>
-                      <a:r>
-                        <a:rPr lang="en-US" dirty="0"/>
-                        <a:t>Is there a relationship?</a:t>
                       </a:r>
                     </a:p>
                   </a:txBody>
@@ -27065,17 +27376,19 @@
                     <a:bodyPr/>
                     <a:lstStyle/>
                     <a:p>
+                      <a:r>
+                        <a:rPr lang="en-US" sz="1800" kern="1200" dirty="0">
+                          <a:solidFill>
+                            <a:schemeClr val="dk1"/>
+                          </a:solidFill>
+                          <a:effectLst/>
+                          <a:latin typeface="+mn-lt"/>
+                          <a:ea typeface="+mn-ea"/>
+                          <a:cs typeface="+mn-cs"/>
+                        </a:rPr>
+                        <a:t>Across all genders the most common response is “maybe.” However, a higher proportion of female respondents indicate that they do not feel comfortable.</a:t>
+                      </a:r>
                       <a:endParaRPr lang="en-US" dirty="0"/>
-                    </a:p>
-                  </a:txBody>
-                  <a:tcPr marL="91439" marR="91439"/>
-                </a:tc>
-                <a:tc>
-                  <a:txBody>
-                    <a:bodyPr/>
-                    <a:lstStyle/>
-                    <a:p>
-                      <a:endParaRPr lang="en-US"/>
                     </a:p>
                   </a:txBody>
                   <a:tcPr marL="91439" marR="91439"/>
@@ -27105,17 +27418,19 @@
                     <a:bodyPr/>
                     <a:lstStyle/>
                     <a:p>
+                      <a:r>
+                        <a:rPr lang="en-US" sz="1800" kern="1200" dirty="0">
+                          <a:solidFill>
+                            <a:schemeClr val="dk1"/>
+                          </a:solidFill>
+                          <a:effectLst/>
+                          <a:latin typeface="+mn-lt"/>
+                          <a:ea typeface="+mn-ea"/>
+                          <a:cs typeface="+mn-cs"/>
+                        </a:rPr>
+                        <a:t>The majority of respondents 17-37 and 37-57 indicated that they might feel comfortable discussing a mental health disorder with coworkers, the second most common response being that they would not. </a:t>
+                      </a:r>
                       <a:endParaRPr lang="en-US" dirty="0"/>
-                    </a:p>
-                  </a:txBody>
-                  <a:tcPr marL="91439" marR="91439"/>
-                </a:tc>
-                <a:tc>
-                  <a:txBody>
-                    <a:bodyPr/>
-                    <a:lstStyle/>
-                    <a:p>
-                      <a:endParaRPr lang="en-US"/>
                     </a:p>
                   </a:txBody>
                   <a:tcPr marL="91439" marR="91439"/>
@@ -27145,17 +27460,35 @@
                     <a:bodyPr/>
                     <a:lstStyle/>
                     <a:p>
-                      <a:endParaRPr lang="en-US"/>
-                    </a:p>
-                  </a:txBody>
-                  <a:tcPr marL="91439" marR="91439"/>
-                </a:tc>
-                <a:tc>
-                  <a:txBody>
-                    <a:bodyPr/>
-                    <a:lstStyle/>
-                    <a:p>
-                      <a:endParaRPr lang="en-US"/>
+                      <a:pPr marL="0" marR="0" lvl="0" indent="0" algn="l" defTabSz="914400" rtl="0" eaLnBrk="1" fontAlgn="auto" latinLnBrk="0" hangingPunct="1">
+                        <a:lnSpc>
+                          <a:spcPct val="100000"/>
+                        </a:lnSpc>
+                        <a:spcBef>
+                          <a:spcPts val="0"/>
+                        </a:spcBef>
+                        <a:spcAft>
+                          <a:spcPts val="0"/>
+                        </a:spcAft>
+                        <a:buClrTx/>
+                        <a:buSzTx/>
+                        <a:buFontTx/>
+                        <a:buNone/>
+                        <a:tabLst/>
+                        <a:defRPr/>
+                      </a:pPr>
+                      <a:r>
+                        <a:rPr lang="en-US" sz="1800" kern="1200" dirty="0">
+                          <a:solidFill>
+                            <a:schemeClr val="dk1"/>
+                          </a:solidFill>
+                          <a:effectLst/>
+                          <a:latin typeface="+mn-lt"/>
+                          <a:ea typeface="+mn-ea"/>
+                          <a:cs typeface="+mn-cs"/>
+                        </a:rPr>
+                        <a:t>Respondents from companies with 1-5 and 6-25 employees are evenly split among the three responses (yes, no, maybe). For the 26-100, 100-500, and 500-1000 employee companies, most indicate that they may be comfortable. Respondents from companies with1000+ employees select the “no” answer the most often.</a:t>
+                      </a:r>
                     </a:p>
                   </a:txBody>
                   <a:tcPr marL="91439" marR="91439"/>
@@ -27185,17 +27518,10 @@
                     <a:bodyPr/>
                     <a:lstStyle/>
                     <a:p>
-                      <a:endParaRPr lang="en-US"/>
-                    </a:p>
-                  </a:txBody>
-                  <a:tcPr marL="91439" marR="91439"/>
-                </a:tc>
-                <a:tc>
-                  <a:txBody>
-                    <a:bodyPr/>
-                    <a:lstStyle/>
-                    <a:p>
-                      <a:endParaRPr lang="en-US" dirty="0"/>
+                      <a:r>
+                        <a:rPr lang="en-US" dirty="0"/>
+                        <a:t>When asked about experience with a poorly handled response to mental health, respondents across all categories except for “N/A”, also answered that they may be comfortable discussing a mental health disorder with coworkers. </a:t>
+                      </a:r>
                     </a:p>
                   </a:txBody>
                   <a:tcPr marL="91439" marR="91439"/>
@@ -27225,17 +27551,35 @@
                     <a:bodyPr/>
                     <a:lstStyle/>
                     <a:p>
-                      <a:endParaRPr lang="en-US"/>
-                    </a:p>
-                  </a:txBody>
-                  <a:tcPr marL="91439" marR="91439"/>
-                </a:tc>
-                <a:tc>
-                  <a:txBody>
-                    <a:bodyPr/>
-                    <a:lstStyle/>
-                    <a:p>
-                      <a:endParaRPr lang="en-US" dirty="0"/>
+                      <a:pPr marL="0" marR="0" lvl="0" indent="0" algn="l" defTabSz="914400" rtl="0" eaLnBrk="1" fontAlgn="auto" latinLnBrk="0" hangingPunct="1">
+                        <a:lnSpc>
+                          <a:spcPct val="100000"/>
+                        </a:lnSpc>
+                        <a:spcBef>
+                          <a:spcPts val="0"/>
+                        </a:spcBef>
+                        <a:spcAft>
+                          <a:spcPts val="0"/>
+                        </a:spcAft>
+                        <a:buClrTx/>
+                        <a:buSzTx/>
+                        <a:buFontTx/>
+                        <a:buNone/>
+                        <a:tabLst/>
+                        <a:defRPr/>
+                      </a:pPr>
+                      <a:r>
+                        <a:rPr lang="en-US" sz="1800" kern="1200" dirty="0">
+                          <a:solidFill>
+                            <a:schemeClr val="dk1"/>
+                          </a:solidFill>
+                          <a:effectLst/>
+                          <a:latin typeface="+mn-lt"/>
+                          <a:ea typeface="+mn-ea"/>
+                          <a:cs typeface="+mn-cs"/>
+                        </a:rPr>
+                        <a:t>Those who feel that they would be viewed negatively by coworkers answer more often that they would not feel comfortable discussing mental health with coworkers. Those who feel like they are negatively viewed are evenly split between maybe being comfortable and not being comfortable. </a:t>
+                      </a:r>
                     </a:p>
                   </a:txBody>
                   <a:tcPr marL="91439" marR="91439"/>
@@ -27250,45 +27594,10 @@
           </a:graphicData>
         </a:graphic>
       </p:graphicFrame>
-      <p:sp>
-        <p:nvSpPr>
-          <p:cNvPr id="9" name="TextBox 8">
-            <a:extLst>
-              <a:ext uri="{FF2B5EF4-FFF2-40B4-BE49-F238E27FC236}">
-                <a16:creationId xmlns:a16="http://schemas.microsoft.com/office/drawing/2014/main" id="{733E9646-FD75-4247-BE4F-625172290FE0}"/>
-              </a:ext>
-            </a:extLst>
-          </p:cNvPr>
-          <p:cNvSpPr txBox="1"/>
-          <p:nvPr/>
-        </p:nvSpPr>
-        <p:spPr>
-          <a:xfrm>
-            <a:off x="1141413" y="1303846"/>
-            <a:ext cx="9905998" cy="923330"/>
-          </a:xfrm>
-          <a:prstGeom prst="rect">
-            <a:avLst/>
-          </a:prstGeom>
-          <a:noFill/>
-        </p:spPr>
-        <p:txBody>
-          <a:bodyPr wrap="square" rtlCol="0">
-            <a:spAutoFit/>
-          </a:bodyPr>
-          <a:lstStyle/>
-          <a:p>
-            <a:r>
-              <a:rPr lang="en-US" dirty="0"/>
-              <a:t>We looked at how answers to the question “Would you feel comfortable discussing a mental health disorder with your coworkers” varied when doing a crosstab table with reported company characteristics and other employee perceptions/experiences. </a:t>
-            </a:r>
-          </a:p>
-        </p:txBody>
-      </p:sp>
     </p:spTree>
     <p:extLst>
       <p:ext uri="{BB962C8B-B14F-4D97-AF65-F5344CB8AC3E}">
-        <p14:creationId xmlns:p14="http://schemas.microsoft.com/office/powerpoint/2010/main" val="660679894"/>
+        <p14:creationId xmlns:p14="http://schemas.microsoft.com/office/powerpoint/2010/main" val="1306120076"/>
       </p:ext>
     </p:extLst>
   </p:cSld>
@@ -27298,7 +27607,7 @@
 </p:sld>
 </file>
 
-<file path=ppt/slides/slide15.xml><?xml version="1.0" encoding="utf-8"?>
+<file path=ppt/slides/slide17.xml><?xml version="1.0" encoding="utf-8"?>
 <p:sld xmlns:a="http://schemas.openxmlformats.org/drawingml/2006/main" xmlns:r="http://schemas.openxmlformats.org/officeDocument/2006/relationships" xmlns:p="http://schemas.openxmlformats.org/presentationml/2006/main">
   <p:cSld>
     <p:spTree>
@@ -27359,12 +27668,23 @@
             <p:ph idx="1"/>
           </p:nvPr>
         </p:nvSpPr>
-        <p:spPr/>
+        <p:spPr>
+          <a:xfrm>
+            <a:off x="1141412" y="2097088"/>
+            <a:ext cx="9905999" cy="4416254"/>
+          </a:xfrm>
+        </p:spPr>
         <p:txBody>
           <a:bodyPr>
-            <a:normAutofit fontScale="92500" lnSpcReduction="10000"/>
+            <a:normAutofit fontScale="85000" lnSpcReduction="10000"/>
           </a:bodyPr>
           <a:lstStyle/>
+          <a:p>
+            <a:r>
+              <a:rPr lang="en-US" dirty="0"/>
+              <a:t>Mental health benefit provision is a first step for mental health outreach.  It is also helpful to offer other resources (e.g., formal discussions and other resources).  </a:t>
+            </a:r>
+          </a:p>
           <a:p>
             <a:r>
               <a:rPr lang="en-US" dirty="0"/>
@@ -27396,7 +27716,14 @@
             <a:pPr lvl="1"/>
             <a:r>
               <a:rPr lang="en-US" dirty="0"/>
-              <a:t>Review policies to see if they may lead employees to believe that they will be penalized for disclosing a mental health issue or seeking help for one. </a:t>
+              <a:t>Review policies to see if they may lead employees to believe that they will be penalized for disclosing a mental health issue or seeking help for one.  </a:t>
+            </a:r>
+          </a:p>
+          <a:p>
+            <a:pPr lvl="1"/>
+            <a:r>
+              <a:rPr lang="en-US" dirty="0"/>
+              <a:t>Consider anonymous surveys to get a better idea of your company’s culture to help determine what  problem areas exist.</a:t>
             </a:r>
           </a:p>
         </p:txBody>

</xml_diff>